<commit_message>
(My latest commit yet)
</commit_message>
<xml_diff>
--- a/week-1/M.Olajobi's Flowchart CSC 102.pptx
+++ b/week-1/M.Olajobi's Flowchart CSC 102.pptx
@@ -5,9 +5,10 @@
     <p:sldMasterId id="2147483648" r:id="rId1"/>
   </p:sldMasterIdLst>
   <p:sldIdLst>
-    <p:sldId id="261" r:id="rId2"/>
-    <p:sldId id="262" r:id="rId3"/>
-    <p:sldId id="263" r:id="rId4"/>
+    <p:sldId id="264" r:id="rId2"/>
+    <p:sldId id="261" r:id="rId3"/>
+    <p:sldId id="262" r:id="rId4"/>
+    <p:sldId id="263" r:id="rId5"/>
   </p:sldIdLst>
   <p:sldSz cx="12192000" cy="6858000"/>
   <p:notesSz cx="6858000" cy="9144000"/>
@@ -114,6 +115,2796 @@
 </p:presentation>
 </file>
 
+<file path=ppt/diagrams/colors1.xml><?xml version="1.0" encoding="utf-8"?>
+<dgm:colorsDef xmlns:dgm="http://schemas.openxmlformats.org/drawingml/2006/diagram" xmlns:a="http://schemas.openxmlformats.org/drawingml/2006/main" uniqueId="urn:microsoft.com/office/officeart/2005/8/colors/accent1_2">
+  <dgm:title val=""/>
+  <dgm:desc val=""/>
+  <dgm:catLst>
+    <dgm:cat type="accent1" pri="11200"/>
+  </dgm:catLst>
+  <dgm:styleLbl name="node0">
+    <dgm:fillClrLst meth="repeat">
+      <a:schemeClr val="accent1"/>
+    </dgm:fillClrLst>
+    <dgm:linClrLst meth="repeat">
+      <a:schemeClr val="lt1"/>
+    </dgm:linClrLst>
+    <dgm:effectClrLst/>
+    <dgm:txLinClrLst/>
+    <dgm:txFillClrLst/>
+    <dgm:txEffectClrLst/>
+  </dgm:styleLbl>
+  <dgm:styleLbl name="alignNode1">
+    <dgm:fillClrLst meth="repeat">
+      <a:schemeClr val="accent1"/>
+    </dgm:fillClrLst>
+    <dgm:linClrLst meth="repeat">
+      <a:schemeClr val="accent1"/>
+    </dgm:linClrLst>
+    <dgm:effectClrLst/>
+    <dgm:txLinClrLst/>
+    <dgm:txFillClrLst/>
+    <dgm:txEffectClrLst/>
+  </dgm:styleLbl>
+  <dgm:styleLbl name="node1">
+    <dgm:fillClrLst meth="repeat">
+      <a:schemeClr val="accent1"/>
+    </dgm:fillClrLst>
+    <dgm:linClrLst meth="repeat">
+      <a:schemeClr val="lt1"/>
+    </dgm:linClrLst>
+    <dgm:effectClrLst/>
+    <dgm:txLinClrLst/>
+    <dgm:txFillClrLst/>
+    <dgm:txEffectClrLst/>
+  </dgm:styleLbl>
+  <dgm:styleLbl name="lnNode1">
+    <dgm:fillClrLst meth="repeat">
+      <a:schemeClr val="accent1"/>
+    </dgm:fillClrLst>
+    <dgm:linClrLst meth="repeat">
+      <a:schemeClr val="lt1"/>
+    </dgm:linClrLst>
+    <dgm:effectClrLst/>
+    <dgm:txLinClrLst/>
+    <dgm:txFillClrLst/>
+    <dgm:txEffectClrLst/>
+  </dgm:styleLbl>
+  <dgm:styleLbl name="vennNode1">
+    <dgm:fillClrLst meth="repeat">
+      <a:schemeClr val="accent1">
+        <a:alpha val="50000"/>
+      </a:schemeClr>
+    </dgm:fillClrLst>
+    <dgm:linClrLst meth="repeat">
+      <a:schemeClr val="lt1"/>
+    </dgm:linClrLst>
+    <dgm:effectClrLst/>
+    <dgm:txLinClrLst/>
+    <dgm:txFillClrLst/>
+    <dgm:txEffectClrLst/>
+  </dgm:styleLbl>
+  <dgm:styleLbl name="node2">
+    <dgm:fillClrLst meth="repeat">
+      <a:schemeClr val="accent1"/>
+    </dgm:fillClrLst>
+    <dgm:linClrLst meth="repeat">
+      <a:schemeClr val="lt1"/>
+    </dgm:linClrLst>
+    <dgm:effectClrLst/>
+    <dgm:txLinClrLst/>
+    <dgm:txFillClrLst/>
+    <dgm:txEffectClrLst/>
+  </dgm:styleLbl>
+  <dgm:styleLbl name="node3">
+    <dgm:fillClrLst meth="repeat">
+      <a:schemeClr val="accent1"/>
+    </dgm:fillClrLst>
+    <dgm:linClrLst meth="repeat">
+      <a:schemeClr val="lt1"/>
+    </dgm:linClrLst>
+    <dgm:effectClrLst/>
+    <dgm:txLinClrLst/>
+    <dgm:txFillClrLst/>
+    <dgm:txEffectClrLst/>
+  </dgm:styleLbl>
+  <dgm:styleLbl name="node4">
+    <dgm:fillClrLst meth="repeat">
+      <a:schemeClr val="accent1"/>
+    </dgm:fillClrLst>
+    <dgm:linClrLst meth="repeat">
+      <a:schemeClr val="lt1"/>
+    </dgm:linClrLst>
+    <dgm:effectClrLst/>
+    <dgm:txLinClrLst/>
+    <dgm:txFillClrLst/>
+    <dgm:txEffectClrLst/>
+  </dgm:styleLbl>
+  <dgm:styleLbl name="fgImgPlace1">
+    <dgm:fillClrLst meth="repeat">
+      <a:schemeClr val="accent1">
+        <a:tint val="50000"/>
+      </a:schemeClr>
+    </dgm:fillClrLst>
+    <dgm:linClrLst meth="repeat">
+      <a:schemeClr val="lt1"/>
+    </dgm:linClrLst>
+    <dgm:effectClrLst/>
+    <dgm:txLinClrLst/>
+    <dgm:txFillClrLst meth="repeat">
+      <a:schemeClr val="lt1"/>
+    </dgm:txFillClrLst>
+    <dgm:txEffectClrLst/>
+  </dgm:styleLbl>
+  <dgm:styleLbl name="alignImgPlace1">
+    <dgm:fillClrLst meth="repeat">
+      <a:schemeClr val="accent1">
+        <a:tint val="50000"/>
+      </a:schemeClr>
+    </dgm:fillClrLst>
+    <dgm:linClrLst meth="repeat">
+      <a:schemeClr val="lt1"/>
+    </dgm:linClrLst>
+    <dgm:effectClrLst/>
+    <dgm:txLinClrLst/>
+    <dgm:txFillClrLst meth="repeat">
+      <a:schemeClr val="lt1"/>
+    </dgm:txFillClrLst>
+    <dgm:txEffectClrLst/>
+  </dgm:styleLbl>
+  <dgm:styleLbl name="bgImgPlace1">
+    <dgm:fillClrLst meth="repeat">
+      <a:schemeClr val="accent1">
+        <a:tint val="50000"/>
+      </a:schemeClr>
+    </dgm:fillClrLst>
+    <dgm:linClrLst meth="repeat">
+      <a:schemeClr val="lt1"/>
+    </dgm:linClrLst>
+    <dgm:effectClrLst/>
+    <dgm:txLinClrLst/>
+    <dgm:txFillClrLst meth="repeat">
+      <a:schemeClr val="lt1"/>
+    </dgm:txFillClrLst>
+    <dgm:txEffectClrLst/>
+  </dgm:styleLbl>
+  <dgm:styleLbl name="sibTrans2D1">
+    <dgm:fillClrLst meth="repeat">
+      <a:schemeClr val="accent1">
+        <a:tint val="60000"/>
+      </a:schemeClr>
+    </dgm:fillClrLst>
+    <dgm:linClrLst meth="repeat">
+      <a:schemeClr val="accent1">
+        <a:tint val="60000"/>
+      </a:schemeClr>
+    </dgm:linClrLst>
+    <dgm:effectClrLst/>
+    <dgm:txLinClrLst/>
+    <dgm:txFillClrLst/>
+    <dgm:txEffectClrLst/>
+  </dgm:styleLbl>
+  <dgm:styleLbl name="fgSibTrans2D1">
+    <dgm:fillClrLst meth="repeat">
+      <a:schemeClr val="accent1">
+        <a:tint val="60000"/>
+      </a:schemeClr>
+    </dgm:fillClrLst>
+    <dgm:linClrLst meth="repeat">
+      <a:schemeClr val="accent1">
+        <a:tint val="60000"/>
+      </a:schemeClr>
+    </dgm:linClrLst>
+    <dgm:effectClrLst/>
+    <dgm:txLinClrLst/>
+    <dgm:txFillClrLst/>
+    <dgm:txEffectClrLst/>
+  </dgm:styleLbl>
+  <dgm:styleLbl name="bgSibTrans2D1">
+    <dgm:fillClrLst meth="repeat">
+      <a:schemeClr val="accent1">
+        <a:tint val="60000"/>
+      </a:schemeClr>
+    </dgm:fillClrLst>
+    <dgm:linClrLst meth="repeat">
+      <a:schemeClr val="accent1">
+        <a:tint val="60000"/>
+      </a:schemeClr>
+    </dgm:linClrLst>
+    <dgm:effectClrLst/>
+    <dgm:txLinClrLst/>
+    <dgm:txFillClrLst/>
+    <dgm:txEffectClrLst/>
+  </dgm:styleLbl>
+  <dgm:styleLbl name="sibTrans1D1">
+    <dgm:fillClrLst meth="repeat">
+      <a:schemeClr val="accent1"/>
+    </dgm:fillClrLst>
+    <dgm:linClrLst meth="repeat">
+      <a:schemeClr val="accent1"/>
+    </dgm:linClrLst>
+    <dgm:effectClrLst/>
+    <dgm:txLinClrLst/>
+    <dgm:txFillClrLst meth="repeat">
+      <a:schemeClr val="tx1"/>
+    </dgm:txFillClrLst>
+    <dgm:txEffectClrLst/>
+  </dgm:styleLbl>
+  <dgm:styleLbl name="callout">
+    <dgm:fillClrLst meth="repeat">
+      <a:schemeClr val="accent1"/>
+    </dgm:fillClrLst>
+    <dgm:linClrLst meth="repeat">
+      <a:schemeClr val="accent1">
+        <a:tint val="50000"/>
+      </a:schemeClr>
+    </dgm:linClrLst>
+    <dgm:effectClrLst/>
+    <dgm:txLinClrLst/>
+    <dgm:txFillClrLst meth="repeat">
+      <a:schemeClr val="tx1"/>
+    </dgm:txFillClrLst>
+    <dgm:txEffectClrLst/>
+  </dgm:styleLbl>
+  <dgm:styleLbl name="asst0">
+    <dgm:fillClrLst meth="repeat">
+      <a:schemeClr val="accent1"/>
+    </dgm:fillClrLst>
+    <dgm:linClrLst meth="repeat">
+      <a:schemeClr val="lt1"/>
+    </dgm:linClrLst>
+    <dgm:effectClrLst/>
+    <dgm:txLinClrLst/>
+    <dgm:txFillClrLst/>
+    <dgm:txEffectClrLst/>
+  </dgm:styleLbl>
+  <dgm:styleLbl name="asst1">
+    <dgm:fillClrLst meth="repeat">
+      <a:schemeClr val="accent1"/>
+    </dgm:fillClrLst>
+    <dgm:linClrLst meth="repeat">
+      <a:schemeClr val="lt1"/>
+    </dgm:linClrLst>
+    <dgm:effectClrLst/>
+    <dgm:txLinClrLst/>
+    <dgm:txFillClrLst/>
+    <dgm:txEffectClrLst/>
+  </dgm:styleLbl>
+  <dgm:styleLbl name="asst2">
+    <dgm:fillClrLst meth="repeat">
+      <a:schemeClr val="accent1"/>
+    </dgm:fillClrLst>
+    <dgm:linClrLst meth="repeat">
+      <a:schemeClr val="lt1"/>
+    </dgm:linClrLst>
+    <dgm:effectClrLst/>
+    <dgm:txLinClrLst/>
+    <dgm:txFillClrLst/>
+    <dgm:txEffectClrLst/>
+  </dgm:styleLbl>
+  <dgm:styleLbl name="asst3">
+    <dgm:fillClrLst meth="repeat">
+      <a:schemeClr val="accent1"/>
+    </dgm:fillClrLst>
+    <dgm:linClrLst meth="repeat">
+      <a:schemeClr val="lt1"/>
+    </dgm:linClrLst>
+    <dgm:effectClrLst/>
+    <dgm:txLinClrLst/>
+    <dgm:txFillClrLst/>
+    <dgm:txEffectClrLst/>
+  </dgm:styleLbl>
+  <dgm:styleLbl name="asst4">
+    <dgm:fillClrLst meth="repeat">
+      <a:schemeClr val="accent1"/>
+    </dgm:fillClrLst>
+    <dgm:linClrLst meth="repeat">
+      <a:schemeClr val="lt1"/>
+    </dgm:linClrLst>
+    <dgm:effectClrLst/>
+    <dgm:txLinClrLst/>
+    <dgm:txFillClrLst/>
+    <dgm:txEffectClrLst/>
+  </dgm:styleLbl>
+  <dgm:styleLbl name="parChTrans2D1">
+    <dgm:fillClrLst meth="repeat">
+      <a:schemeClr val="accent1">
+        <a:tint val="60000"/>
+      </a:schemeClr>
+    </dgm:fillClrLst>
+    <dgm:linClrLst meth="repeat">
+      <a:schemeClr val="accent1">
+        <a:tint val="60000"/>
+      </a:schemeClr>
+    </dgm:linClrLst>
+    <dgm:effectClrLst/>
+    <dgm:txLinClrLst/>
+    <dgm:txFillClrLst meth="repeat">
+      <a:schemeClr val="lt1"/>
+    </dgm:txFillClrLst>
+    <dgm:txEffectClrLst/>
+  </dgm:styleLbl>
+  <dgm:styleLbl name="parChTrans2D2">
+    <dgm:fillClrLst meth="repeat">
+      <a:schemeClr val="accent1"/>
+    </dgm:fillClrLst>
+    <dgm:linClrLst meth="repeat">
+      <a:schemeClr val="accent1"/>
+    </dgm:linClrLst>
+    <dgm:effectClrLst/>
+    <dgm:txLinClrLst/>
+    <dgm:txFillClrLst meth="repeat">
+      <a:schemeClr val="lt1"/>
+    </dgm:txFillClrLst>
+    <dgm:txEffectClrLst/>
+  </dgm:styleLbl>
+  <dgm:styleLbl name="parChTrans2D3">
+    <dgm:fillClrLst meth="repeat">
+      <a:schemeClr val="accent1"/>
+    </dgm:fillClrLst>
+    <dgm:linClrLst meth="repeat">
+      <a:schemeClr val="accent1"/>
+    </dgm:linClrLst>
+    <dgm:effectClrLst/>
+    <dgm:txLinClrLst/>
+    <dgm:txFillClrLst meth="repeat">
+      <a:schemeClr val="lt1"/>
+    </dgm:txFillClrLst>
+    <dgm:txEffectClrLst/>
+  </dgm:styleLbl>
+  <dgm:styleLbl name="parChTrans2D4">
+    <dgm:fillClrLst meth="repeat">
+      <a:schemeClr val="accent1"/>
+    </dgm:fillClrLst>
+    <dgm:linClrLst meth="repeat">
+      <a:schemeClr val="accent1"/>
+    </dgm:linClrLst>
+    <dgm:effectClrLst/>
+    <dgm:txLinClrLst/>
+    <dgm:txFillClrLst meth="repeat">
+      <a:schemeClr val="lt1"/>
+    </dgm:txFillClrLst>
+    <dgm:txEffectClrLst/>
+  </dgm:styleLbl>
+  <dgm:styleLbl name="parChTrans1D1">
+    <dgm:fillClrLst meth="repeat">
+      <a:schemeClr val="accent1"/>
+    </dgm:fillClrLst>
+    <dgm:linClrLst meth="repeat">
+      <a:schemeClr val="accent1">
+        <a:shade val="60000"/>
+      </a:schemeClr>
+    </dgm:linClrLst>
+    <dgm:effectClrLst/>
+    <dgm:txLinClrLst/>
+    <dgm:txFillClrLst meth="repeat">
+      <a:schemeClr val="tx1"/>
+    </dgm:txFillClrLst>
+    <dgm:txEffectClrLst/>
+  </dgm:styleLbl>
+  <dgm:styleLbl name="parChTrans1D2">
+    <dgm:fillClrLst meth="repeat">
+      <a:schemeClr val="accent1"/>
+    </dgm:fillClrLst>
+    <dgm:linClrLst meth="repeat">
+      <a:schemeClr val="accent1">
+        <a:shade val="60000"/>
+      </a:schemeClr>
+    </dgm:linClrLst>
+    <dgm:effectClrLst/>
+    <dgm:txLinClrLst/>
+    <dgm:txFillClrLst meth="repeat">
+      <a:schemeClr val="tx1"/>
+    </dgm:txFillClrLst>
+    <dgm:txEffectClrLst/>
+  </dgm:styleLbl>
+  <dgm:styleLbl name="parChTrans1D3">
+    <dgm:fillClrLst meth="repeat">
+      <a:schemeClr val="accent1"/>
+    </dgm:fillClrLst>
+    <dgm:linClrLst meth="repeat">
+      <a:schemeClr val="accent1">
+        <a:shade val="80000"/>
+      </a:schemeClr>
+    </dgm:linClrLst>
+    <dgm:effectClrLst/>
+    <dgm:txLinClrLst/>
+    <dgm:txFillClrLst meth="repeat">
+      <a:schemeClr val="tx1"/>
+    </dgm:txFillClrLst>
+    <dgm:txEffectClrLst/>
+  </dgm:styleLbl>
+  <dgm:styleLbl name="parChTrans1D4">
+    <dgm:fillClrLst meth="repeat">
+      <a:schemeClr val="accent1"/>
+    </dgm:fillClrLst>
+    <dgm:linClrLst meth="repeat">
+      <a:schemeClr val="accent1">
+        <a:shade val="80000"/>
+      </a:schemeClr>
+    </dgm:linClrLst>
+    <dgm:effectClrLst/>
+    <dgm:txLinClrLst/>
+    <dgm:txFillClrLst meth="repeat">
+      <a:schemeClr val="tx1"/>
+    </dgm:txFillClrLst>
+    <dgm:txEffectClrLst/>
+  </dgm:styleLbl>
+  <dgm:styleLbl name="fgAcc1">
+    <dgm:fillClrLst meth="repeat">
+      <a:schemeClr val="lt1">
+        <a:alpha val="90000"/>
+      </a:schemeClr>
+    </dgm:fillClrLst>
+    <dgm:linClrLst meth="repeat">
+      <a:schemeClr val="accent1"/>
+    </dgm:linClrLst>
+    <dgm:effectClrLst/>
+    <dgm:txLinClrLst/>
+    <dgm:txFillClrLst meth="repeat">
+      <a:schemeClr val="dk1"/>
+    </dgm:txFillClrLst>
+    <dgm:txEffectClrLst/>
+  </dgm:styleLbl>
+  <dgm:styleLbl name="conFgAcc1">
+    <dgm:fillClrLst meth="repeat">
+      <a:schemeClr val="lt1">
+        <a:alpha val="90000"/>
+      </a:schemeClr>
+    </dgm:fillClrLst>
+    <dgm:linClrLst meth="repeat">
+      <a:schemeClr val="accent1"/>
+    </dgm:linClrLst>
+    <dgm:effectClrLst/>
+    <dgm:txLinClrLst/>
+    <dgm:txFillClrLst meth="repeat">
+      <a:schemeClr val="dk1"/>
+    </dgm:txFillClrLst>
+    <dgm:txEffectClrLst/>
+  </dgm:styleLbl>
+  <dgm:styleLbl name="alignAcc1">
+    <dgm:fillClrLst meth="repeat">
+      <a:schemeClr val="lt1">
+        <a:alpha val="90000"/>
+      </a:schemeClr>
+    </dgm:fillClrLst>
+    <dgm:linClrLst meth="repeat">
+      <a:schemeClr val="accent1"/>
+    </dgm:linClrLst>
+    <dgm:effectClrLst/>
+    <dgm:txLinClrLst/>
+    <dgm:txFillClrLst meth="repeat">
+      <a:schemeClr val="dk1"/>
+    </dgm:txFillClrLst>
+    <dgm:txEffectClrLst/>
+  </dgm:styleLbl>
+  <dgm:styleLbl name="trAlignAcc1">
+    <dgm:fillClrLst meth="repeat">
+      <a:schemeClr val="lt1">
+        <a:alpha val="40000"/>
+      </a:schemeClr>
+    </dgm:fillClrLst>
+    <dgm:linClrLst meth="repeat">
+      <a:schemeClr val="accent1"/>
+    </dgm:linClrLst>
+    <dgm:effectClrLst/>
+    <dgm:txLinClrLst/>
+    <dgm:txFillClrLst meth="repeat">
+      <a:schemeClr val="dk1"/>
+    </dgm:txFillClrLst>
+    <dgm:txEffectClrLst/>
+  </dgm:styleLbl>
+  <dgm:styleLbl name="bgAcc1">
+    <dgm:fillClrLst meth="repeat">
+      <a:schemeClr val="lt1">
+        <a:alpha val="90000"/>
+      </a:schemeClr>
+    </dgm:fillClrLst>
+    <dgm:linClrLst meth="repeat">
+      <a:schemeClr val="accent1"/>
+    </dgm:linClrLst>
+    <dgm:effectClrLst/>
+    <dgm:txLinClrLst/>
+    <dgm:txFillClrLst meth="repeat">
+      <a:schemeClr val="dk1"/>
+    </dgm:txFillClrLst>
+    <dgm:txEffectClrLst/>
+  </dgm:styleLbl>
+  <dgm:styleLbl name="solidFgAcc1">
+    <dgm:fillClrLst meth="repeat">
+      <a:schemeClr val="lt1"/>
+    </dgm:fillClrLst>
+    <dgm:linClrLst meth="repeat">
+      <a:schemeClr val="accent1"/>
+    </dgm:linClrLst>
+    <dgm:effectClrLst/>
+    <dgm:txLinClrLst/>
+    <dgm:txFillClrLst meth="repeat">
+      <a:schemeClr val="dk1"/>
+    </dgm:txFillClrLst>
+    <dgm:txEffectClrLst/>
+  </dgm:styleLbl>
+  <dgm:styleLbl name="solidAlignAcc1">
+    <dgm:fillClrLst meth="repeat">
+      <a:schemeClr val="lt1"/>
+    </dgm:fillClrLst>
+    <dgm:linClrLst meth="repeat">
+      <a:schemeClr val="accent1"/>
+    </dgm:linClrLst>
+    <dgm:effectClrLst/>
+    <dgm:txLinClrLst/>
+    <dgm:txFillClrLst meth="repeat">
+      <a:schemeClr val="dk1"/>
+    </dgm:txFillClrLst>
+    <dgm:txEffectClrLst/>
+  </dgm:styleLbl>
+  <dgm:styleLbl name="solidBgAcc1">
+    <dgm:fillClrLst meth="repeat">
+      <a:schemeClr val="lt1"/>
+    </dgm:fillClrLst>
+    <dgm:linClrLst meth="repeat">
+      <a:schemeClr val="accent1"/>
+    </dgm:linClrLst>
+    <dgm:effectClrLst/>
+    <dgm:txLinClrLst/>
+    <dgm:txFillClrLst meth="repeat">
+      <a:schemeClr val="dk1"/>
+    </dgm:txFillClrLst>
+    <dgm:txEffectClrLst/>
+  </dgm:styleLbl>
+  <dgm:styleLbl name="fgAccFollowNode1">
+    <dgm:fillClrLst meth="repeat">
+      <a:schemeClr val="accent1">
+        <a:alpha val="90000"/>
+        <a:tint val="40000"/>
+      </a:schemeClr>
+    </dgm:fillClrLst>
+    <dgm:linClrLst meth="repeat">
+      <a:schemeClr val="accent1">
+        <a:alpha val="90000"/>
+        <a:tint val="40000"/>
+      </a:schemeClr>
+    </dgm:linClrLst>
+    <dgm:effectClrLst/>
+    <dgm:txLinClrLst/>
+    <dgm:txFillClrLst meth="repeat">
+      <a:schemeClr val="dk1"/>
+    </dgm:txFillClrLst>
+    <dgm:txEffectClrLst/>
+  </dgm:styleLbl>
+  <dgm:styleLbl name="alignAccFollowNode1">
+    <dgm:fillClrLst meth="repeat">
+      <a:schemeClr val="accent1">
+        <a:alpha val="90000"/>
+        <a:tint val="40000"/>
+      </a:schemeClr>
+    </dgm:fillClrLst>
+    <dgm:linClrLst meth="repeat">
+      <a:schemeClr val="accent1">
+        <a:alpha val="90000"/>
+        <a:tint val="40000"/>
+      </a:schemeClr>
+    </dgm:linClrLst>
+    <dgm:effectClrLst/>
+    <dgm:txLinClrLst/>
+    <dgm:txFillClrLst meth="repeat">
+      <a:schemeClr val="dk1"/>
+    </dgm:txFillClrLst>
+    <dgm:txEffectClrLst/>
+  </dgm:styleLbl>
+  <dgm:styleLbl name="bgAccFollowNode1">
+    <dgm:fillClrLst meth="repeat">
+      <a:schemeClr val="accent1">
+        <a:alpha val="90000"/>
+        <a:tint val="40000"/>
+      </a:schemeClr>
+    </dgm:fillClrLst>
+    <dgm:linClrLst meth="repeat">
+      <a:schemeClr val="accent1">
+        <a:alpha val="90000"/>
+        <a:tint val="40000"/>
+      </a:schemeClr>
+    </dgm:linClrLst>
+    <dgm:effectClrLst/>
+    <dgm:txLinClrLst/>
+    <dgm:txFillClrLst meth="repeat">
+      <a:schemeClr val="dk1"/>
+    </dgm:txFillClrLst>
+    <dgm:txEffectClrLst/>
+  </dgm:styleLbl>
+  <dgm:styleLbl name="fgAcc0">
+    <dgm:fillClrLst meth="repeat">
+      <a:schemeClr val="lt1">
+        <a:alpha val="90000"/>
+      </a:schemeClr>
+    </dgm:fillClrLst>
+    <dgm:linClrLst meth="repeat">
+      <a:schemeClr val="accent1"/>
+    </dgm:linClrLst>
+    <dgm:effectClrLst/>
+    <dgm:txLinClrLst/>
+    <dgm:txFillClrLst meth="repeat">
+      <a:schemeClr val="dk1"/>
+    </dgm:txFillClrLst>
+    <dgm:txEffectClrLst/>
+  </dgm:styleLbl>
+  <dgm:styleLbl name="fgAcc2">
+    <dgm:fillClrLst meth="repeat">
+      <a:schemeClr val="lt1">
+        <a:alpha val="90000"/>
+      </a:schemeClr>
+    </dgm:fillClrLst>
+    <dgm:linClrLst meth="repeat">
+      <a:schemeClr val="accent1"/>
+    </dgm:linClrLst>
+    <dgm:effectClrLst/>
+    <dgm:txLinClrLst/>
+    <dgm:txFillClrLst meth="repeat">
+      <a:schemeClr val="dk1"/>
+    </dgm:txFillClrLst>
+    <dgm:txEffectClrLst/>
+  </dgm:styleLbl>
+  <dgm:styleLbl name="fgAcc3">
+    <dgm:fillClrLst meth="repeat">
+      <a:schemeClr val="lt1">
+        <a:alpha val="90000"/>
+      </a:schemeClr>
+    </dgm:fillClrLst>
+    <dgm:linClrLst meth="repeat">
+      <a:schemeClr val="accent1"/>
+    </dgm:linClrLst>
+    <dgm:effectClrLst/>
+    <dgm:txLinClrLst/>
+    <dgm:txFillClrLst meth="repeat">
+      <a:schemeClr val="dk1"/>
+    </dgm:txFillClrLst>
+    <dgm:txEffectClrLst/>
+  </dgm:styleLbl>
+  <dgm:styleLbl name="fgAcc4">
+    <dgm:fillClrLst meth="repeat">
+      <a:schemeClr val="lt1">
+        <a:alpha val="90000"/>
+      </a:schemeClr>
+    </dgm:fillClrLst>
+    <dgm:linClrLst meth="repeat">
+      <a:schemeClr val="accent1"/>
+    </dgm:linClrLst>
+    <dgm:effectClrLst/>
+    <dgm:txLinClrLst/>
+    <dgm:txFillClrLst meth="repeat">
+      <a:schemeClr val="dk1"/>
+    </dgm:txFillClrLst>
+    <dgm:txEffectClrLst/>
+  </dgm:styleLbl>
+  <dgm:styleLbl name="bgShp">
+    <dgm:fillClrLst meth="repeat">
+      <a:schemeClr val="accent1">
+        <a:tint val="40000"/>
+      </a:schemeClr>
+    </dgm:fillClrLst>
+    <dgm:linClrLst meth="repeat">
+      <a:schemeClr val="accent1"/>
+    </dgm:linClrLst>
+    <dgm:effectClrLst/>
+    <dgm:txLinClrLst/>
+    <dgm:txFillClrLst meth="repeat">
+      <a:schemeClr val="dk1"/>
+    </dgm:txFillClrLst>
+    <dgm:txEffectClrLst/>
+  </dgm:styleLbl>
+  <dgm:styleLbl name="dkBgShp">
+    <dgm:fillClrLst meth="repeat">
+      <a:schemeClr val="accent1">
+        <a:shade val="80000"/>
+      </a:schemeClr>
+    </dgm:fillClrLst>
+    <dgm:linClrLst meth="repeat">
+      <a:schemeClr val="accent1"/>
+    </dgm:linClrLst>
+    <dgm:effectClrLst/>
+    <dgm:txLinClrLst/>
+    <dgm:txFillClrLst meth="repeat">
+      <a:schemeClr val="lt1"/>
+    </dgm:txFillClrLst>
+    <dgm:txEffectClrLst/>
+  </dgm:styleLbl>
+  <dgm:styleLbl name="trBgShp">
+    <dgm:fillClrLst meth="repeat">
+      <a:schemeClr val="accent1">
+        <a:tint val="50000"/>
+        <a:alpha val="40000"/>
+      </a:schemeClr>
+    </dgm:fillClrLst>
+    <dgm:linClrLst meth="repeat">
+      <a:schemeClr val="accent1"/>
+    </dgm:linClrLst>
+    <dgm:effectClrLst/>
+    <dgm:txLinClrLst/>
+    <dgm:txFillClrLst meth="repeat">
+      <a:schemeClr val="lt1"/>
+    </dgm:txFillClrLst>
+    <dgm:txEffectClrLst/>
+  </dgm:styleLbl>
+  <dgm:styleLbl name="fgShp">
+    <dgm:fillClrLst meth="repeat">
+      <a:schemeClr val="accent1">
+        <a:tint val="60000"/>
+      </a:schemeClr>
+    </dgm:fillClrLst>
+    <dgm:linClrLst meth="repeat">
+      <a:schemeClr val="lt1"/>
+    </dgm:linClrLst>
+    <dgm:effectClrLst/>
+    <dgm:txLinClrLst/>
+    <dgm:txFillClrLst meth="repeat">
+      <a:schemeClr val="dk1"/>
+    </dgm:txFillClrLst>
+    <dgm:txEffectClrLst/>
+  </dgm:styleLbl>
+  <dgm:styleLbl name="revTx">
+    <dgm:fillClrLst meth="repeat">
+      <a:schemeClr val="lt1">
+        <a:alpha val="0"/>
+      </a:schemeClr>
+    </dgm:fillClrLst>
+    <dgm:linClrLst meth="repeat">
+      <a:schemeClr val="dk1">
+        <a:alpha val="0"/>
+      </a:schemeClr>
+    </dgm:linClrLst>
+    <dgm:effectClrLst/>
+    <dgm:txLinClrLst/>
+    <dgm:txFillClrLst meth="repeat">
+      <a:schemeClr val="tx1"/>
+    </dgm:txFillClrLst>
+    <dgm:txEffectClrLst/>
+  </dgm:styleLbl>
+</dgm:colorsDef>
+</file>
+
+<file path=ppt/diagrams/data1.xml><?xml version="1.0" encoding="utf-8"?>
+<dgm:dataModel xmlns:dgm="http://schemas.openxmlformats.org/drawingml/2006/diagram" xmlns:a="http://schemas.openxmlformats.org/drawingml/2006/main">
+  <dgm:ptLst>
+    <dgm:pt modelId="{58ECF0E7-2D07-46EA-B88E-29627DE38E1C}" type="doc">
+      <dgm:prSet loTypeId="urn:microsoft.com/office/officeart/2005/8/layout/hierarchy1" loCatId="hierarchy" qsTypeId="urn:microsoft.com/office/officeart/2005/8/quickstyle/simple1" qsCatId="simple" csTypeId="urn:microsoft.com/office/officeart/2005/8/colors/accent1_2" csCatId="accent1" phldr="1"/>
+      <dgm:spPr/>
+      <dgm:t>
+        <a:bodyPr/>
+        <a:lstStyle/>
+        <a:p>
+          <a:endParaRPr lang="en-US"/>
+        </a:p>
+      </dgm:t>
+    </dgm:pt>
+    <dgm:pt modelId="{20BD8376-FB98-4D98-92F0-59E3072302F7}">
+      <dgm:prSet/>
+      <dgm:spPr/>
+      <dgm:t>
+        <a:bodyPr/>
+        <a:lstStyle/>
+        <a:p>
+          <a:r>
+            <a:rPr lang="en-US"/>
+            <a:t>CSC 102 Project</a:t>
+          </a:r>
+        </a:p>
+      </dgm:t>
+    </dgm:pt>
+    <dgm:pt modelId="{040ADF94-66D6-40A3-8F3B-5D112529259C}" type="parTrans" cxnId="{C4F90957-6688-4FF9-834A-6ED7567A5E69}">
+      <dgm:prSet/>
+      <dgm:spPr/>
+      <dgm:t>
+        <a:bodyPr/>
+        <a:lstStyle/>
+        <a:p>
+          <a:endParaRPr lang="en-US"/>
+        </a:p>
+      </dgm:t>
+    </dgm:pt>
+    <dgm:pt modelId="{7043D0B5-EA62-4B9B-9202-63E200578DE7}" type="sibTrans" cxnId="{C4F90957-6688-4FF9-834A-6ED7567A5E69}">
+      <dgm:prSet/>
+      <dgm:spPr/>
+      <dgm:t>
+        <a:bodyPr/>
+        <a:lstStyle/>
+        <a:p>
+          <a:endParaRPr lang="en-US"/>
+        </a:p>
+      </dgm:t>
+    </dgm:pt>
+    <dgm:pt modelId="{564D4F6F-3CD5-413B-9AE9-4D48ED8AA9D6}">
+      <dgm:prSet/>
+      <dgm:spPr/>
+      <dgm:t>
+        <a:bodyPr/>
+        <a:lstStyle/>
+        <a:p>
+          <a:r>
+            <a:rPr lang="en-US" dirty="0"/>
+            <a:t>Week 1</a:t>
+          </a:r>
+        </a:p>
+      </dgm:t>
+    </dgm:pt>
+    <dgm:pt modelId="{59370EAB-32CF-479A-9221-0DF8B65FD209}" type="parTrans" cxnId="{AFE8EAA6-C597-40E8-913B-9A6B90BED707}">
+      <dgm:prSet/>
+      <dgm:spPr/>
+      <dgm:t>
+        <a:bodyPr/>
+        <a:lstStyle/>
+        <a:p>
+          <a:endParaRPr lang="en-US"/>
+        </a:p>
+      </dgm:t>
+    </dgm:pt>
+    <dgm:pt modelId="{F0A052FC-6E48-4711-AC8A-695D5CF92743}" type="sibTrans" cxnId="{AFE8EAA6-C597-40E8-913B-9A6B90BED707}">
+      <dgm:prSet/>
+      <dgm:spPr/>
+      <dgm:t>
+        <a:bodyPr/>
+        <a:lstStyle/>
+        <a:p>
+          <a:endParaRPr lang="en-US"/>
+        </a:p>
+      </dgm:t>
+    </dgm:pt>
+    <dgm:pt modelId="{0EB65578-6CD1-4518-B95F-E15712F8F984}" type="pres">
+      <dgm:prSet presAssocID="{58ECF0E7-2D07-46EA-B88E-29627DE38E1C}" presName="hierChild1" presStyleCnt="0">
+        <dgm:presLayoutVars>
+          <dgm:chPref val="1"/>
+          <dgm:dir/>
+          <dgm:animOne val="branch"/>
+          <dgm:animLvl val="lvl"/>
+          <dgm:resizeHandles/>
+        </dgm:presLayoutVars>
+      </dgm:prSet>
+      <dgm:spPr/>
+    </dgm:pt>
+    <dgm:pt modelId="{82C5CC7E-7AF0-4BE4-9CF3-3F2448B7382E}" type="pres">
+      <dgm:prSet presAssocID="{20BD8376-FB98-4D98-92F0-59E3072302F7}" presName="hierRoot1" presStyleCnt="0"/>
+      <dgm:spPr/>
+    </dgm:pt>
+    <dgm:pt modelId="{4A2F50F3-F872-40A7-BB8E-9C73ECD271EF}" type="pres">
+      <dgm:prSet presAssocID="{20BD8376-FB98-4D98-92F0-59E3072302F7}" presName="composite" presStyleCnt="0"/>
+      <dgm:spPr/>
+    </dgm:pt>
+    <dgm:pt modelId="{BF20C25F-A260-4EEB-A8E2-4CA9271D0898}" type="pres">
+      <dgm:prSet presAssocID="{20BD8376-FB98-4D98-92F0-59E3072302F7}" presName="background" presStyleLbl="node0" presStyleIdx="0" presStyleCnt="2"/>
+      <dgm:spPr>
+        <a:solidFill>
+          <a:srgbClr val="7030A0"/>
+        </a:solidFill>
+        <a:ln>
+          <a:solidFill>
+            <a:schemeClr val="accent1"/>
+          </a:solidFill>
+        </a:ln>
+      </dgm:spPr>
+    </dgm:pt>
+    <dgm:pt modelId="{0681DDC5-E652-4EF6-BF08-29DF46EC0782}" type="pres">
+      <dgm:prSet presAssocID="{20BD8376-FB98-4D98-92F0-59E3072302F7}" presName="text" presStyleLbl="fgAcc0" presStyleIdx="0" presStyleCnt="2">
+        <dgm:presLayoutVars>
+          <dgm:chPref val="3"/>
+        </dgm:presLayoutVars>
+      </dgm:prSet>
+      <dgm:spPr/>
+    </dgm:pt>
+    <dgm:pt modelId="{95FFCACD-A59D-48D8-97DB-794BE6F9677A}" type="pres">
+      <dgm:prSet presAssocID="{20BD8376-FB98-4D98-92F0-59E3072302F7}" presName="hierChild2" presStyleCnt="0"/>
+      <dgm:spPr/>
+    </dgm:pt>
+    <dgm:pt modelId="{4481E75C-E921-40F0-9814-2F0C95AB60E4}" type="pres">
+      <dgm:prSet presAssocID="{564D4F6F-3CD5-413B-9AE9-4D48ED8AA9D6}" presName="hierRoot1" presStyleCnt="0"/>
+      <dgm:spPr/>
+    </dgm:pt>
+    <dgm:pt modelId="{4E4C0B67-68E6-4D03-BAE3-C0E2F1E91411}" type="pres">
+      <dgm:prSet presAssocID="{564D4F6F-3CD5-413B-9AE9-4D48ED8AA9D6}" presName="composite" presStyleCnt="0"/>
+      <dgm:spPr/>
+    </dgm:pt>
+    <dgm:pt modelId="{53CA464A-CA82-49F3-B898-93ACAC89C1AC}" type="pres">
+      <dgm:prSet presAssocID="{564D4F6F-3CD5-413B-9AE9-4D48ED8AA9D6}" presName="background" presStyleLbl="node0" presStyleIdx="1" presStyleCnt="2"/>
+      <dgm:spPr>
+        <a:solidFill>
+          <a:srgbClr val="7030A0"/>
+        </a:solidFill>
+      </dgm:spPr>
+    </dgm:pt>
+    <dgm:pt modelId="{AB34C719-311C-4F68-862A-578F38E4635F}" type="pres">
+      <dgm:prSet presAssocID="{564D4F6F-3CD5-413B-9AE9-4D48ED8AA9D6}" presName="text" presStyleLbl="fgAcc0" presStyleIdx="1" presStyleCnt="2">
+        <dgm:presLayoutVars>
+          <dgm:chPref val="3"/>
+        </dgm:presLayoutVars>
+      </dgm:prSet>
+      <dgm:spPr/>
+    </dgm:pt>
+    <dgm:pt modelId="{5649E5D0-158C-403F-ADE5-09B121BE71A7}" type="pres">
+      <dgm:prSet presAssocID="{564D4F6F-3CD5-413B-9AE9-4D48ED8AA9D6}" presName="hierChild2" presStyleCnt="0"/>
+      <dgm:spPr/>
+    </dgm:pt>
+  </dgm:ptLst>
+  <dgm:cxnLst>
+    <dgm:cxn modelId="{C4F90957-6688-4FF9-834A-6ED7567A5E69}" srcId="{58ECF0E7-2D07-46EA-B88E-29627DE38E1C}" destId="{20BD8376-FB98-4D98-92F0-59E3072302F7}" srcOrd="0" destOrd="0" parTransId="{040ADF94-66D6-40A3-8F3B-5D112529259C}" sibTransId="{7043D0B5-EA62-4B9B-9202-63E200578DE7}"/>
+    <dgm:cxn modelId="{5BDD6D9E-390F-4B5B-90CC-48C81A0941E9}" type="presOf" srcId="{20BD8376-FB98-4D98-92F0-59E3072302F7}" destId="{0681DDC5-E652-4EF6-BF08-29DF46EC0782}" srcOrd="0" destOrd="0" presId="urn:microsoft.com/office/officeart/2005/8/layout/hierarchy1"/>
+    <dgm:cxn modelId="{AFE8EAA6-C597-40E8-913B-9A6B90BED707}" srcId="{58ECF0E7-2D07-46EA-B88E-29627DE38E1C}" destId="{564D4F6F-3CD5-413B-9AE9-4D48ED8AA9D6}" srcOrd="1" destOrd="0" parTransId="{59370EAB-32CF-479A-9221-0DF8B65FD209}" sibTransId="{F0A052FC-6E48-4711-AC8A-695D5CF92743}"/>
+    <dgm:cxn modelId="{199B92CA-EF44-484C-B92C-BC7A181B71FE}" type="presOf" srcId="{564D4F6F-3CD5-413B-9AE9-4D48ED8AA9D6}" destId="{AB34C719-311C-4F68-862A-578F38E4635F}" srcOrd="0" destOrd="0" presId="urn:microsoft.com/office/officeart/2005/8/layout/hierarchy1"/>
+    <dgm:cxn modelId="{B1BA0ACB-48FA-49A5-AE3E-561053BA0FE4}" type="presOf" srcId="{58ECF0E7-2D07-46EA-B88E-29627DE38E1C}" destId="{0EB65578-6CD1-4518-B95F-E15712F8F984}" srcOrd="0" destOrd="0" presId="urn:microsoft.com/office/officeart/2005/8/layout/hierarchy1"/>
+    <dgm:cxn modelId="{095A60B0-C57E-4CD8-9B80-68595DA38E06}" type="presParOf" srcId="{0EB65578-6CD1-4518-B95F-E15712F8F984}" destId="{82C5CC7E-7AF0-4BE4-9CF3-3F2448B7382E}" srcOrd="0" destOrd="0" presId="urn:microsoft.com/office/officeart/2005/8/layout/hierarchy1"/>
+    <dgm:cxn modelId="{33011ACB-7A0F-4366-B57E-35EE366CB8D2}" type="presParOf" srcId="{82C5CC7E-7AF0-4BE4-9CF3-3F2448B7382E}" destId="{4A2F50F3-F872-40A7-BB8E-9C73ECD271EF}" srcOrd="0" destOrd="0" presId="urn:microsoft.com/office/officeart/2005/8/layout/hierarchy1"/>
+    <dgm:cxn modelId="{4F527F04-C4A0-4784-8BED-6710DCABED40}" type="presParOf" srcId="{4A2F50F3-F872-40A7-BB8E-9C73ECD271EF}" destId="{BF20C25F-A260-4EEB-A8E2-4CA9271D0898}" srcOrd="0" destOrd="0" presId="urn:microsoft.com/office/officeart/2005/8/layout/hierarchy1"/>
+    <dgm:cxn modelId="{F357E702-DC7C-4557-A007-2CF53EBB8958}" type="presParOf" srcId="{4A2F50F3-F872-40A7-BB8E-9C73ECD271EF}" destId="{0681DDC5-E652-4EF6-BF08-29DF46EC0782}" srcOrd="1" destOrd="0" presId="urn:microsoft.com/office/officeart/2005/8/layout/hierarchy1"/>
+    <dgm:cxn modelId="{9A7EFE10-7E77-4B50-862B-06DE30311CC4}" type="presParOf" srcId="{82C5CC7E-7AF0-4BE4-9CF3-3F2448B7382E}" destId="{95FFCACD-A59D-48D8-97DB-794BE6F9677A}" srcOrd="1" destOrd="0" presId="urn:microsoft.com/office/officeart/2005/8/layout/hierarchy1"/>
+    <dgm:cxn modelId="{96C655FC-EFBD-458C-8604-7321A14668FD}" type="presParOf" srcId="{0EB65578-6CD1-4518-B95F-E15712F8F984}" destId="{4481E75C-E921-40F0-9814-2F0C95AB60E4}" srcOrd="1" destOrd="0" presId="urn:microsoft.com/office/officeart/2005/8/layout/hierarchy1"/>
+    <dgm:cxn modelId="{B8DADFB3-B617-4A0F-816B-9B89DEB9C6C0}" type="presParOf" srcId="{4481E75C-E921-40F0-9814-2F0C95AB60E4}" destId="{4E4C0B67-68E6-4D03-BAE3-C0E2F1E91411}" srcOrd="0" destOrd="0" presId="urn:microsoft.com/office/officeart/2005/8/layout/hierarchy1"/>
+    <dgm:cxn modelId="{19FC62AD-CE45-4879-A753-E831843F7B97}" type="presParOf" srcId="{4E4C0B67-68E6-4D03-BAE3-C0E2F1E91411}" destId="{53CA464A-CA82-49F3-B898-93ACAC89C1AC}" srcOrd="0" destOrd="0" presId="urn:microsoft.com/office/officeart/2005/8/layout/hierarchy1"/>
+    <dgm:cxn modelId="{2DDF9832-BF7D-4C00-B438-DC5DD288000D}" type="presParOf" srcId="{4E4C0B67-68E6-4D03-BAE3-C0E2F1E91411}" destId="{AB34C719-311C-4F68-862A-578F38E4635F}" srcOrd="1" destOrd="0" presId="urn:microsoft.com/office/officeart/2005/8/layout/hierarchy1"/>
+    <dgm:cxn modelId="{8238424B-D692-4F9D-98F3-B588AAE21E5E}" type="presParOf" srcId="{4481E75C-E921-40F0-9814-2F0C95AB60E4}" destId="{5649E5D0-158C-403F-ADE5-09B121BE71A7}" srcOrd="1" destOrd="0" presId="urn:microsoft.com/office/officeart/2005/8/layout/hierarchy1"/>
+  </dgm:cxnLst>
+  <dgm:bg/>
+  <dgm:whole/>
+  <dgm:extLst>
+    <a:ext uri="http://schemas.microsoft.com/office/drawing/2008/diagram">
+      <dsp:dataModelExt xmlns:dsp="http://schemas.microsoft.com/office/drawing/2008/diagram" relId="rId6" minVer="http://schemas.openxmlformats.org/drawingml/2006/diagram"/>
+    </a:ext>
+  </dgm:extLst>
+</dgm:dataModel>
+</file>
+
+<file path=ppt/diagrams/drawing1.xml><?xml version="1.0" encoding="utf-8"?>
+<dsp:drawing xmlns:dgm="http://schemas.openxmlformats.org/drawingml/2006/diagram" xmlns:dsp="http://schemas.microsoft.com/office/drawing/2008/diagram" xmlns:a="http://schemas.openxmlformats.org/drawingml/2006/main">
+  <dsp:spTree>
+    <dsp:nvGrpSpPr>
+      <dsp:cNvPr id="0" name=""/>
+      <dsp:cNvGrpSpPr/>
+    </dsp:nvGrpSpPr>
+    <dsp:grpSpPr/>
+    <dsp:sp modelId="{BF20C25F-A260-4EEB-A8E2-4CA9271D0898}">
+      <dsp:nvSpPr>
+        <dsp:cNvPr id="0" name=""/>
+        <dsp:cNvSpPr/>
+      </dsp:nvSpPr>
+      <dsp:spPr>
+        <a:xfrm>
+          <a:off x="134291" y="612"/>
+          <a:ext cx="4332795" cy="2751325"/>
+        </a:xfrm>
+        <a:prstGeom prst="roundRect">
+          <a:avLst>
+            <a:gd name="adj" fmla="val 10000"/>
+          </a:avLst>
+        </a:prstGeom>
+        <a:solidFill>
+          <a:srgbClr val="7030A0"/>
+        </a:solidFill>
+        <a:ln w="12700" cap="flat" cmpd="sng" algn="ctr">
+          <a:solidFill>
+            <a:schemeClr val="accent1"/>
+          </a:solidFill>
+          <a:prstDash val="solid"/>
+          <a:miter lim="800000"/>
+        </a:ln>
+        <a:effectLst/>
+      </dsp:spPr>
+      <dsp:style>
+        <a:lnRef idx="2">
+          <a:scrgbClr r="0" g="0" b="0"/>
+        </a:lnRef>
+        <a:fillRef idx="1">
+          <a:scrgbClr r="0" g="0" b="0"/>
+        </a:fillRef>
+        <a:effectRef idx="0">
+          <a:scrgbClr r="0" g="0" b="0"/>
+        </a:effectRef>
+        <a:fontRef idx="minor">
+          <a:schemeClr val="lt1"/>
+        </a:fontRef>
+      </dsp:style>
+    </dsp:sp>
+    <dsp:sp modelId="{0681DDC5-E652-4EF6-BF08-29DF46EC0782}">
+      <dsp:nvSpPr>
+        <dsp:cNvPr id="0" name=""/>
+        <dsp:cNvSpPr/>
+      </dsp:nvSpPr>
+      <dsp:spPr>
+        <a:xfrm>
+          <a:off x="615713" y="457963"/>
+          <a:ext cx="4332795" cy="2751325"/>
+        </a:xfrm>
+        <a:prstGeom prst="roundRect">
+          <a:avLst>
+            <a:gd name="adj" fmla="val 10000"/>
+          </a:avLst>
+        </a:prstGeom>
+        <a:solidFill>
+          <a:schemeClr val="lt1">
+            <a:alpha val="90000"/>
+            <a:hueOff val="0"/>
+            <a:satOff val="0"/>
+            <a:lumOff val="0"/>
+            <a:alphaOff val="0"/>
+          </a:schemeClr>
+        </a:solidFill>
+        <a:ln w="12700" cap="flat" cmpd="sng" algn="ctr">
+          <a:solidFill>
+            <a:schemeClr val="accent1">
+              <a:hueOff val="0"/>
+              <a:satOff val="0"/>
+              <a:lumOff val="0"/>
+              <a:alphaOff val="0"/>
+            </a:schemeClr>
+          </a:solidFill>
+          <a:prstDash val="solid"/>
+          <a:miter lim="800000"/>
+        </a:ln>
+        <a:effectLst/>
+      </dsp:spPr>
+      <dsp:style>
+        <a:lnRef idx="2">
+          <a:scrgbClr r="0" g="0" b="0"/>
+        </a:lnRef>
+        <a:fillRef idx="1">
+          <a:scrgbClr r="0" g="0" b="0"/>
+        </a:fillRef>
+        <a:effectRef idx="0">
+          <a:scrgbClr r="0" g="0" b="0"/>
+        </a:effectRef>
+        <a:fontRef idx="minor"/>
+      </dsp:style>
+      <dsp:txBody>
+        <a:bodyPr spcFirstLastPara="0" vert="horz" wrap="square" lIns="247650" tIns="247650" rIns="247650" bIns="247650" numCol="1" spcCol="1270" anchor="ctr" anchorCtr="0">
+          <a:noAutofit/>
+        </a:bodyPr>
+        <a:lstStyle/>
+        <a:p>
+          <a:pPr marL="0" lvl="0" indent="0" algn="ctr" defTabSz="2889250">
+            <a:lnSpc>
+              <a:spcPct val="90000"/>
+            </a:lnSpc>
+            <a:spcBef>
+              <a:spcPct val="0"/>
+            </a:spcBef>
+            <a:spcAft>
+              <a:spcPct val="35000"/>
+            </a:spcAft>
+            <a:buNone/>
+          </a:pPr>
+          <a:r>
+            <a:rPr lang="en-US" sz="6500" kern="1200"/>
+            <a:t>CSC 102 Project</a:t>
+          </a:r>
+        </a:p>
+      </dsp:txBody>
+      <dsp:txXfrm>
+        <a:off x="696297" y="538547"/>
+        <a:ext cx="4171627" cy="2590157"/>
+      </dsp:txXfrm>
+    </dsp:sp>
+    <dsp:sp modelId="{53CA464A-CA82-49F3-B898-93ACAC89C1AC}">
+      <dsp:nvSpPr>
+        <dsp:cNvPr id="0" name=""/>
+        <dsp:cNvSpPr/>
+      </dsp:nvSpPr>
+      <dsp:spPr>
+        <a:xfrm>
+          <a:off x="5429930" y="612"/>
+          <a:ext cx="4332795" cy="2751325"/>
+        </a:xfrm>
+        <a:prstGeom prst="roundRect">
+          <a:avLst>
+            <a:gd name="adj" fmla="val 10000"/>
+          </a:avLst>
+        </a:prstGeom>
+        <a:solidFill>
+          <a:srgbClr val="7030A0"/>
+        </a:solidFill>
+        <a:ln w="12700" cap="flat" cmpd="sng" algn="ctr">
+          <a:solidFill>
+            <a:schemeClr val="lt1">
+              <a:hueOff val="0"/>
+              <a:satOff val="0"/>
+              <a:lumOff val="0"/>
+              <a:alphaOff val="0"/>
+            </a:schemeClr>
+          </a:solidFill>
+          <a:prstDash val="solid"/>
+          <a:miter lim="800000"/>
+        </a:ln>
+        <a:effectLst/>
+      </dsp:spPr>
+      <dsp:style>
+        <a:lnRef idx="2">
+          <a:scrgbClr r="0" g="0" b="0"/>
+        </a:lnRef>
+        <a:fillRef idx="1">
+          <a:scrgbClr r="0" g="0" b="0"/>
+        </a:fillRef>
+        <a:effectRef idx="0">
+          <a:scrgbClr r="0" g="0" b="0"/>
+        </a:effectRef>
+        <a:fontRef idx="minor">
+          <a:schemeClr val="lt1"/>
+        </a:fontRef>
+      </dsp:style>
+    </dsp:sp>
+    <dsp:sp modelId="{AB34C719-311C-4F68-862A-578F38E4635F}">
+      <dsp:nvSpPr>
+        <dsp:cNvPr id="0" name=""/>
+        <dsp:cNvSpPr/>
+      </dsp:nvSpPr>
+      <dsp:spPr>
+        <a:xfrm>
+          <a:off x="5911352" y="457963"/>
+          <a:ext cx="4332795" cy="2751325"/>
+        </a:xfrm>
+        <a:prstGeom prst="roundRect">
+          <a:avLst>
+            <a:gd name="adj" fmla="val 10000"/>
+          </a:avLst>
+        </a:prstGeom>
+        <a:solidFill>
+          <a:schemeClr val="lt1">
+            <a:alpha val="90000"/>
+            <a:hueOff val="0"/>
+            <a:satOff val="0"/>
+            <a:lumOff val="0"/>
+            <a:alphaOff val="0"/>
+          </a:schemeClr>
+        </a:solidFill>
+        <a:ln w="12700" cap="flat" cmpd="sng" algn="ctr">
+          <a:solidFill>
+            <a:schemeClr val="accent1">
+              <a:hueOff val="0"/>
+              <a:satOff val="0"/>
+              <a:lumOff val="0"/>
+              <a:alphaOff val="0"/>
+            </a:schemeClr>
+          </a:solidFill>
+          <a:prstDash val="solid"/>
+          <a:miter lim="800000"/>
+        </a:ln>
+        <a:effectLst/>
+      </dsp:spPr>
+      <dsp:style>
+        <a:lnRef idx="2">
+          <a:scrgbClr r="0" g="0" b="0"/>
+        </a:lnRef>
+        <a:fillRef idx="1">
+          <a:scrgbClr r="0" g="0" b="0"/>
+        </a:fillRef>
+        <a:effectRef idx="0">
+          <a:scrgbClr r="0" g="0" b="0"/>
+        </a:effectRef>
+        <a:fontRef idx="minor"/>
+      </dsp:style>
+      <dsp:txBody>
+        <a:bodyPr spcFirstLastPara="0" vert="horz" wrap="square" lIns="247650" tIns="247650" rIns="247650" bIns="247650" numCol="1" spcCol="1270" anchor="ctr" anchorCtr="0">
+          <a:noAutofit/>
+        </a:bodyPr>
+        <a:lstStyle/>
+        <a:p>
+          <a:pPr marL="0" lvl="0" indent="0" algn="ctr" defTabSz="2889250">
+            <a:lnSpc>
+              <a:spcPct val="90000"/>
+            </a:lnSpc>
+            <a:spcBef>
+              <a:spcPct val="0"/>
+            </a:spcBef>
+            <a:spcAft>
+              <a:spcPct val="35000"/>
+            </a:spcAft>
+            <a:buNone/>
+          </a:pPr>
+          <a:r>
+            <a:rPr lang="en-US" sz="6500" kern="1200" dirty="0"/>
+            <a:t>Week 1</a:t>
+          </a:r>
+        </a:p>
+      </dsp:txBody>
+      <dsp:txXfrm>
+        <a:off x="5991936" y="538547"/>
+        <a:ext cx="4171627" cy="2590157"/>
+      </dsp:txXfrm>
+    </dsp:sp>
+  </dsp:spTree>
+</dsp:drawing>
+</file>
+
+<file path=ppt/diagrams/layout1.xml><?xml version="1.0" encoding="utf-8"?>
+<dgm:layoutDef xmlns:dgm="http://schemas.openxmlformats.org/drawingml/2006/diagram" xmlns:a="http://schemas.openxmlformats.org/drawingml/2006/main" uniqueId="urn:microsoft.com/office/officeart/2005/8/layout/hierarchy1">
+  <dgm:title val=""/>
+  <dgm:desc val=""/>
+  <dgm:catLst>
+    <dgm:cat type="hierarchy" pri="2000"/>
+  </dgm:catLst>
+  <dgm:sampData>
+    <dgm:dataModel>
+      <dgm:ptLst>
+        <dgm:pt modelId="0" type="doc"/>
+        <dgm:pt modelId="1">
+          <dgm:prSet phldr="1"/>
+        </dgm:pt>
+        <dgm:pt modelId="2">
+          <dgm:prSet phldr="1"/>
+        </dgm:pt>
+        <dgm:pt modelId="21">
+          <dgm:prSet phldr="1"/>
+        </dgm:pt>
+        <dgm:pt modelId="22">
+          <dgm:prSet phldr="1"/>
+        </dgm:pt>
+        <dgm:pt modelId="3">
+          <dgm:prSet phldr="1"/>
+        </dgm:pt>
+        <dgm:pt modelId="31">
+          <dgm:prSet phldr="1"/>
+        </dgm:pt>
+      </dgm:ptLst>
+      <dgm:cxnLst>
+        <dgm:cxn modelId="4" srcId="0" destId="1" srcOrd="0" destOrd="0"/>
+        <dgm:cxn modelId="5" srcId="1" destId="2" srcOrd="0" destOrd="0"/>
+        <dgm:cxn modelId="6" srcId="1" destId="3" srcOrd="1" destOrd="0"/>
+        <dgm:cxn modelId="23" srcId="2" destId="21" srcOrd="0" destOrd="0"/>
+        <dgm:cxn modelId="24" srcId="2" destId="22" srcOrd="1" destOrd="0"/>
+        <dgm:cxn modelId="33" srcId="3" destId="31" srcOrd="0" destOrd="0"/>
+      </dgm:cxnLst>
+      <dgm:bg/>
+      <dgm:whole/>
+    </dgm:dataModel>
+  </dgm:sampData>
+  <dgm:styleData>
+    <dgm:dataModel>
+      <dgm:ptLst>
+        <dgm:pt modelId="0" type="doc"/>
+        <dgm:pt modelId="1"/>
+        <dgm:pt modelId="11"/>
+        <dgm:pt modelId="12"/>
+      </dgm:ptLst>
+      <dgm:cxnLst>
+        <dgm:cxn modelId="2" srcId="0" destId="1" srcOrd="0" destOrd="0"/>
+        <dgm:cxn modelId="13" srcId="1" destId="11" srcOrd="0" destOrd="0"/>
+        <dgm:cxn modelId="14" srcId="1" destId="12" srcOrd="1" destOrd="0"/>
+      </dgm:cxnLst>
+      <dgm:bg/>
+      <dgm:whole/>
+    </dgm:dataModel>
+  </dgm:styleData>
+  <dgm:clrData>
+    <dgm:dataModel>
+      <dgm:ptLst>
+        <dgm:pt modelId="0" type="doc"/>
+        <dgm:pt modelId="1"/>
+        <dgm:pt modelId="2"/>
+        <dgm:pt modelId="21"/>
+        <dgm:pt modelId="211"/>
+        <dgm:pt modelId="3"/>
+        <dgm:pt modelId="31"/>
+        <dgm:pt modelId="311"/>
+      </dgm:ptLst>
+      <dgm:cxnLst>
+        <dgm:cxn modelId="4" srcId="0" destId="1" srcOrd="0" destOrd="0"/>
+        <dgm:cxn modelId="5" srcId="1" destId="2" srcOrd="0" destOrd="0"/>
+        <dgm:cxn modelId="6" srcId="1" destId="3" srcOrd="1" destOrd="0"/>
+        <dgm:cxn modelId="23" srcId="2" destId="21" srcOrd="0" destOrd="0"/>
+        <dgm:cxn modelId="24" srcId="21" destId="211" srcOrd="0" destOrd="0"/>
+        <dgm:cxn modelId="33" srcId="3" destId="31" srcOrd="0" destOrd="0"/>
+        <dgm:cxn modelId="34" srcId="31" destId="311" srcOrd="0" destOrd="0"/>
+      </dgm:cxnLst>
+      <dgm:bg/>
+      <dgm:whole/>
+    </dgm:dataModel>
+  </dgm:clrData>
+  <dgm:layoutNode name="hierChild1">
+    <dgm:varLst>
+      <dgm:chPref val="1"/>
+      <dgm:dir/>
+      <dgm:animOne val="branch"/>
+      <dgm:animLvl val="lvl"/>
+      <dgm:resizeHandles/>
+    </dgm:varLst>
+    <dgm:choose name="Name0">
+      <dgm:if name="Name1" func="var" arg="dir" op="equ" val="norm">
+        <dgm:alg type="hierChild">
+          <dgm:param type="linDir" val="fromL"/>
+        </dgm:alg>
+      </dgm:if>
+      <dgm:else name="Name2">
+        <dgm:alg type="hierChild">
+          <dgm:param type="linDir" val="fromR"/>
+        </dgm:alg>
+      </dgm:else>
+    </dgm:choose>
+    <dgm:shape xmlns:r="http://schemas.openxmlformats.org/officeDocument/2006/relationships" r:blip="">
+      <dgm:adjLst/>
+    </dgm:shape>
+    <dgm:presOf/>
+    <dgm:constrLst>
+      <dgm:constr type="primFontSz" for="des" ptType="node" op="equ" val="65"/>
+      <dgm:constr type="w" for="des" forName="composite" refType="w"/>
+      <dgm:constr type="h" for="des" forName="composite" refType="w" refFor="des" refForName="composite" fact="0.667"/>
+      <dgm:constr type="w" for="des" forName="composite2" refType="w" refFor="des" refForName="composite"/>
+      <dgm:constr type="h" for="des" forName="composite2" refType="h" refFor="des" refForName="composite"/>
+      <dgm:constr type="w" for="des" forName="composite3" refType="w" refFor="des" refForName="composite"/>
+      <dgm:constr type="h" for="des" forName="composite3" refType="h" refFor="des" refForName="composite"/>
+      <dgm:constr type="w" for="des" forName="composite4" refType="w" refFor="des" refForName="composite"/>
+      <dgm:constr type="h" for="des" forName="composite4" refType="h" refFor="des" refForName="composite"/>
+      <dgm:constr type="w" for="des" forName="composite5" refType="w" refFor="des" refForName="composite"/>
+      <dgm:constr type="h" for="des" forName="composite5" refType="h" refFor="des" refForName="composite"/>
+      <dgm:constr type="sibSp" refType="w" refFor="des" refForName="composite" fact="0.1"/>
+      <dgm:constr type="sibSp" for="des" forName="hierChild2" refType="sibSp"/>
+      <dgm:constr type="sibSp" for="des" forName="hierChild3" refType="sibSp"/>
+      <dgm:constr type="sibSp" for="des" forName="hierChild4" refType="sibSp"/>
+      <dgm:constr type="sibSp" for="des" forName="hierChild5" refType="sibSp"/>
+      <dgm:constr type="sibSp" for="des" forName="hierChild6" refType="sibSp"/>
+      <dgm:constr type="sp" for="des" forName="hierRoot1" refType="h" refFor="des" refForName="composite" fact="0.25"/>
+      <dgm:constr type="sp" for="des" forName="hierRoot2" refType="sp" refFor="des" refForName="hierRoot1"/>
+      <dgm:constr type="sp" for="des" forName="hierRoot3" refType="sp" refFor="des" refForName="hierRoot1"/>
+      <dgm:constr type="sp" for="des" forName="hierRoot4" refType="sp" refFor="des" refForName="hierRoot1"/>
+      <dgm:constr type="sp" for="des" forName="hierRoot5" refType="sp" refFor="des" refForName="hierRoot1"/>
+    </dgm:constrLst>
+    <dgm:ruleLst/>
+    <dgm:forEach name="Name3" axis="ch">
+      <dgm:forEach name="Name4" axis="self" ptType="node">
+        <dgm:layoutNode name="hierRoot1">
+          <dgm:alg type="hierRoot"/>
+          <dgm:shape xmlns:r="http://schemas.openxmlformats.org/officeDocument/2006/relationships" r:blip="">
+            <dgm:adjLst/>
+          </dgm:shape>
+          <dgm:presOf/>
+          <dgm:constrLst>
+            <dgm:constr type="bendDist" for="des" ptType="parTrans" refType="sp" fact="0.5"/>
+          </dgm:constrLst>
+          <dgm:ruleLst/>
+          <dgm:layoutNode name="composite">
+            <dgm:alg type="composite"/>
+            <dgm:shape xmlns:r="http://schemas.openxmlformats.org/officeDocument/2006/relationships" r:blip="">
+              <dgm:adjLst/>
+            </dgm:shape>
+            <dgm:presOf/>
+            <dgm:constrLst>
+              <dgm:constr type="w" for="ch" forName="background" refType="w" fact="0.9"/>
+              <dgm:constr type="h" for="ch" forName="background" refType="w" refFor="ch" refForName="background" fact="0.635"/>
+              <dgm:constr type="t" for="ch" forName="background"/>
+              <dgm:constr type="l" for="ch" forName="background"/>
+              <dgm:constr type="w" for="ch" forName="text" refType="w" fact="0.9"/>
+              <dgm:constr type="h" for="ch" forName="text" refType="w" refFor="ch" refForName="text" fact="0.635"/>
+              <dgm:constr type="t" for="ch" forName="text" refType="w" fact="0.095"/>
+              <dgm:constr type="l" for="ch" forName="text" refType="w" fact="0.1"/>
+            </dgm:constrLst>
+            <dgm:ruleLst/>
+            <dgm:layoutNode name="background" styleLbl="node0" moveWith="text">
+              <dgm:alg type="sp"/>
+              <dgm:shape xmlns:r="http://schemas.openxmlformats.org/officeDocument/2006/relationships" type="roundRect" r:blip="">
+                <dgm:adjLst>
+                  <dgm:adj idx="1" val="0.1"/>
+                </dgm:adjLst>
+              </dgm:shape>
+              <dgm:presOf/>
+              <dgm:constrLst/>
+              <dgm:ruleLst/>
+            </dgm:layoutNode>
+            <dgm:layoutNode name="text" styleLbl="fgAcc0">
+              <dgm:varLst>
+                <dgm:chPref val="3"/>
+              </dgm:varLst>
+              <dgm:alg type="tx"/>
+              <dgm:shape xmlns:r="http://schemas.openxmlformats.org/officeDocument/2006/relationships" type="roundRect" r:blip="">
+                <dgm:adjLst>
+                  <dgm:adj idx="1" val="0.1"/>
+                </dgm:adjLst>
+              </dgm:shape>
+              <dgm:presOf axis="self"/>
+              <dgm:constrLst>
+                <dgm:constr type="tMarg" refType="primFontSz" fact="0.3"/>
+                <dgm:constr type="bMarg" refType="primFontSz" fact="0.3"/>
+                <dgm:constr type="lMarg" refType="primFontSz" fact="0.3"/>
+                <dgm:constr type="rMarg" refType="primFontSz" fact="0.3"/>
+              </dgm:constrLst>
+              <dgm:ruleLst>
+                <dgm:rule type="primFontSz" val="5" fact="NaN" max="NaN"/>
+              </dgm:ruleLst>
+            </dgm:layoutNode>
+          </dgm:layoutNode>
+          <dgm:layoutNode name="hierChild2">
+            <dgm:choose name="Name5">
+              <dgm:if name="Name6" func="var" arg="dir" op="equ" val="norm">
+                <dgm:alg type="hierChild">
+                  <dgm:param type="linDir" val="fromL"/>
+                </dgm:alg>
+              </dgm:if>
+              <dgm:else name="Name7">
+                <dgm:alg type="hierChild">
+                  <dgm:param type="linDir" val="fromR"/>
+                </dgm:alg>
+              </dgm:else>
+            </dgm:choose>
+            <dgm:shape xmlns:r="http://schemas.openxmlformats.org/officeDocument/2006/relationships" r:blip="">
+              <dgm:adjLst/>
+            </dgm:shape>
+            <dgm:presOf/>
+            <dgm:constrLst/>
+            <dgm:ruleLst/>
+            <dgm:forEach name="Name8" axis="ch">
+              <dgm:forEach name="Name9" axis="self" ptType="parTrans" cnt="1">
+                <dgm:layoutNode name="Name10">
+                  <dgm:alg type="conn">
+                    <dgm:param type="dim" val="1D"/>
+                    <dgm:param type="endSty" val="noArr"/>
+                    <dgm:param type="connRout" val="bend"/>
+                    <dgm:param type="bendPt" val="end"/>
+                    <dgm:param type="begPts" val="bCtr"/>
+                    <dgm:param type="endPts" val="tCtr"/>
+                    <dgm:param type="srcNode" val="background"/>
+                    <dgm:param type="dstNode" val="background2"/>
+                  </dgm:alg>
+                  <dgm:shape xmlns:r="http://schemas.openxmlformats.org/officeDocument/2006/relationships" type="conn" r:blip="" zOrderOff="-999">
+                    <dgm:adjLst/>
+                  </dgm:shape>
+                  <dgm:presOf axis="self"/>
+                  <dgm:constrLst>
+                    <dgm:constr type="begPad"/>
+                    <dgm:constr type="endPad"/>
+                  </dgm:constrLst>
+                  <dgm:ruleLst/>
+                </dgm:layoutNode>
+              </dgm:forEach>
+              <dgm:forEach name="Name11" axis="self" ptType="node">
+                <dgm:layoutNode name="hierRoot2">
+                  <dgm:alg type="hierRoot"/>
+                  <dgm:shape xmlns:r="http://schemas.openxmlformats.org/officeDocument/2006/relationships" r:blip="">
+                    <dgm:adjLst/>
+                  </dgm:shape>
+                  <dgm:presOf/>
+                  <dgm:constrLst>
+                    <dgm:constr type="bendDist" for="des" ptType="parTrans" refType="sp" fact="0.5"/>
+                  </dgm:constrLst>
+                  <dgm:ruleLst/>
+                  <dgm:layoutNode name="composite2">
+                    <dgm:alg type="composite"/>
+                    <dgm:shape xmlns:r="http://schemas.openxmlformats.org/officeDocument/2006/relationships" r:blip="">
+                      <dgm:adjLst/>
+                    </dgm:shape>
+                    <dgm:presOf/>
+                    <dgm:constrLst>
+                      <dgm:constr type="w" for="ch" forName="background2" refType="w" fact="0.9"/>
+                      <dgm:constr type="h" for="ch" forName="background2" refType="w" refFor="ch" refForName="background2" fact="0.635"/>
+                      <dgm:constr type="t" for="ch" forName="background2"/>
+                      <dgm:constr type="l" for="ch" forName="background2"/>
+                      <dgm:constr type="w" for="ch" forName="text2" refType="w" fact="0.9"/>
+                      <dgm:constr type="h" for="ch" forName="text2" refType="w" refFor="ch" refForName="text2" fact="0.635"/>
+                      <dgm:constr type="t" for="ch" forName="text2" refType="w" fact="0.095"/>
+                      <dgm:constr type="l" for="ch" forName="text2" refType="w" fact="0.1"/>
+                    </dgm:constrLst>
+                    <dgm:ruleLst/>
+                    <dgm:layoutNode name="background2" moveWith="text2">
+                      <dgm:alg type="sp"/>
+                      <dgm:shape xmlns:r="http://schemas.openxmlformats.org/officeDocument/2006/relationships" type="roundRect" r:blip="">
+                        <dgm:adjLst>
+                          <dgm:adj idx="1" val="0.1"/>
+                        </dgm:adjLst>
+                      </dgm:shape>
+                      <dgm:presOf/>
+                      <dgm:constrLst/>
+                      <dgm:ruleLst/>
+                    </dgm:layoutNode>
+                    <dgm:layoutNode name="text2" styleLbl="fgAcc2">
+                      <dgm:varLst>
+                        <dgm:chPref val="3"/>
+                      </dgm:varLst>
+                      <dgm:alg type="tx"/>
+                      <dgm:shape xmlns:r="http://schemas.openxmlformats.org/officeDocument/2006/relationships" type="roundRect" r:blip="">
+                        <dgm:adjLst>
+                          <dgm:adj idx="1" val="0.1"/>
+                        </dgm:adjLst>
+                      </dgm:shape>
+                      <dgm:presOf axis="self"/>
+                      <dgm:constrLst>
+                        <dgm:constr type="tMarg" refType="primFontSz" fact="0.3"/>
+                        <dgm:constr type="bMarg" refType="primFontSz" fact="0.3"/>
+                        <dgm:constr type="lMarg" refType="primFontSz" fact="0.3"/>
+                        <dgm:constr type="rMarg" refType="primFontSz" fact="0.3"/>
+                      </dgm:constrLst>
+                      <dgm:ruleLst>
+                        <dgm:rule type="primFontSz" val="5" fact="NaN" max="NaN"/>
+                      </dgm:ruleLst>
+                    </dgm:layoutNode>
+                  </dgm:layoutNode>
+                  <dgm:layoutNode name="hierChild3">
+                    <dgm:choose name="Name12">
+                      <dgm:if name="Name13" func="var" arg="dir" op="equ" val="norm">
+                        <dgm:alg type="hierChild">
+                          <dgm:param type="linDir" val="fromL"/>
+                        </dgm:alg>
+                      </dgm:if>
+                      <dgm:else name="Name14">
+                        <dgm:alg type="hierChild">
+                          <dgm:param type="linDir" val="fromR"/>
+                        </dgm:alg>
+                      </dgm:else>
+                    </dgm:choose>
+                    <dgm:shape xmlns:r="http://schemas.openxmlformats.org/officeDocument/2006/relationships" r:blip="">
+                      <dgm:adjLst/>
+                    </dgm:shape>
+                    <dgm:presOf/>
+                    <dgm:constrLst/>
+                    <dgm:ruleLst/>
+                    <dgm:forEach name="Name15" axis="ch">
+                      <dgm:forEach name="Name16" axis="self" ptType="parTrans" cnt="1">
+                        <dgm:layoutNode name="Name17">
+                          <dgm:alg type="conn">
+                            <dgm:param type="dim" val="1D"/>
+                            <dgm:param type="endSty" val="noArr"/>
+                            <dgm:param type="connRout" val="bend"/>
+                            <dgm:param type="bendPt" val="end"/>
+                            <dgm:param type="begPts" val="bCtr"/>
+                            <dgm:param type="endPts" val="tCtr"/>
+                            <dgm:param type="srcNode" val="background2"/>
+                            <dgm:param type="dstNode" val="background3"/>
+                          </dgm:alg>
+                          <dgm:shape xmlns:r="http://schemas.openxmlformats.org/officeDocument/2006/relationships" type="conn" r:blip="" zOrderOff="-999">
+                            <dgm:adjLst/>
+                          </dgm:shape>
+                          <dgm:presOf axis="self"/>
+                          <dgm:constrLst>
+                            <dgm:constr type="begPad"/>
+                            <dgm:constr type="endPad"/>
+                          </dgm:constrLst>
+                          <dgm:ruleLst/>
+                        </dgm:layoutNode>
+                      </dgm:forEach>
+                      <dgm:forEach name="Name18" axis="self" ptType="node">
+                        <dgm:layoutNode name="hierRoot3">
+                          <dgm:alg type="hierRoot"/>
+                          <dgm:shape xmlns:r="http://schemas.openxmlformats.org/officeDocument/2006/relationships" r:blip="">
+                            <dgm:adjLst/>
+                          </dgm:shape>
+                          <dgm:presOf/>
+                          <dgm:constrLst>
+                            <dgm:constr type="bendDist" for="des" ptType="parTrans" refType="sp" fact="0.5"/>
+                          </dgm:constrLst>
+                          <dgm:ruleLst/>
+                          <dgm:layoutNode name="composite3">
+                            <dgm:alg type="composite"/>
+                            <dgm:shape xmlns:r="http://schemas.openxmlformats.org/officeDocument/2006/relationships" r:blip="">
+                              <dgm:adjLst/>
+                            </dgm:shape>
+                            <dgm:presOf/>
+                            <dgm:constrLst>
+                              <dgm:constr type="w" for="ch" forName="background3" refType="w" fact="0.9"/>
+                              <dgm:constr type="h" for="ch" forName="background3" refType="w" refFor="ch" refForName="background3" fact="0.635"/>
+                              <dgm:constr type="t" for="ch" forName="background3"/>
+                              <dgm:constr type="l" for="ch" forName="background3"/>
+                              <dgm:constr type="w" for="ch" forName="text3" refType="w" fact="0.9"/>
+                              <dgm:constr type="h" for="ch" forName="text3" refType="w" refFor="ch" refForName="text3" fact="0.635"/>
+                              <dgm:constr type="t" for="ch" forName="text3" refType="w" fact="0.095"/>
+                              <dgm:constr type="l" for="ch" forName="text3" refType="w" fact="0.1"/>
+                            </dgm:constrLst>
+                            <dgm:ruleLst/>
+                            <dgm:layoutNode name="background3" moveWith="text3">
+                              <dgm:alg type="sp"/>
+                              <dgm:shape xmlns:r="http://schemas.openxmlformats.org/officeDocument/2006/relationships" type="roundRect" r:blip="">
+                                <dgm:adjLst>
+                                  <dgm:adj idx="1" val="0.1"/>
+                                </dgm:adjLst>
+                              </dgm:shape>
+                              <dgm:presOf/>
+                              <dgm:constrLst/>
+                              <dgm:ruleLst/>
+                            </dgm:layoutNode>
+                            <dgm:layoutNode name="text3" styleLbl="fgAcc3">
+                              <dgm:varLst>
+                                <dgm:chPref val="3"/>
+                              </dgm:varLst>
+                              <dgm:alg type="tx"/>
+                              <dgm:shape xmlns:r="http://schemas.openxmlformats.org/officeDocument/2006/relationships" type="roundRect" r:blip="">
+                                <dgm:adjLst>
+                                  <dgm:adj idx="1" val="0.1"/>
+                                </dgm:adjLst>
+                              </dgm:shape>
+                              <dgm:presOf axis="self"/>
+                              <dgm:constrLst>
+                                <dgm:constr type="tMarg" refType="primFontSz" fact="0.3"/>
+                                <dgm:constr type="bMarg" refType="primFontSz" fact="0.3"/>
+                                <dgm:constr type="lMarg" refType="primFontSz" fact="0.3"/>
+                                <dgm:constr type="rMarg" refType="primFontSz" fact="0.3"/>
+                              </dgm:constrLst>
+                              <dgm:ruleLst>
+                                <dgm:rule type="primFontSz" val="5" fact="NaN" max="NaN"/>
+                              </dgm:ruleLst>
+                            </dgm:layoutNode>
+                          </dgm:layoutNode>
+                          <dgm:layoutNode name="hierChild4">
+                            <dgm:choose name="Name19">
+                              <dgm:if name="Name20" func="var" arg="dir" op="equ" val="norm">
+                                <dgm:alg type="hierChild">
+                                  <dgm:param type="linDir" val="fromL"/>
+                                </dgm:alg>
+                              </dgm:if>
+                              <dgm:else name="Name21">
+                                <dgm:alg type="hierChild">
+                                  <dgm:param type="linDir" val="fromR"/>
+                                </dgm:alg>
+                              </dgm:else>
+                            </dgm:choose>
+                            <dgm:shape xmlns:r="http://schemas.openxmlformats.org/officeDocument/2006/relationships" r:blip="">
+                              <dgm:adjLst/>
+                            </dgm:shape>
+                            <dgm:presOf/>
+                            <dgm:constrLst/>
+                            <dgm:ruleLst/>
+                            <dgm:forEach name="repeat" axis="ch">
+                              <dgm:forEach name="Name22" axis="self" ptType="parTrans" cnt="1">
+                                <dgm:layoutNode name="Name23">
+                                  <dgm:choose name="Name24">
+                                    <dgm:if name="Name25" axis="self" func="depth" op="lte" val="4">
+                                      <dgm:alg type="conn">
+                                        <dgm:param type="dim" val="1D"/>
+                                        <dgm:param type="endSty" val="noArr"/>
+                                        <dgm:param type="connRout" val="bend"/>
+                                        <dgm:param type="bendPt" val="end"/>
+                                        <dgm:param type="begPts" val="bCtr"/>
+                                        <dgm:param type="endPts" val="tCtr"/>
+                                        <dgm:param type="srcNode" val="background3"/>
+                                        <dgm:param type="dstNode" val="background4"/>
+                                      </dgm:alg>
+                                    </dgm:if>
+                                    <dgm:else name="Name26">
+                                      <dgm:alg type="conn">
+                                        <dgm:param type="dim" val="1D"/>
+                                        <dgm:param type="endSty" val="noArr"/>
+                                        <dgm:param type="connRout" val="bend"/>
+                                        <dgm:param type="bendPt" val="end"/>
+                                        <dgm:param type="begPts" val="bCtr"/>
+                                        <dgm:param type="endPts" val="tCtr"/>
+                                        <dgm:param type="srcNode" val="background4"/>
+                                        <dgm:param type="dstNode" val="background4"/>
+                                      </dgm:alg>
+                                    </dgm:else>
+                                  </dgm:choose>
+                                  <dgm:shape xmlns:r="http://schemas.openxmlformats.org/officeDocument/2006/relationships" type="conn" r:blip="" zOrderOff="-999">
+                                    <dgm:adjLst/>
+                                  </dgm:shape>
+                                  <dgm:presOf axis="self"/>
+                                  <dgm:constrLst>
+                                    <dgm:constr type="begPad"/>
+                                    <dgm:constr type="endPad"/>
+                                  </dgm:constrLst>
+                                  <dgm:ruleLst/>
+                                </dgm:layoutNode>
+                              </dgm:forEach>
+                              <dgm:forEach name="Name27" axis="self" ptType="node">
+                                <dgm:layoutNode name="hierRoot4">
+                                  <dgm:alg type="hierRoot"/>
+                                  <dgm:shape xmlns:r="http://schemas.openxmlformats.org/officeDocument/2006/relationships" r:blip="">
+                                    <dgm:adjLst/>
+                                  </dgm:shape>
+                                  <dgm:presOf/>
+                                  <dgm:constrLst>
+                                    <dgm:constr type="bendDist" for="des" ptType="parTrans" refType="sp" fact="0.5"/>
+                                  </dgm:constrLst>
+                                  <dgm:ruleLst/>
+                                  <dgm:layoutNode name="composite4">
+                                    <dgm:alg type="composite"/>
+                                    <dgm:shape xmlns:r="http://schemas.openxmlformats.org/officeDocument/2006/relationships" r:blip="">
+                                      <dgm:adjLst/>
+                                    </dgm:shape>
+                                    <dgm:presOf/>
+                                    <dgm:constrLst>
+                                      <dgm:constr type="w" for="ch" forName="background4" refType="w" fact="0.9"/>
+                                      <dgm:constr type="h" for="ch" forName="background4" refType="w" refFor="ch" refForName="background4" fact="0.635"/>
+                                      <dgm:constr type="t" for="ch" forName="background4"/>
+                                      <dgm:constr type="l" for="ch" forName="background4"/>
+                                      <dgm:constr type="w" for="ch" forName="text4" refType="w" fact="0.9"/>
+                                      <dgm:constr type="h" for="ch" forName="text4" refType="w" refFor="ch" refForName="text4" fact="0.635"/>
+                                      <dgm:constr type="t" for="ch" forName="text4" refType="w" fact="0.095"/>
+                                      <dgm:constr type="l" for="ch" forName="text4" refType="w" fact="0.1"/>
+                                    </dgm:constrLst>
+                                    <dgm:ruleLst/>
+                                    <dgm:layoutNode name="background4" moveWith="text4">
+                                      <dgm:alg type="sp"/>
+                                      <dgm:shape xmlns:r="http://schemas.openxmlformats.org/officeDocument/2006/relationships" type="roundRect" r:blip="">
+                                        <dgm:adjLst>
+                                          <dgm:adj idx="1" val="0.1"/>
+                                        </dgm:adjLst>
+                                      </dgm:shape>
+                                      <dgm:presOf/>
+                                      <dgm:constrLst/>
+                                      <dgm:ruleLst/>
+                                    </dgm:layoutNode>
+                                    <dgm:layoutNode name="text4" styleLbl="fgAcc4">
+                                      <dgm:varLst>
+                                        <dgm:chPref val="3"/>
+                                      </dgm:varLst>
+                                      <dgm:alg type="tx"/>
+                                      <dgm:shape xmlns:r="http://schemas.openxmlformats.org/officeDocument/2006/relationships" type="roundRect" r:blip="">
+                                        <dgm:adjLst>
+                                          <dgm:adj idx="1" val="0.1"/>
+                                        </dgm:adjLst>
+                                      </dgm:shape>
+                                      <dgm:presOf axis="self"/>
+                                      <dgm:constrLst>
+                                        <dgm:constr type="tMarg" refType="primFontSz" fact="0.3"/>
+                                        <dgm:constr type="bMarg" refType="primFontSz" fact="0.3"/>
+                                        <dgm:constr type="lMarg" refType="primFontSz" fact="0.3"/>
+                                        <dgm:constr type="rMarg" refType="primFontSz" fact="0.3"/>
+                                      </dgm:constrLst>
+                                      <dgm:ruleLst>
+                                        <dgm:rule type="primFontSz" val="5" fact="NaN" max="NaN"/>
+                                      </dgm:ruleLst>
+                                    </dgm:layoutNode>
+                                  </dgm:layoutNode>
+                                  <dgm:layoutNode name="hierChild5">
+                                    <dgm:choose name="Name28">
+                                      <dgm:if name="Name29" func="var" arg="dir" op="equ" val="norm">
+                                        <dgm:alg type="hierChild">
+                                          <dgm:param type="linDir" val="fromL"/>
+                                        </dgm:alg>
+                                      </dgm:if>
+                                      <dgm:else name="Name30">
+                                        <dgm:alg type="hierChild">
+                                          <dgm:param type="linDir" val="fromR"/>
+                                        </dgm:alg>
+                                      </dgm:else>
+                                    </dgm:choose>
+                                    <dgm:shape xmlns:r="http://schemas.openxmlformats.org/officeDocument/2006/relationships" r:blip="">
+                                      <dgm:adjLst/>
+                                    </dgm:shape>
+                                    <dgm:presOf/>
+                                    <dgm:constrLst/>
+                                    <dgm:ruleLst/>
+                                    <dgm:forEach name="Name31" ref="repeat"/>
+                                  </dgm:layoutNode>
+                                </dgm:layoutNode>
+                              </dgm:forEach>
+                            </dgm:forEach>
+                          </dgm:layoutNode>
+                        </dgm:layoutNode>
+                      </dgm:forEach>
+                    </dgm:forEach>
+                  </dgm:layoutNode>
+                </dgm:layoutNode>
+              </dgm:forEach>
+            </dgm:forEach>
+          </dgm:layoutNode>
+        </dgm:layoutNode>
+      </dgm:forEach>
+    </dgm:forEach>
+  </dgm:layoutNode>
+</dgm:layoutDef>
+</file>
+
+<file path=ppt/diagrams/quickStyle1.xml><?xml version="1.0" encoding="utf-8"?>
+<dgm:styleDef xmlns:dgm="http://schemas.openxmlformats.org/drawingml/2006/diagram" xmlns:a="http://schemas.openxmlformats.org/drawingml/2006/main" uniqueId="urn:microsoft.com/office/officeart/2005/8/quickstyle/simple1">
+  <dgm:title val=""/>
+  <dgm:desc val=""/>
+  <dgm:catLst>
+    <dgm:cat type="simple" pri="10100"/>
+  </dgm:catLst>
+  <dgm:scene3d>
+    <a:camera prst="orthographicFront"/>
+    <a:lightRig rig="threePt" dir="t"/>
+  </dgm:scene3d>
+  <dgm:styleLbl name="node0">
+    <dgm:scene3d>
+      <a:camera prst="orthographicFront"/>
+      <a:lightRig rig="threePt" dir="t"/>
+    </dgm:scene3d>
+    <dgm:sp3d/>
+    <dgm:txPr/>
+    <dgm:style>
+      <a:lnRef idx="2">
+        <a:scrgbClr r="0" g="0" b="0"/>
+      </a:lnRef>
+      <a:fillRef idx="1">
+        <a:scrgbClr r="0" g="0" b="0"/>
+      </a:fillRef>
+      <a:effectRef idx="0">
+        <a:scrgbClr r="0" g="0" b="0"/>
+      </a:effectRef>
+      <a:fontRef idx="minor">
+        <a:schemeClr val="lt1"/>
+      </a:fontRef>
+    </dgm:style>
+  </dgm:styleLbl>
+  <dgm:styleLbl name="lnNode1">
+    <dgm:scene3d>
+      <a:camera prst="orthographicFront"/>
+      <a:lightRig rig="threePt" dir="t"/>
+    </dgm:scene3d>
+    <dgm:sp3d/>
+    <dgm:txPr/>
+    <dgm:style>
+      <a:lnRef idx="2">
+        <a:scrgbClr r="0" g="0" b="0"/>
+      </a:lnRef>
+      <a:fillRef idx="1">
+        <a:scrgbClr r="0" g="0" b="0"/>
+      </a:fillRef>
+      <a:effectRef idx="0">
+        <a:scrgbClr r="0" g="0" b="0"/>
+      </a:effectRef>
+      <a:fontRef idx="minor">
+        <a:schemeClr val="lt1"/>
+      </a:fontRef>
+    </dgm:style>
+  </dgm:styleLbl>
+  <dgm:styleLbl name="vennNode1">
+    <dgm:scene3d>
+      <a:camera prst="orthographicFront"/>
+      <a:lightRig rig="threePt" dir="t"/>
+    </dgm:scene3d>
+    <dgm:sp3d/>
+    <dgm:txPr/>
+    <dgm:style>
+      <a:lnRef idx="2">
+        <a:scrgbClr r="0" g="0" b="0"/>
+      </a:lnRef>
+      <a:fillRef idx="1">
+        <a:scrgbClr r="0" g="0" b="0"/>
+      </a:fillRef>
+      <a:effectRef idx="0">
+        <a:scrgbClr r="0" g="0" b="0"/>
+      </a:effectRef>
+      <a:fontRef idx="minor">
+        <a:schemeClr val="tx1"/>
+      </a:fontRef>
+    </dgm:style>
+  </dgm:styleLbl>
+  <dgm:styleLbl name="alignNode1">
+    <dgm:scene3d>
+      <a:camera prst="orthographicFront"/>
+      <a:lightRig rig="threePt" dir="t"/>
+    </dgm:scene3d>
+    <dgm:sp3d/>
+    <dgm:txPr/>
+    <dgm:style>
+      <a:lnRef idx="2">
+        <a:scrgbClr r="0" g="0" b="0"/>
+      </a:lnRef>
+      <a:fillRef idx="1">
+        <a:scrgbClr r="0" g="0" b="0"/>
+      </a:fillRef>
+      <a:effectRef idx="0">
+        <a:scrgbClr r="0" g="0" b="0"/>
+      </a:effectRef>
+      <a:fontRef idx="minor">
+        <a:schemeClr val="lt1"/>
+      </a:fontRef>
+    </dgm:style>
+  </dgm:styleLbl>
+  <dgm:styleLbl name="node1">
+    <dgm:scene3d>
+      <a:camera prst="orthographicFront"/>
+      <a:lightRig rig="threePt" dir="t"/>
+    </dgm:scene3d>
+    <dgm:sp3d/>
+    <dgm:txPr/>
+    <dgm:style>
+      <a:lnRef idx="2">
+        <a:scrgbClr r="0" g="0" b="0"/>
+      </a:lnRef>
+      <a:fillRef idx="1">
+        <a:scrgbClr r="0" g="0" b="0"/>
+      </a:fillRef>
+      <a:effectRef idx="0">
+        <a:scrgbClr r="0" g="0" b="0"/>
+      </a:effectRef>
+      <a:fontRef idx="minor">
+        <a:schemeClr val="lt1"/>
+      </a:fontRef>
+    </dgm:style>
+  </dgm:styleLbl>
+  <dgm:styleLbl name="node2">
+    <dgm:scene3d>
+      <a:camera prst="orthographicFront"/>
+      <a:lightRig rig="threePt" dir="t"/>
+    </dgm:scene3d>
+    <dgm:sp3d/>
+    <dgm:txPr/>
+    <dgm:style>
+      <a:lnRef idx="2">
+        <a:scrgbClr r="0" g="0" b="0"/>
+      </a:lnRef>
+      <a:fillRef idx="1">
+        <a:scrgbClr r="0" g="0" b="0"/>
+      </a:fillRef>
+      <a:effectRef idx="0">
+        <a:scrgbClr r="0" g="0" b="0"/>
+      </a:effectRef>
+      <a:fontRef idx="minor">
+        <a:schemeClr val="lt1"/>
+      </a:fontRef>
+    </dgm:style>
+  </dgm:styleLbl>
+  <dgm:styleLbl name="node3">
+    <dgm:scene3d>
+      <a:camera prst="orthographicFront"/>
+      <a:lightRig rig="threePt" dir="t"/>
+    </dgm:scene3d>
+    <dgm:sp3d/>
+    <dgm:txPr/>
+    <dgm:style>
+      <a:lnRef idx="2">
+        <a:scrgbClr r="0" g="0" b="0"/>
+      </a:lnRef>
+      <a:fillRef idx="1">
+        <a:scrgbClr r="0" g="0" b="0"/>
+      </a:fillRef>
+      <a:effectRef idx="0">
+        <a:scrgbClr r="0" g="0" b="0"/>
+      </a:effectRef>
+      <a:fontRef idx="minor">
+        <a:schemeClr val="lt1"/>
+      </a:fontRef>
+    </dgm:style>
+  </dgm:styleLbl>
+  <dgm:styleLbl name="node4">
+    <dgm:scene3d>
+      <a:camera prst="orthographicFront"/>
+      <a:lightRig rig="threePt" dir="t"/>
+    </dgm:scene3d>
+    <dgm:sp3d/>
+    <dgm:txPr/>
+    <dgm:style>
+      <a:lnRef idx="2">
+        <a:scrgbClr r="0" g="0" b="0"/>
+      </a:lnRef>
+      <a:fillRef idx="1">
+        <a:scrgbClr r="0" g="0" b="0"/>
+      </a:fillRef>
+      <a:effectRef idx="0">
+        <a:scrgbClr r="0" g="0" b="0"/>
+      </a:effectRef>
+      <a:fontRef idx="minor">
+        <a:schemeClr val="lt1"/>
+      </a:fontRef>
+    </dgm:style>
+  </dgm:styleLbl>
+  <dgm:styleLbl name="fgImgPlace1">
+    <dgm:scene3d>
+      <a:camera prst="orthographicFront"/>
+      <a:lightRig rig="threePt" dir="t"/>
+    </dgm:scene3d>
+    <dgm:sp3d/>
+    <dgm:txPr/>
+    <dgm:style>
+      <a:lnRef idx="2">
+        <a:scrgbClr r="0" g="0" b="0"/>
+      </a:lnRef>
+      <a:fillRef idx="1">
+        <a:scrgbClr r="0" g="0" b="0"/>
+      </a:fillRef>
+      <a:effectRef idx="0">
+        <a:scrgbClr r="0" g="0" b="0"/>
+      </a:effectRef>
+      <a:fontRef idx="minor"/>
+    </dgm:style>
+  </dgm:styleLbl>
+  <dgm:styleLbl name="alignImgPlace1">
+    <dgm:scene3d>
+      <a:camera prst="orthographicFront"/>
+      <a:lightRig rig="threePt" dir="t"/>
+    </dgm:scene3d>
+    <dgm:sp3d/>
+    <dgm:txPr/>
+    <dgm:style>
+      <a:lnRef idx="2">
+        <a:scrgbClr r="0" g="0" b="0"/>
+      </a:lnRef>
+      <a:fillRef idx="1">
+        <a:scrgbClr r="0" g="0" b="0"/>
+      </a:fillRef>
+      <a:effectRef idx="0">
+        <a:scrgbClr r="0" g="0" b="0"/>
+      </a:effectRef>
+      <a:fontRef idx="minor"/>
+    </dgm:style>
+  </dgm:styleLbl>
+  <dgm:styleLbl name="bgImgPlace1">
+    <dgm:scene3d>
+      <a:camera prst="orthographicFront"/>
+      <a:lightRig rig="threePt" dir="t"/>
+    </dgm:scene3d>
+    <dgm:sp3d/>
+    <dgm:txPr/>
+    <dgm:style>
+      <a:lnRef idx="2">
+        <a:scrgbClr r="0" g="0" b="0"/>
+      </a:lnRef>
+      <a:fillRef idx="1">
+        <a:scrgbClr r="0" g="0" b="0"/>
+      </a:fillRef>
+      <a:effectRef idx="0">
+        <a:scrgbClr r="0" g="0" b="0"/>
+      </a:effectRef>
+      <a:fontRef idx="minor"/>
+    </dgm:style>
+  </dgm:styleLbl>
+  <dgm:styleLbl name="sibTrans2D1">
+    <dgm:scene3d>
+      <a:camera prst="orthographicFront"/>
+      <a:lightRig rig="threePt" dir="t"/>
+    </dgm:scene3d>
+    <dgm:sp3d/>
+    <dgm:txPr/>
+    <dgm:style>
+      <a:lnRef idx="0">
+        <a:scrgbClr r="0" g="0" b="0"/>
+      </a:lnRef>
+      <a:fillRef idx="1">
+        <a:scrgbClr r="0" g="0" b="0"/>
+      </a:fillRef>
+      <a:effectRef idx="0">
+        <a:scrgbClr r="0" g="0" b="0"/>
+      </a:effectRef>
+      <a:fontRef idx="minor">
+        <a:schemeClr val="lt1"/>
+      </a:fontRef>
+    </dgm:style>
+  </dgm:styleLbl>
+  <dgm:styleLbl name="fgSibTrans2D1">
+    <dgm:scene3d>
+      <a:camera prst="orthographicFront"/>
+      <a:lightRig rig="threePt" dir="t"/>
+    </dgm:scene3d>
+    <dgm:sp3d/>
+    <dgm:txPr/>
+    <dgm:style>
+      <a:lnRef idx="0">
+        <a:scrgbClr r="0" g="0" b="0"/>
+      </a:lnRef>
+      <a:fillRef idx="1">
+        <a:scrgbClr r="0" g="0" b="0"/>
+      </a:fillRef>
+      <a:effectRef idx="0">
+        <a:scrgbClr r="0" g="0" b="0"/>
+      </a:effectRef>
+      <a:fontRef idx="minor">
+        <a:schemeClr val="lt1"/>
+      </a:fontRef>
+    </dgm:style>
+  </dgm:styleLbl>
+  <dgm:styleLbl name="bgSibTrans2D1">
+    <dgm:scene3d>
+      <a:camera prst="orthographicFront"/>
+      <a:lightRig rig="threePt" dir="t"/>
+    </dgm:scene3d>
+    <dgm:sp3d/>
+    <dgm:txPr/>
+    <dgm:style>
+      <a:lnRef idx="0">
+        <a:scrgbClr r="0" g="0" b="0"/>
+      </a:lnRef>
+      <a:fillRef idx="1">
+        <a:scrgbClr r="0" g="0" b="0"/>
+      </a:fillRef>
+      <a:effectRef idx="0">
+        <a:scrgbClr r="0" g="0" b="0"/>
+      </a:effectRef>
+      <a:fontRef idx="minor">
+        <a:schemeClr val="lt1"/>
+      </a:fontRef>
+    </dgm:style>
+  </dgm:styleLbl>
+  <dgm:styleLbl name="sibTrans1D1">
+    <dgm:scene3d>
+      <a:camera prst="orthographicFront"/>
+      <a:lightRig rig="threePt" dir="t"/>
+    </dgm:scene3d>
+    <dgm:sp3d/>
+    <dgm:txPr/>
+    <dgm:style>
+      <a:lnRef idx="1">
+        <a:scrgbClr r="0" g="0" b="0"/>
+      </a:lnRef>
+      <a:fillRef idx="0">
+        <a:scrgbClr r="0" g="0" b="0"/>
+      </a:fillRef>
+      <a:effectRef idx="0">
+        <a:scrgbClr r="0" g="0" b="0"/>
+      </a:effectRef>
+      <a:fontRef idx="minor"/>
+    </dgm:style>
+  </dgm:styleLbl>
+  <dgm:styleLbl name="callout">
+    <dgm:scene3d>
+      <a:camera prst="orthographicFront"/>
+      <a:lightRig rig="threePt" dir="t"/>
+    </dgm:scene3d>
+    <dgm:sp3d/>
+    <dgm:txPr/>
+    <dgm:style>
+      <a:lnRef idx="2">
+        <a:scrgbClr r="0" g="0" b="0"/>
+      </a:lnRef>
+      <a:fillRef idx="1">
+        <a:scrgbClr r="0" g="0" b="0"/>
+      </a:fillRef>
+      <a:effectRef idx="0">
+        <a:scrgbClr r="0" g="0" b="0"/>
+      </a:effectRef>
+      <a:fontRef idx="minor"/>
+    </dgm:style>
+  </dgm:styleLbl>
+  <dgm:styleLbl name="asst0">
+    <dgm:scene3d>
+      <a:camera prst="orthographicFront"/>
+      <a:lightRig rig="threePt" dir="t"/>
+    </dgm:scene3d>
+    <dgm:sp3d/>
+    <dgm:txPr/>
+    <dgm:style>
+      <a:lnRef idx="2">
+        <a:scrgbClr r="0" g="0" b="0"/>
+      </a:lnRef>
+      <a:fillRef idx="1">
+        <a:scrgbClr r="0" g="0" b="0"/>
+      </a:fillRef>
+      <a:effectRef idx="0">
+        <a:scrgbClr r="0" g="0" b="0"/>
+      </a:effectRef>
+      <a:fontRef idx="minor">
+        <a:schemeClr val="lt1"/>
+      </a:fontRef>
+    </dgm:style>
+  </dgm:styleLbl>
+  <dgm:styleLbl name="asst1">
+    <dgm:scene3d>
+      <a:camera prst="orthographicFront"/>
+      <a:lightRig rig="threePt" dir="t"/>
+    </dgm:scene3d>
+    <dgm:sp3d/>
+    <dgm:txPr/>
+    <dgm:style>
+      <a:lnRef idx="2">
+        <a:scrgbClr r="0" g="0" b="0"/>
+      </a:lnRef>
+      <a:fillRef idx="1">
+        <a:scrgbClr r="0" g="0" b="0"/>
+      </a:fillRef>
+      <a:effectRef idx="0">
+        <a:scrgbClr r="0" g="0" b="0"/>
+      </a:effectRef>
+      <a:fontRef idx="minor">
+        <a:schemeClr val="lt1"/>
+      </a:fontRef>
+    </dgm:style>
+  </dgm:styleLbl>
+  <dgm:styleLbl name="asst2">
+    <dgm:scene3d>
+      <a:camera prst="orthographicFront"/>
+      <a:lightRig rig="threePt" dir="t"/>
+    </dgm:scene3d>
+    <dgm:sp3d/>
+    <dgm:txPr/>
+    <dgm:style>
+      <a:lnRef idx="2">
+        <a:scrgbClr r="0" g="0" b="0"/>
+      </a:lnRef>
+      <a:fillRef idx="1">
+        <a:scrgbClr r="0" g="0" b="0"/>
+      </a:fillRef>
+      <a:effectRef idx="0">
+        <a:scrgbClr r="0" g="0" b="0"/>
+      </a:effectRef>
+      <a:fontRef idx="minor">
+        <a:schemeClr val="lt1"/>
+      </a:fontRef>
+    </dgm:style>
+  </dgm:styleLbl>
+  <dgm:styleLbl name="asst3">
+    <dgm:scene3d>
+      <a:camera prst="orthographicFront"/>
+      <a:lightRig rig="threePt" dir="t"/>
+    </dgm:scene3d>
+    <dgm:sp3d/>
+    <dgm:txPr/>
+    <dgm:style>
+      <a:lnRef idx="2">
+        <a:scrgbClr r="0" g="0" b="0"/>
+      </a:lnRef>
+      <a:fillRef idx="1">
+        <a:scrgbClr r="0" g="0" b="0"/>
+      </a:fillRef>
+      <a:effectRef idx="0">
+        <a:scrgbClr r="0" g="0" b="0"/>
+      </a:effectRef>
+      <a:fontRef idx="minor">
+        <a:schemeClr val="lt1"/>
+      </a:fontRef>
+    </dgm:style>
+  </dgm:styleLbl>
+  <dgm:styleLbl name="asst4">
+    <dgm:scene3d>
+      <a:camera prst="orthographicFront"/>
+      <a:lightRig rig="threePt" dir="t"/>
+    </dgm:scene3d>
+    <dgm:sp3d/>
+    <dgm:txPr/>
+    <dgm:style>
+      <a:lnRef idx="2">
+        <a:scrgbClr r="0" g="0" b="0"/>
+      </a:lnRef>
+      <a:fillRef idx="1">
+        <a:scrgbClr r="0" g="0" b="0"/>
+      </a:fillRef>
+      <a:effectRef idx="0">
+        <a:scrgbClr r="0" g="0" b="0"/>
+      </a:effectRef>
+      <a:fontRef idx="minor">
+        <a:schemeClr val="lt1"/>
+      </a:fontRef>
+    </dgm:style>
+  </dgm:styleLbl>
+  <dgm:styleLbl name="parChTrans2D1">
+    <dgm:scene3d>
+      <a:camera prst="orthographicFront"/>
+      <a:lightRig rig="threePt" dir="t"/>
+    </dgm:scene3d>
+    <dgm:sp3d/>
+    <dgm:txPr/>
+    <dgm:style>
+      <a:lnRef idx="2">
+        <a:scrgbClr r="0" g="0" b="0"/>
+      </a:lnRef>
+      <a:fillRef idx="1">
+        <a:scrgbClr r="0" g="0" b="0"/>
+      </a:fillRef>
+      <a:effectRef idx="0">
+        <a:scrgbClr r="0" g="0" b="0"/>
+      </a:effectRef>
+      <a:fontRef idx="minor">
+        <a:schemeClr val="lt1"/>
+      </a:fontRef>
+    </dgm:style>
+  </dgm:styleLbl>
+  <dgm:styleLbl name="parChTrans2D2">
+    <dgm:scene3d>
+      <a:camera prst="orthographicFront"/>
+      <a:lightRig rig="threePt" dir="t"/>
+    </dgm:scene3d>
+    <dgm:sp3d/>
+    <dgm:txPr/>
+    <dgm:style>
+      <a:lnRef idx="2">
+        <a:scrgbClr r="0" g="0" b="0"/>
+      </a:lnRef>
+      <a:fillRef idx="1">
+        <a:scrgbClr r="0" g="0" b="0"/>
+      </a:fillRef>
+      <a:effectRef idx="0">
+        <a:scrgbClr r="0" g="0" b="0"/>
+      </a:effectRef>
+      <a:fontRef idx="minor">
+        <a:schemeClr val="lt1"/>
+      </a:fontRef>
+    </dgm:style>
+  </dgm:styleLbl>
+  <dgm:styleLbl name="parChTrans2D3">
+    <dgm:scene3d>
+      <a:camera prst="orthographicFront"/>
+      <a:lightRig rig="threePt" dir="t"/>
+    </dgm:scene3d>
+    <dgm:sp3d/>
+    <dgm:txPr/>
+    <dgm:style>
+      <a:lnRef idx="2">
+        <a:scrgbClr r="0" g="0" b="0"/>
+      </a:lnRef>
+      <a:fillRef idx="1">
+        <a:scrgbClr r="0" g="0" b="0"/>
+      </a:fillRef>
+      <a:effectRef idx="0">
+        <a:scrgbClr r="0" g="0" b="0"/>
+      </a:effectRef>
+      <a:fontRef idx="minor">
+        <a:schemeClr val="lt1"/>
+      </a:fontRef>
+    </dgm:style>
+  </dgm:styleLbl>
+  <dgm:styleLbl name="parChTrans2D4">
+    <dgm:scene3d>
+      <a:camera prst="orthographicFront"/>
+      <a:lightRig rig="threePt" dir="t"/>
+    </dgm:scene3d>
+    <dgm:sp3d/>
+    <dgm:txPr/>
+    <dgm:style>
+      <a:lnRef idx="2">
+        <a:scrgbClr r="0" g="0" b="0"/>
+      </a:lnRef>
+      <a:fillRef idx="1">
+        <a:scrgbClr r="0" g="0" b="0"/>
+      </a:fillRef>
+      <a:effectRef idx="0">
+        <a:scrgbClr r="0" g="0" b="0"/>
+      </a:effectRef>
+      <a:fontRef idx="minor">
+        <a:schemeClr val="lt1"/>
+      </a:fontRef>
+    </dgm:style>
+  </dgm:styleLbl>
+  <dgm:styleLbl name="parChTrans1D1">
+    <dgm:scene3d>
+      <a:camera prst="orthographicFront"/>
+      <a:lightRig rig="threePt" dir="t"/>
+    </dgm:scene3d>
+    <dgm:sp3d/>
+    <dgm:txPr/>
+    <dgm:style>
+      <a:lnRef idx="2">
+        <a:scrgbClr r="0" g="0" b="0"/>
+      </a:lnRef>
+      <a:fillRef idx="0">
+        <a:scrgbClr r="0" g="0" b="0"/>
+      </a:fillRef>
+      <a:effectRef idx="0">
+        <a:scrgbClr r="0" g="0" b="0"/>
+      </a:effectRef>
+      <a:fontRef idx="minor"/>
+    </dgm:style>
+  </dgm:styleLbl>
+  <dgm:styleLbl name="parChTrans1D2">
+    <dgm:scene3d>
+      <a:camera prst="orthographicFront"/>
+      <a:lightRig rig="threePt" dir="t"/>
+    </dgm:scene3d>
+    <dgm:sp3d/>
+    <dgm:txPr/>
+    <dgm:style>
+      <a:lnRef idx="2">
+        <a:scrgbClr r="0" g="0" b="0"/>
+      </a:lnRef>
+      <a:fillRef idx="0">
+        <a:scrgbClr r="0" g="0" b="0"/>
+      </a:fillRef>
+      <a:effectRef idx="0">
+        <a:scrgbClr r="0" g="0" b="0"/>
+      </a:effectRef>
+      <a:fontRef idx="minor"/>
+    </dgm:style>
+  </dgm:styleLbl>
+  <dgm:styleLbl name="parChTrans1D3">
+    <dgm:scene3d>
+      <a:camera prst="orthographicFront"/>
+      <a:lightRig rig="threePt" dir="t"/>
+    </dgm:scene3d>
+    <dgm:sp3d/>
+    <dgm:txPr/>
+    <dgm:style>
+      <a:lnRef idx="2">
+        <a:scrgbClr r="0" g="0" b="0"/>
+      </a:lnRef>
+      <a:fillRef idx="0">
+        <a:scrgbClr r="0" g="0" b="0"/>
+      </a:fillRef>
+      <a:effectRef idx="0">
+        <a:scrgbClr r="0" g="0" b="0"/>
+      </a:effectRef>
+      <a:fontRef idx="minor"/>
+    </dgm:style>
+  </dgm:styleLbl>
+  <dgm:styleLbl name="parChTrans1D4">
+    <dgm:scene3d>
+      <a:camera prst="orthographicFront"/>
+      <a:lightRig rig="threePt" dir="t"/>
+    </dgm:scene3d>
+    <dgm:sp3d/>
+    <dgm:txPr/>
+    <dgm:style>
+      <a:lnRef idx="2">
+        <a:scrgbClr r="0" g="0" b="0"/>
+      </a:lnRef>
+      <a:fillRef idx="0">
+        <a:scrgbClr r="0" g="0" b="0"/>
+      </a:fillRef>
+      <a:effectRef idx="0">
+        <a:scrgbClr r="0" g="0" b="0"/>
+      </a:effectRef>
+      <a:fontRef idx="minor"/>
+    </dgm:style>
+  </dgm:styleLbl>
+  <dgm:styleLbl name="fgAcc1">
+    <dgm:scene3d>
+      <a:camera prst="orthographicFront"/>
+      <a:lightRig rig="threePt" dir="t"/>
+    </dgm:scene3d>
+    <dgm:sp3d/>
+    <dgm:txPr/>
+    <dgm:style>
+      <a:lnRef idx="2">
+        <a:scrgbClr r="0" g="0" b="0"/>
+      </a:lnRef>
+      <a:fillRef idx="1">
+        <a:scrgbClr r="0" g="0" b="0"/>
+      </a:fillRef>
+      <a:effectRef idx="0">
+        <a:scrgbClr r="0" g="0" b="0"/>
+      </a:effectRef>
+      <a:fontRef idx="minor"/>
+    </dgm:style>
+  </dgm:styleLbl>
+  <dgm:styleLbl name="conFgAcc1">
+    <dgm:scene3d>
+      <a:camera prst="orthographicFront"/>
+      <a:lightRig rig="threePt" dir="t"/>
+    </dgm:scene3d>
+    <dgm:sp3d/>
+    <dgm:txPr/>
+    <dgm:style>
+      <a:lnRef idx="2">
+        <a:scrgbClr r="0" g="0" b="0"/>
+      </a:lnRef>
+      <a:fillRef idx="1">
+        <a:scrgbClr r="0" g="0" b="0"/>
+      </a:fillRef>
+      <a:effectRef idx="0">
+        <a:scrgbClr r="0" g="0" b="0"/>
+      </a:effectRef>
+      <a:fontRef idx="minor"/>
+    </dgm:style>
+  </dgm:styleLbl>
+  <dgm:styleLbl name="alignAcc1">
+    <dgm:scene3d>
+      <a:camera prst="orthographicFront"/>
+      <a:lightRig rig="threePt" dir="t"/>
+    </dgm:scene3d>
+    <dgm:sp3d/>
+    <dgm:txPr/>
+    <dgm:style>
+      <a:lnRef idx="2">
+        <a:scrgbClr r="0" g="0" b="0"/>
+      </a:lnRef>
+      <a:fillRef idx="1">
+        <a:scrgbClr r="0" g="0" b="0"/>
+      </a:fillRef>
+      <a:effectRef idx="0">
+        <a:scrgbClr r="0" g="0" b="0"/>
+      </a:effectRef>
+      <a:fontRef idx="minor"/>
+    </dgm:style>
+  </dgm:styleLbl>
+  <dgm:styleLbl name="trAlignAcc1">
+    <dgm:scene3d>
+      <a:camera prst="orthographicFront"/>
+      <a:lightRig rig="threePt" dir="t"/>
+    </dgm:scene3d>
+    <dgm:sp3d/>
+    <dgm:txPr/>
+    <dgm:style>
+      <a:lnRef idx="1">
+        <a:scrgbClr r="0" g="0" b="0"/>
+      </a:lnRef>
+      <a:fillRef idx="1">
+        <a:scrgbClr r="0" g="0" b="0"/>
+      </a:fillRef>
+      <a:effectRef idx="0">
+        <a:scrgbClr r="0" g="0" b="0"/>
+      </a:effectRef>
+      <a:fontRef idx="minor"/>
+    </dgm:style>
+  </dgm:styleLbl>
+  <dgm:styleLbl name="bgAcc1">
+    <dgm:scene3d>
+      <a:camera prst="orthographicFront"/>
+      <a:lightRig rig="threePt" dir="t"/>
+    </dgm:scene3d>
+    <dgm:sp3d/>
+    <dgm:txPr/>
+    <dgm:style>
+      <a:lnRef idx="2">
+        <a:scrgbClr r="0" g="0" b="0"/>
+      </a:lnRef>
+      <a:fillRef idx="1">
+        <a:scrgbClr r="0" g="0" b="0"/>
+      </a:fillRef>
+      <a:effectRef idx="0">
+        <a:scrgbClr r="0" g="0" b="0"/>
+      </a:effectRef>
+      <a:fontRef idx="minor"/>
+    </dgm:style>
+  </dgm:styleLbl>
+  <dgm:styleLbl name="solidFgAcc1">
+    <dgm:scene3d>
+      <a:camera prst="orthographicFront"/>
+      <a:lightRig rig="threePt" dir="t"/>
+    </dgm:scene3d>
+    <dgm:sp3d/>
+    <dgm:txPr/>
+    <dgm:style>
+      <a:lnRef idx="2">
+        <a:scrgbClr r="0" g="0" b="0"/>
+      </a:lnRef>
+      <a:fillRef idx="1">
+        <a:scrgbClr r="0" g="0" b="0"/>
+      </a:fillRef>
+      <a:effectRef idx="0">
+        <a:scrgbClr r="0" g="0" b="0"/>
+      </a:effectRef>
+      <a:fontRef idx="minor"/>
+    </dgm:style>
+  </dgm:styleLbl>
+  <dgm:styleLbl name="solidAlignAcc1">
+    <dgm:scene3d>
+      <a:camera prst="orthographicFront"/>
+      <a:lightRig rig="threePt" dir="t"/>
+    </dgm:scene3d>
+    <dgm:sp3d/>
+    <dgm:txPr/>
+    <dgm:style>
+      <a:lnRef idx="2">
+        <a:scrgbClr r="0" g="0" b="0"/>
+      </a:lnRef>
+      <a:fillRef idx="1">
+        <a:scrgbClr r="0" g="0" b="0"/>
+      </a:fillRef>
+      <a:effectRef idx="0">
+        <a:scrgbClr r="0" g="0" b="0"/>
+      </a:effectRef>
+      <a:fontRef idx="minor"/>
+    </dgm:style>
+  </dgm:styleLbl>
+  <dgm:styleLbl name="solidBgAcc1">
+    <dgm:scene3d>
+      <a:camera prst="orthographicFront"/>
+      <a:lightRig rig="threePt" dir="t"/>
+    </dgm:scene3d>
+    <dgm:sp3d/>
+    <dgm:txPr/>
+    <dgm:style>
+      <a:lnRef idx="2">
+        <a:scrgbClr r="0" g="0" b="0"/>
+      </a:lnRef>
+      <a:fillRef idx="1">
+        <a:scrgbClr r="0" g="0" b="0"/>
+      </a:fillRef>
+      <a:effectRef idx="0">
+        <a:scrgbClr r="0" g="0" b="0"/>
+      </a:effectRef>
+      <a:fontRef idx="minor"/>
+    </dgm:style>
+  </dgm:styleLbl>
+  <dgm:styleLbl name="fgAccFollowNode1">
+    <dgm:scene3d>
+      <a:camera prst="orthographicFront"/>
+      <a:lightRig rig="threePt" dir="t"/>
+    </dgm:scene3d>
+    <dgm:sp3d/>
+    <dgm:txPr/>
+    <dgm:style>
+      <a:lnRef idx="2">
+        <a:scrgbClr r="0" g="0" b="0"/>
+      </a:lnRef>
+      <a:fillRef idx="1">
+        <a:scrgbClr r="0" g="0" b="0"/>
+      </a:fillRef>
+      <a:effectRef idx="0">
+        <a:scrgbClr r="0" g="0" b="0"/>
+      </a:effectRef>
+      <a:fontRef idx="minor"/>
+    </dgm:style>
+  </dgm:styleLbl>
+  <dgm:styleLbl name="alignAccFollowNode1">
+    <dgm:scene3d>
+      <a:camera prst="orthographicFront"/>
+      <a:lightRig rig="threePt" dir="t"/>
+    </dgm:scene3d>
+    <dgm:sp3d/>
+    <dgm:txPr/>
+    <dgm:style>
+      <a:lnRef idx="2">
+        <a:scrgbClr r="0" g="0" b="0"/>
+      </a:lnRef>
+      <a:fillRef idx="1">
+        <a:scrgbClr r="0" g="0" b="0"/>
+      </a:fillRef>
+      <a:effectRef idx="0">
+        <a:scrgbClr r="0" g="0" b="0"/>
+      </a:effectRef>
+      <a:fontRef idx="minor"/>
+    </dgm:style>
+  </dgm:styleLbl>
+  <dgm:styleLbl name="bgAccFollowNode1">
+    <dgm:scene3d>
+      <a:camera prst="orthographicFront"/>
+      <a:lightRig rig="threePt" dir="t"/>
+    </dgm:scene3d>
+    <dgm:sp3d/>
+    <dgm:txPr/>
+    <dgm:style>
+      <a:lnRef idx="2">
+        <a:scrgbClr r="0" g="0" b="0"/>
+      </a:lnRef>
+      <a:fillRef idx="1">
+        <a:scrgbClr r="0" g="0" b="0"/>
+      </a:fillRef>
+      <a:effectRef idx="0">
+        <a:scrgbClr r="0" g="0" b="0"/>
+      </a:effectRef>
+      <a:fontRef idx="minor"/>
+    </dgm:style>
+  </dgm:styleLbl>
+  <dgm:styleLbl name="fgAcc0">
+    <dgm:scene3d>
+      <a:camera prst="orthographicFront"/>
+      <a:lightRig rig="threePt" dir="t"/>
+    </dgm:scene3d>
+    <dgm:sp3d/>
+    <dgm:txPr/>
+    <dgm:style>
+      <a:lnRef idx="2">
+        <a:scrgbClr r="0" g="0" b="0"/>
+      </a:lnRef>
+      <a:fillRef idx="1">
+        <a:scrgbClr r="0" g="0" b="0"/>
+      </a:fillRef>
+      <a:effectRef idx="0">
+        <a:scrgbClr r="0" g="0" b="0"/>
+      </a:effectRef>
+      <a:fontRef idx="minor"/>
+    </dgm:style>
+  </dgm:styleLbl>
+  <dgm:styleLbl name="fgAcc2">
+    <dgm:scene3d>
+      <a:camera prst="orthographicFront"/>
+      <a:lightRig rig="threePt" dir="t"/>
+    </dgm:scene3d>
+    <dgm:sp3d/>
+    <dgm:txPr/>
+    <dgm:style>
+      <a:lnRef idx="2">
+        <a:scrgbClr r="0" g="0" b="0"/>
+      </a:lnRef>
+      <a:fillRef idx="1">
+        <a:scrgbClr r="0" g="0" b="0"/>
+      </a:fillRef>
+      <a:effectRef idx="0">
+        <a:scrgbClr r="0" g="0" b="0"/>
+      </a:effectRef>
+      <a:fontRef idx="minor"/>
+    </dgm:style>
+  </dgm:styleLbl>
+  <dgm:styleLbl name="fgAcc3">
+    <dgm:scene3d>
+      <a:camera prst="orthographicFront"/>
+      <a:lightRig rig="threePt" dir="t"/>
+    </dgm:scene3d>
+    <dgm:sp3d/>
+    <dgm:txPr/>
+    <dgm:style>
+      <a:lnRef idx="2">
+        <a:scrgbClr r="0" g="0" b="0"/>
+      </a:lnRef>
+      <a:fillRef idx="1">
+        <a:scrgbClr r="0" g="0" b="0"/>
+      </a:fillRef>
+      <a:effectRef idx="0">
+        <a:scrgbClr r="0" g="0" b="0"/>
+      </a:effectRef>
+      <a:fontRef idx="minor"/>
+    </dgm:style>
+  </dgm:styleLbl>
+  <dgm:styleLbl name="fgAcc4">
+    <dgm:scene3d>
+      <a:camera prst="orthographicFront"/>
+      <a:lightRig rig="threePt" dir="t"/>
+    </dgm:scene3d>
+    <dgm:sp3d/>
+    <dgm:txPr/>
+    <dgm:style>
+      <a:lnRef idx="2">
+        <a:scrgbClr r="0" g="0" b="0"/>
+      </a:lnRef>
+      <a:fillRef idx="1">
+        <a:scrgbClr r="0" g="0" b="0"/>
+      </a:fillRef>
+      <a:effectRef idx="0">
+        <a:scrgbClr r="0" g="0" b="0"/>
+      </a:effectRef>
+      <a:fontRef idx="minor"/>
+    </dgm:style>
+  </dgm:styleLbl>
+  <dgm:styleLbl name="bgShp">
+    <dgm:scene3d>
+      <a:camera prst="orthographicFront"/>
+      <a:lightRig rig="threePt" dir="t"/>
+    </dgm:scene3d>
+    <dgm:sp3d/>
+    <dgm:txPr/>
+    <dgm:style>
+      <a:lnRef idx="0">
+        <a:scrgbClr r="0" g="0" b="0"/>
+      </a:lnRef>
+      <a:fillRef idx="1">
+        <a:scrgbClr r="0" g="0" b="0"/>
+      </a:fillRef>
+      <a:effectRef idx="0">
+        <a:scrgbClr r="0" g="0" b="0"/>
+      </a:effectRef>
+      <a:fontRef idx="minor"/>
+    </dgm:style>
+  </dgm:styleLbl>
+  <dgm:styleLbl name="dkBgShp">
+    <dgm:scene3d>
+      <a:camera prst="orthographicFront"/>
+      <a:lightRig rig="threePt" dir="t"/>
+    </dgm:scene3d>
+    <dgm:sp3d/>
+    <dgm:txPr/>
+    <dgm:style>
+      <a:lnRef idx="0">
+        <a:scrgbClr r="0" g="0" b="0"/>
+      </a:lnRef>
+      <a:fillRef idx="1">
+        <a:scrgbClr r="0" g="0" b="0"/>
+      </a:fillRef>
+      <a:effectRef idx="0">
+        <a:scrgbClr r="0" g="0" b="0"/>
+      </a:effectRef>
+      <a:fontRef idx="minor"/>
+    </dgm:style>
+  </dgm:styleLbl>
+  <dgm:styleLbl name="trBgShp">
+    <dgm:scene3d>
+      <a:camera prst="orthographicFront"/>
+      <a:lightRig rig="threePt" dir="t"/>
+    </dgm:scene3d>
+    <dgm:sp3d/>
+    <dgm:txPr/>
+    <dgm:style>
+      <a:lnRef idx="0">
+        <a:scrgbClr r="0" g="0" b="0"/>
+      </a:lnRef>
+      <a:fillRef idx="1">
+        <a:scrgbClr r="0" g="0" b="0"/>
+      </a:fillRef>
+      <a:effectRef idx="0">
+        <a:scrgbClr r="0" g="0" b="0"/>
+      </a:effectRef>
+      <a:fontRef idx="minor"/>
+    </dgm:style>
+  </dgm:styleLbl>
+  <dgm:styleLbl name="fgShp">
+    <dgm:scene3d>
+      <a:camera prst="orthographicFront"/>
+      <a:lightRig rig="threePt" dir="t"/>
+    </dgm:scene3d>
+    <dgm:sp3d/>
+    <dgm:txPr/>
+    <dgm:style>
+      <a:lnRef idx="2">
+        <a:scrgbClr r="0" g="0" b="0"/>
+      </a:lnRef>
+      <a:fillRef idx="1">
+        <a:scrgbClr r="0" g="0" b="0"/>
+      </a:fillRef>
+      <a:effectRef idx="0">
+        <a:scrgbClr r="0" g="0" b="0"/>
+      </a:effectRef>
+      <a:fontRef idx="minor"/>
+    </dgm:style>
+  </dgm:styleLbl>
+  <dgm:styleLbl name="revTx">
+    <dgm:scene3d>
+      <a:camera prst="orthographicFront"/>
+      <a:lightRig rig="threePt" dir="t"/>
+    </dgm:scene3d>
+    <dgm:sp3d/>
+    <dgm:txPr/>
+    <dgm:style>
+      <a:lnRef idx="0">
+        <a:scrgbClr r="0" g="0" b="0"/>
+      </a:lnRef>
+      <a:fillRef idx="0">
+        <a:scrgbClr r="0" g="0" b="0"/>
+      </a:fillRef>
+      <a:effectRef idx="0">
+        <a:scrgbClr r="0" g="0" b="0"/>
+      </a:effectRef>
+      <a:fontRef idx="minor"/>
+    </dgm:style>
+  </dgm:styleLbl>
+</dgm:styleDef>
+</file>
+
 <file path=ppt/slideLayouts/slideLayout1.xml><?xml version="1.0" encoding="utf-8"?>
 <p:sldLayout xmlns:a="http://schemas.openxmlformats.org/drawingml/2006/main" xmlns:r="http://schemas.openxmlformats.org/officeDocument/2006/relationships" xmlns:p="http://schemas.openxmlformats.org/presentationml/2006/main" type="title" preserve="1">
   <p:cSld name="Title Slide">
@@ -263,7 +3054,7 @@
           <a:p>
             <a:fld id="{90901167-E67A-4F61-8B14-81AAC5036F18}" type="datetimeFigureOut">
               <a:rPr lang="en-NG" smtClean="0"/>
-              <a:t>03/04/2023</a:t>
+              <a:t>26/04/2023</a:t>
             </a:fld>
             <a:endParaRPr lang="en-NG"/>
           </a:p>
@@ -463,7 +3254,7 @@
           <a:p>
             <a:fld id="{90901167-E67A-4F61-8B14-81AAC5036F18}" type="datetimeFigureOut">
               <a:rPr lang="en-NG" smtClean="0"/>
-              <a:t>03/04/2023</a:t>
+              <a:t>26/04/2023</a:t>
             </a:fld>
             <a:endParaRPr lang="en-NG"/>
           </a:p>
@@ -673,7 +3464,7 @@
           <a:p>
             <a:fld id="{90901167-E67A-4F61-8B14-81AAC5036F18}" type="datetimeFigureOut">
               <a:rPr lang="en-NG" smtClean="0"/>
-              <a:t>03/04/2023</a:t>
+              <a:t>26/04/2023</a:t>
             </a:fld>
             <a:endParaRPr lang="en-NG"/>
           </a:p>
@@ -873,7 +3664,7 @@
           <a:p>
             <a:fld id="{90901167-E67A-4F61-8B14-81AAC5036F18}" type="datetimeFigureOut">
               <a:rPr lang="en-NG" smtClean="0"/>
-              <a:t>03/04/2023</a:t>
+              <a:t>26/04/2023</a:t>
             </a:fld>
             <a:endParaRPr lang="en-NG"/>
           </a:p>
@@ -1149,7 +3940,7 @@
           <a:p>
             <a:fld id="{90901167-E67A-4F61-8B14-81AAC5036F18}" type="datetimeFigureOut">
               <a:rPr lang="en-NG" smtClean="0"/>
-              <a:t>03/04/2023</a:t>
+              <a:t>26/04/2023</a:t>
             </a:fld>
             <a:endParaRPr lang="en-NG"/>
           </a:p>
@@ -1417,7 +4208,7 @@
           <a:p>
             <a:fld id="{90901167-E67A-4F61-8B14-81AAC5036F18}" type="datetimeFigureOut">
               <a:rPr lang="en-NG" smtClean="0"/>
-              <a:t>03/04/2023</a:t>
+              <a:t>26/04/2023</a:t>
             </a:fld>
             <a:endParaRPr lang="en-NG"/>
           </a:p>
@@ -1832,7 +4623,7 @@
           <a:p>
             <a:fld id="{90901167-E67A-4F61-8B14-81AAC5036F18}" type="datetimeFigureOut">
               <a:rPr lang="en-NG" smtClean="0"/>
-              <a:t>03/04/2023</a:t>
+              <a:t>26/04/2023</a:t>
             </a:fld>
             <a:endParaRPr lang="en-NG"/>
           </a:p>
@@ -1974,7 +4765,7 @@
           <a:p>
             <a:fld id="{90901167-E67A-4F61-8B14-81AAC5036F18}" type="datetimeFigureOut">
               <a:rPr lang="en-NG" smtClean="0"/>
-              <a:t>03/04/2023</a:t>
+              <a:t>26/04/2023</a:t>
             </a:fld>
             <a:endParaRPr lang="en-NG"/>
           </a:p>
@@ -2087,7 +4878,7 @@
           <a:p>
             <a:fld id="{90901167-E67A-4F61-8B14-81AAC5036F18}" type="datetimeFigureOut">
               <a:rPr lang="en-NG" smtClean="0"/>
-              <a:t>03/04/2023</a:t>
+              <a:t>26/04/2023</a:t>
             </a:fld>
             <a:endParaRPr lang="en-NG"/>
           </a:p>
@@ -2400,7 +5191,7 @@
           <a:p>
             <a:fld id="{90901167-E67A-4F61-8B14-81AAC5036F18}" type="datetimeFigureOut">
               <a:rPr lang="en-NG" smtClean="0"/>
-              <a:t>03/04/2023</a:t>
+              <a:t>26/04/2023</a:t>
             </a:fld>
             <a:endParaRPr lang="en-NG"/>
           </a:p>
@@ -2689,7 +5480,7 @@
           <a:p>
             <a:fld id="{90901167-E67A-4F61-8B14-81AAC5036F18}" type="datetimeFigureOut">
               <a:rPr lang="en-NG" smtClean="0"/>
-              <a:t>03/04/2023</a:t>
+              <a:t>26/04/2023</a:t>
             </a:fld>
             <a:endParaRPr lang="en-NG"/>
           </a:p>
@@ -2932,7 +5723,7 @@
           <a:p>
             <a:fld id="{90901167-E67A-4F61-8B14-81AAC5036F18}" type="datetimeFigureOut">
               <a:rPr lang="en-NG" smtClean="0"/>
-              <a:t>03/04/2023</a:t>
+              <a:t>26/04/2023</a:t>
             </a:fld>
             <a:endParaRPr lang="en-NG"/>
           </a:p>
@@ -3351,27 +6142,86 @@
       </p:grpSpPr>
       <p:sp>
         <p:nvSpPr>
-          <p:cNvPr id="4" name="Rectangle: Rounded Corners 3">
-            <a:extLst>
-              <a:ext uri="{FF2B5EF4-FFF2-40B4-BE49-F238E27FC236}">
-                <a16:creationId xmlns:a16="http://schemas.microsoft.com/office/drawing/2014/main" id="{D84EDAC8-37C8-8EBF-3F6F-B15ADC291794}"/>
+          <p:cNvPr id="2" name="Title 1">
+            <a:extLst>
+              <a:ext uri="{FF2B5EF4-FFF2-40B4-BE49-F238E27FC236}">
+                <a16:creationId xmlns:a16="http://schemas.microsoft.com/office/drawing/2014/main" id="{119F084D-5C83-97D9-9926-35172E029D4B}"/>
+              </a:ext>
+            </a:extLst>
+          </p:cNvPr>
+          <p:cNvSpPr>
+            <a:spLocks noGrp="1"/>
+          </p:cNvSpPr>
+          <p:nvPr>
+            <p:ph type="title"/>
+          </p:nvPr>
+        </p:nvSpPr>
+        <p:spPr/>
+        <p:txBody>
+          <a:bodyPr/>
+          <a:lstStyle/>
+          <a:p>
+            <a:endParaRPr lang="en-NG"/>
+          </a:p>
+        </p:txBody>
+      </p:sp>
+      <p:sp>
+        <p:nvSpPr>
+          <p:cNvPr id="3" name="Content Placeholder 2">
+            <a:extLst>
+              <a:ext uri="{FF2B5EF4-FFF2-40B4-BE49-F238E27FC236}">
+                <a16:creationId xmlns:a16="http://schemas.microsoft.com/office/drawing/2014/main" id="{53DB8521-87B3-8484-D476-879B8D5C41A9}"/>
+              </a:ext>
+            </a:extLst>
+          </p:cNvPr>
+          <p:cNvSpPr>
+            <a:spLocks noGrp="1"/>
+          </p:cNvSpPr>
+          <p:nvPr>
+            <p:ph idx="1"/>
+          </p:nvPr>
+        </p:nvSpPr>
+        <p:spPr/>
+        <p:txBody>
+          <a:bodyPr/>
+          <a:lstStyle/>
+          <a:p>
+            <a:endParaRPr lang="en-NG"/>
+          </a:p>
+        </p:txBody>
+      </p:sp>
+      <p:sp useBgFill="1">
+        <p:nvSpPr>
+          <p:cNvPr id="4" name="Rectangle 3">
+            <a:extLst>
+              <a:ext uri="{FF2B5EF4-FFF2-40B4-BE49-F238E27FC236}">
+                <a16:creationId xmlns:a16="http://schemas.microsoft.com/office/drawing/2014/main" id="{F8CD9413-9E55-5BBE-9830-8236D58AFC09}"/>
+              </a:ext>
+              <a:ext uri="{C183D7F6-B498-43B3-948B-1728B52AA6E4}">
+                <adec:decorative xmlns:adec="http://schemas.microsoft.com/office/drawing/2017/decorative" val="1"/>
               </a:ext>
             </a:extLst>
           </p:cNvPr>
           <p:cNvSpPr/>
-          <p:nvPr/>
+          <p:nvPr>
+            <p:extLst>
+              <p:ext uri="{386F3935-93C4-4BCD-93E2-E3B085C9AB24}">
+                <p16:designElem xmlns:p16="http://schemas.microsoft.com/office/powerpoint/2015/main" val="1"/>
+              </p:ext>
+            </p:extLst>
+          </p:nvPr>
         </p:nvSpPr>
         <p:spPr>
           <a:xfrm>
-            <a:off x="1908420" y="307329"/>
-            <a:ext cx="2448261" cy="720080"/>
+            <a:off x="0" y="0"/>
+            <a:ext cx="12191999" cy="6857365"/>
           </a:xfrm>
-          <a:prstGeom prst="roundRect">
+          <a:prstGeom prst="rect">
             <a:avLst/>
           </a:prstGeom>
-          <a:solidFill>
-            <a:srgbClr val="7030A0"/>
-          </a:solidFill>
+          <a:ln>
+            <a:noFill/>
+          </a:ln>
         </p:spPr>
         <p:style>
           <a:lnRef idx="2">
@@ -3394,41 +6244,262 @@
           <a:lstStyle/>
           <a:p>
             <a:pPr algn="ctr"/>
-            <a:r>
-              <a:rPr lang="en-US" sz="2000" dirty="0">
-                <a:latin typeface="Comic Sans MS" panose="030F0702030302020204" pitchFamily="66" charset="0"/>
-              </a:rPr>
-              <a:t>Start</a:t>
-            </a:r>
-            <a:endParaRPr lang="en-NG" sz="2000" dirty="0">
-              <a:latin typeface="Comic Sans MS" panose="030F0702030302020204" pitchFamily="66" charset="0"/>
-            </a:endParaRPr>
+            <a:endParaRPr lang="en-US"/>
           </a:p>
         </p:txBody>
       </p:sp>
+      <p:grpSp>
+        <p:nvGrpSpPr>
+          <p:cNvPr id="5" name="Group 4">
+            <a:extLst>
+              <a:ext uri="{FF2B5EF4-FFF2-40B4-BE49-F238E27FC236}">
+                <a16:creationId xmlns:a16="http://schemas.microsoft.com/office/drawing/2014/main" id="{844F9DBD-4B3B-5362-8CA3-B8A93FEFE19F}"/>
+              </a:ext>
+              <a:ext uri="{C183D7F6-B498-43B3-948B-1728B52AA6E4}">
+                <adec:decorative xmlns:adec="http://schemas.microsoft.com/office/drawing/2017/decorative" val="1"/>
+              </a:ext>
+            </a:extLst>
+          </p:cNvPr>
+          <p:cNvGrpSpPr/>
+          <p:nvPr>
+            <p:extLst>
+              <p:ext uri="{386F3935-93C4-4BCD-93E2-E3B085C9AB24}">
+                <p16:designElem xmlns:p16="http://schemas.microsoft.com/office/powerpoint/2015/main" val="1"/>
+              </p:ext>
+            </p:extLst>
+          </p:nvPr>
+        </p:nvGrpSpPr>
+        <p:grpSpPr>
+          <a:xfrm>
+            <a:off x="4" y="1216597"/>
+            <a:ext cx="731521" cy="673460"/>
+            <a:chOff x="3940602" y="308034"/>
+            <a:chExt cx="2116791" cy="3428999"/>
+          </a:xfrm>
+          <a:solidFill>
+            <a:schemeClr val="accent4"/>
+          </a:solidFill>
+        </p:grpSpPr>
+        <p:sp>
+          <p:nvSpPr>
+            <p:cNvPr id="6" name="Rectangle 5">
+              <a:extLst>
+                <a:ext uri="{FF2B5EF4-FFF2-40B4-BE49-F238E27FC236}">
+                  <a16:creationId xmlns:a16="http://schemas.microsoft.com/office/drawing/2014/main" id="{29AC3796-0756-4A47-A04F-78CC84547EB9}"/>
+                </a:ext>
+                <a:ext uri="{C183D7F6-B498-43B3-948B-1728B52AA6E4}">
+                  <adec:decorative xmlns:adec="http://schemas.microsoft.com/office/drawing/2017/decorative" val="1"/>
+                </a:ext>
+              </a:extLst>
+            </p:cNvPr>
+            <p:cNvSpPr/>
+            <p:nvPr>
+              <p:extLst>
+                <p:ext uri="{386F3935-93C4-4BCD-93E2-E3B085C9AB24}">
+                  <p16:designElem xmlns:p16="http://schemas.microsoft.com/office/powerpoint/2015/main" val="1"/>
+                </p:ext>
+              </p:extLst>
+            </p:nvPr>
+          </p:nvSpPr>
+          <p:spPr>
+            <a:xfrm>
+              <a:off x="3940602" y="308034"/>
+              <a:ext cx="566743" cy="3428999"/>
+            </a:xfrm>
+            <a:prstGeom prst="rect">
+              <a:avLst/>
+            </a:prstGeom>
+            <a:grpFill/>
+            <a:ln>
+              <a:noFill/>
+            </a:ln>
+          </p:spPr>
+          <p:style>
+            <a:lnRef idx="2">
+              <a:schemeClr val="accent1">
+                <a:shade val="50000"/>
+              </a:schemeClr>
+            </a:lnRef>
+            <a:fillRef idx="1">
+              <a:schemeClr val="accent1"/>
+            </a:fillRef>
+            <a:effectRef idx="0">
+              <a:schemeClr val="accent1"/>
+            </a:effectRef>
+            <a:fontRef idx="minor">
+              <a:schemeClr val="lt1"/>
+            </a:fontRef>
+          </p:style>
+          <p:txBody>
+            <a:bodyPr rtlCol="0" anchor="ctr"/>
+            <a:lstStyle/>
+            <a:p>
+              <a:pPr algn="ctr"/>
+              <a:endParaRPr lang="en-US"/>
+            </a:p>
+          </p:txBody>
+        </p:sp>
+        <p:sp>
+          <p:nvSpPr>
+            <p:cNvPr id="7" name="Rectangle 6">
+              <a:extLst>
+                <a:ext uri="{FF2B5EF4-FFF2-40B4-BE49-F238E27FC236}">
+                  <a16:creationId xmlns:a16="http://schemas.microsoft.com/office/drawing/2014/main" id="{D9859C3D-FB0B-C5E9-EC87-89AAAD0FCD2D}"/>
+                </a:ext>
+                <a:ext uri="{C183D7F6-B498-43B3-948B-1728B52AA6E4}">
+                  <adec:decorative xmlns:adec="http://schemas.microsoft.com/office/drawing/2017/decorative" val="1"/>
+                </a:ext>
+              </a:extLst>
+            </p:cNvPr>
+            <p:cNvSpPr/>
+            <p:nvPr>
+              <p:extLst>
+                <p:ext uri="{386F3935-93C4-4BCD-93E2-E3B085C9AB24}">
+                  <p16:designElem xmlns:p16="http://schemas.microsoft.com/office/powerpoint/2015/main" val="1"/>
+                </p:ext>
+              </p:extLst>
+            </p:nvPr>
+          </p:nvSpPr>
+          <p:spPr>
+            <a:xfrm>
+              <a:off x="4715626" y="308034"/>
+              <a:ext cx="566743" cy="3428999"/>
+            </a:xfrm>
+            <a:prstGeom prst="rect">
+              <a:avLst/>
+            </a:prstGeom>
+            <a:grpFill/>
+            <a:ln>
+              <a:noFill/>
+            </a:ln>
+          </p:spPr>
+          <p:style>
+            <a:lnRef idx="2">
+              <a:schemeClr val="accent1">
+                <a:shade val="50000"/>
+              </a:schemeClr>
+            </a:lnRef>
+            <a:fillRef idx="1">
+              <a:schemeClr val="accent1"/>
+            </a:fillRef>
+            <a:effectRef idx="0">
+              <a:schemeClr val="accent1"/>
+            </a:effectRef>
+            <a:fontRef idx="minor">
+              <a:schemeClr val="lt1"/>
+            </a:fontRef>
+          </p:style>
+          <p:txBody>
+            <a:bodyPr rtlCol="0" anchor="ctr"/>
+            <a:lstStyle/>
+            <a:p>
+              <a:pPr algn="ctr"/>
+              <a:endParaRPr lang="en-US"/>
+            </a:p>
+          </p:txBody>
+        </p:sp>
+        <p:sp>
+          <p:nvSpPr>
+            <p:cNvPr id="8" name="Rectangle 7">
+              <a:extLst>
+                <a:ext uri="{FF2B5EF4-FFF2-40B4-BE49-F238E27FC236}">
+                  <a16:creationId xmlns:a16="http://schemas.microsoft.com/office/drawing/2014/main" id="{336D11D4-2B78-A83E-73CC-FCEC36D5A4AD}"/>
+                </a:ext>
+                <a:ext uri="{C183D7F6-B498-43B3-948B-1728B52AA6E4}">
+                  <adec:decorative xmlns:adec="http://schemas.microsoft.com/office/drawing/2017/decorative" val="1"/>
+                </a:ext>
+              </a:extLst>
+            </p:cNvPr>
+            <p:cNvSpPr/>
+            <p:nvPr>
+              <p:extLst>
+                <p:ext uri="{386F3935-93C4-4BCD-93E2-E3B085C9AB24}">
+                  <p16:designElem xmlns:p16="http://schemas.microsoft.com/office/powerpoint/2015/main" val="1"/>
+                </p:ext>
+              </p:extLst>
+            </p:nvPr>
+          </p:nvSpPr>
+          <p:spPr>
+            <a:xfrm>
+              <a:off x="5490650" y="308034"/>
+              <a:ext cx="566743" cy="3428999"/>
+            </a:xfrm>
+            <a:prstGeom prst="rect">
+              <a:avLst/>
+            </a:prstGeom>
+            <a:grpFill/>
+            <a:ln>
+              <a:noFill/>
+            </a:ln>
+          </p:spPr>
+          <p:style>
+            <a:lnRef idx="2">
+              <a:schemeClr val="accent1">
+                <a:shade val="50000"/>
+              </a:schemeClr>
+            </a:lnRef>
+            <a:fillRef idx="1">
+              <a:schemeClr val="accent1"/>
+            </a:fillRef>
+            <a:effectRef idx="0">
+              <a:schemeClr val="accent1"/>
+            </a:effectRef>
+            <a:fontRef idx="minor">
+              <a:schemeClr val="lt1"/>
+            </a:fontRef>
+          </p:style>
+          <p:txBody>
+            <a:bodyPr rtlCol="0" anchor="ctr"/>
+            <a:lstStyle/>
+            <a:p>
+              <a:pPr algn="ctr"/>
+              <a:endParaRPr lang="en-US"/>
+            </a:p>
+          </p:txBody>
+        </p:sp>
+      </p:grpSp>
       <p:sp>
         <p:nvSpPr>
-          <p:cNvPr id="5" name="Rectangle: Rounded Corners 4">
-            <a:extLst>
-              <a:ext uri="{FF2B5EF4-FFF2-40B4-BE49-F238E27FC236}">
-                <a16:creationId xmlns:a16="http://schemas.microsoft.com/office/drawing/2014/main" id="{044CDA92-6DA0-ABDE-AD60-C0C27CF9CF28}"/>
+          <p:cNvPr id="9" name="Rectangle 8">
+            <a:extLst>
+              <a:ext uri="{FF2B5EF4-FFF2-40B4-BE49-F238E27FC236}">
+                <a16:creationId xmlns:a16="http://schemas.microsoft.com/office/drawing/2014/main" id="{307BE297-9766-1AFB-43E1-529CA237F927}"/>
+              </a:ext>
+              <a:ext uri="{C183D7F6-B498-43B3-948B-1728B52AA6E4}">
+                <adec:decorative xmlns:adec="http://schemas.microsoft.com/office/drawing/2017/decorative" val="1"/>
               </a:ext>
             </a:extLst>
           </p:cNvPr>
           <p:cNvSpPr/>
-          <p:nvPr/>
+          <p:nvPr>
+            <p:extLst>
+              <p:ext uri="{386F3935-93C4-4BCD-93E2-E3B085C9AB24}">
+                <p16:designElem xmlns:p16="http://schemas.microsoft.com/office/powerpoint/2015/main" val="1"/>
+              </p:ext>
+            </p:extLst>
+          </p:nvPr>
         </p:nvSpPr>
         <p:spPr>
           <a:xfrm>
-            <a:off x="6872773" y="284429"/>
-            <a:ext cx="2448261" cy="720080"/>
+            <a:off x="640079" y="613954"/>
+            <a:ext cx="10907487" cy="1894116"/>
           </a:xfrm>
-          <a:prstGeom prst="roundRect">
+          <a:prstGeom prst="rect">
             <a:avLst/>
           </a:prstGeom>
           <a:solidFill>
-            <a:srgbClr val="7030A0"/>
+            <a:schemeClr val="bg1"/>
           </a:solidFill>
+          <a:ln>
+            <a:noFill/>
+          </a:ln>
+          <a:effectLst>
+            <a:outerShdw blurRad="139700" dist="127000" dir="5400000" algn="t" rotWithShape="0">
+              <a:prstClr val="black">
+                <a:alpha val="15000"/>
+              </a:prstClr>
+            </a:outerShdw>
+          </a:effectLst>
         </p:spPr>
         <p:style>
           <a:lnRef idx="2">
@@ -3451,124 +6522,64 @@
           <a:lstStyle/>
           <a:p>
             <a:pPr algn="ctr"/>
-            <a:r>
-              <a:rPr lang="en-US" sz="2000" dirty="0">
-                <a:latin typeface="Comic Sans MS" panose="030F0702030302020204" pitchFamily="66" charset="0"/>
-              </a:rPr>
-              <a:t>Stop</a:t>
-            </a:r>
+            <a:endParaRPr lang="en-US"/>
           </a:p>
         </p:txBody>
       </p:sp>
       <p:sp>
         <p:nvSpPr>
-          <p:cNvPr id="16" name="Parallelogram 15">
-            <a:extLst>
-              <a:ext uri="{FF2B5EF4-FFF2-40B4-BE49-F238E27FC236}">
-                <a16:creationId xmlns:a16="http://schemas.microsoft.com/office/drawing/2014/main" id="{1D9CF9A7-3FB4-E77C-1C5F-5225EDE37DAC}"/>
-              </a:ext>
-            </a:extLst>
-          </p:cNvPr>
-          <p:cNvSpPr/>
+          <p:cNvPr id="10" name="Title 1">
+            <a:extLst>
+              <a:ext uri="{FF2B5EF4-FFF2-40B4-BE49-F238E27FC236}">
+                <a16:creationId xmlns:a16="http://schemas.microsoft.com/office/drawing/2014/main" id="{3F11C5BC-BCFC-B420-AE8D-C25CB5D2042C}"/>
+              </a:ext>
+            </a:extLst>
+          </p:cNvPr>
+          <p:cNvSpPr txBox="1">
+            <a:spLocks/>
+          </p:cNvSpPr>
           <p:nvPr/>
         </p:nvSpPr>
         <p:spPr>
           <a:xfrm>
-            <a:off x="6800757" y="1732227"/>
-            <a:ext cx="2520281" cy="824231"/>
+            <a:off x="1043631" y="809898"/>
+            <a:ext cx="10173010" cy="1554480"/>
           </a:xfrm>
-          <a:prstGeom prst="parallelogram">
+          <a:prstGeom prst="rect">
             <a:avLst/>
           </a:prstGeom>
-          <a:solidFill>
-            <a:srgbClr val="7030A0"/>
-          </a:solidFill>
         </p:spPr>
-        <p:style>
-          <a:lnRef idx="2">
-            <a:schemeClr val="accent1">
-              <a:shade val="50000"/>
-            </a:schemeClr>
-          </a:lnRef>
-          <a:fillRef idx="1">
-            <a:schemeClr val="accent1"/>
-          </a:fillRef>
-          <a:effectRef idx="0">
-            <a:schemeClr val="accent1"/>
-          </a:effectRef>
-          <a:fontRef idx="minor">
-            <a:schemeClr val="lt1"/>
-          </a:fontRef>
-        </p:style>
         <p:txBody>
-          <a:bodyPr rtlCol="0" anchor="ctr"/>
-          <a:lstStyle/>
-          <a:p>
-            <a:pPr algn="ctr"/>
-            <a:r>
-              <a:rPr lang="en-US" sz="2000" dirty="0">
+          <a:bodyPr vert="horz" lIns="91440" tIns="45720" rIns="91440" bIns="45720" rtlCol="0" anchor="ctr">
+            <a:normAutofit/>
+          </a:bodyPr>
+          <a:lstStyle>
+            <a:lvl1pPr algn="l" defTabSz="914400" rtl="0" eaLnBrk="1" latinLnBrk="0" hangingPunct="1">
+              <a:lnSpc>
+                <a:spcPct val="90000"/>
+              </a:lnSpc>
+              <a:spcBef>
+                <a:spcPct val="0"/>
+              </a:spcBef>
+              <a:buNone/>
+              <a:defRPr sz="4400" kern="1200">
+                <a:solidFill>
+                  <a:schemeClr val="tx1"/>
+                </a:solidFill>
+                <a:latin typeface="+mj-lt"/>
+                <a:ea typeface="+mj-ea"/>
+                <a:cs typeface="+mj-cs"/>
+              </a:defRPr>
+            </a:lvl1pPr>
+          </a:lstStyle>
+          <a:p>
+            <a:r>
+              <a:rPr lang="en-US" sz="4800">
                 <a:latin typeface="Comic Sans MS" panose="030F0702030302020204" pitchFamily="66" charset="0"/>
               </a:rPr>
-              <a:t>Print S.I</a:t>
-            </a:r>
-            <a:endParaRPr lang="en-NG" sz="2000" dirty="0">
-              <a:latin typeface="Comic Sans MS" panose="030F0702030302020204" pitchFamily="66" charset="0"/>
-            </a:endParaRPr>
-          </a:p>
-        </p:txBody>
-      </p:sp>
-      <p:sp>
-        <p:nvSpPr>
-          <p:cNvPr id="18" name="Parallelogram 17">
-            <a:extLst>
-              <a:ext uri="{FF2B5EF4-FFF2-40B4-BE49-F238E27FC236}">
-                <a16:creationId xmlns:a16="http://schemas.microsoft.com/office/drawing/2014/main" id="{5887F4F1-4308-0684-3CF2-13B1989A2BE9}"/>
-              </a:ext>
-            </a:extLst>
-          </p:cNvPr>
-          <p:cNvSpPr/>
-          <p:nvPr/>
-        </p:nvSpPr>
-        <p:spPr>
-          <a:xfrm>
-            <a:off x="1775520" y="1553119"/>
-            <a:ext cx="2520281" cy="824231"/>
-          </a:xfrm>
-          <a:prstGeom prst="parallelogram">
-            <a:avLst/>
-          </a:prstGeom>
-          <a:solidFill>
-            <a:srgbClr val="7030A0"/>
-          </a:solidFill>
-        </p:spPr>
-        <p:style>
-          <a:lnRef idx="2">
-            <a:schemeClr val="accent1">
-              <a:shade val="50000"/>
-            </a:schemeClr>
-          </a:lnRef>
-          <a:fillRef idx="1">
-            <a:schemeClr val="accent1"/>
-          </a:fillRef>
-          <a:effectRef idx="0">
-            <a:schemeClr val="accent1"/>
-          </a:effectRef>
-          <a:fontRef idx="minor">
-            <a:schemeClr val="lt1"/>
-          </a:fontRef>
-        </p:style>
-        <p:txBody>
-          <a:bodyPr rtlCol="0" anchor="ctr"/>
-          <a:lstStyle/>
-          <a:p>
-            <a:pPr algn="ctr"/>
-            <a:r>
-              <a:rPr lang="en-US" sz="2000" dirty="0">
-                <a:latin typeface="Comic Sans MS" panose="030F0702030302020204" pitchFamily="66" charset="0"/>
-              </a:rPr>
-              <a:t>Input P </a:t>
-            </a:r>
-            <a:endParaRPr lang="en-NG" sz="2000" dirty="0">
+              <a:t>Meymunah Olajobi</a:t>
+            </a:r>
+            <a:endParaRPr lang="en-NG" sz="4800" dirty="0">
               <a:latin typeface="Comic Sans MS" panose="030F0702030302020204" pitchFamily="66" charset="0"/>
             </a:endParaRPr>
           </a:p>
@@ -3576,31 +6587,37 @@
       </p:sp>
       <p:cxnSp>
         <p:nvCxnSpPr>
-          <p:cNvPr id="22" name="Straight Arrow Connector 21">
-            <a:extLst>
-              <a:ext uri="{FF2B5EF4-FFF2-40B4-BE49-F238E27FC236}">
-                <a16:creationId xmlns:a16="http://schemas.microsoft.com/office/drawing/2014/main" id="{5B8EF5D6-4E54-BE30-EBF1-EDAC39944CD7}"/>
-              </a:ext>
-            </a:extLst>
-          </p:cNvPr>
-          <p:cNvCxnSpPr>
-            <a:cxnSpLocks/>
-          </p:cNvCxnSpPr>
-          <p:nvPr/>
+          <p:cNvPr id="11" name="Straight Connector 10">
+            <a:extLst>
+              <a:ext uri="{FF2B5EF4-FFF2-40B4-BE49-F238E27FC236}">
+                <a16:creationId xmlns:a16="http://schemas.microsoft.com/office/drawing/2014/main" id="{6AFCB277-186E-9F88-E1B4-6FF454FCD9F0}"/>
+              </a:ext>
+              <a:ext uri="{C183D7F6-B498-43B3-948B-1728B52AA6E4}">
+                <adec:decorative xmlns:adec="http://schemas.microsoft.com/office/drawing/2017/decorative" val="1"/>
+              </a:ext>
+            </a:extLst>
+          </p:cNvPr>
+          <p:cNvCxnSpPr/>
+          <p:nvPr>
+            <p:extLst>
+              <p:ext uri="{386F3935-93C4-4BCD-93E2-E3B085C9AB24}">
+                <p16:designElem xmlns:p16="http://schemas.microsoft.com/office/powerpoint/2015/main" val="1"/>
+              </p:ext>
+            </p:extLst>
+          </p:nvPr>
         </p:nvCxnSpPr>
         <p:spPr>
-          <a:xfrm>
-            <a:off x="3071664" y="1025988"/>
-            <a:ext cx="0" cy="527131"/>
+          <a:xfrm flipH="1">
+            <a:off x="838200" y="6485313"/>
+            <a:ext cx="10515600" cy="0"/>
           </a:xfrm>
-          <a:prstGeom prst="straightConnector1">
+          <a:prstGeom prst="line">
             <a:avLst/>
           </a:prstGeom>
-          <a:ln>
+          <a:ln w="57150">
             <a:solidFill>
-              <a:schemeClr val="tx1"/>
+              <a:schemeClr val="accent4"/>
             </a:solidFill>
-            <a:tailEnd type="triangle"/>
           </a:ln>
         </p:spPr>
         <p:style>
@@ -3618,457 +6635,40 @@
           </a:fontRef>
         </p:style>
       </p:cxnSp>
-      <p:cxnSp>
-        <p:nvCxnSpPr>
-          <p:cNvPr id="24" name="Straight Arrow Connector 23">
-            <a:extLst>
-              <a:ext uri="{FF2B5EF4-FFF2-40B4-BE49-F238E27FC236}">
-                <a16:creationId xmlns:a16="http://schemas.microsoft.com/office/drawing/2014/main" id="{08F5CBD7-9BAE-B934-6A04-59FE451AAF5C}"/>
-              </a:ext>
-            </a:extLst>
-          </p:cNvPr>
-          <p:cNvCxnSpPr>
-            <a:cxnSpLocks/>
-          </p:cNvCxnSpPr>
-          <p:nvPr/>
-        </p:nvCxnSpPr>
-        <p:spPr>
-          <a:xfrm>
-            <a:off x="3071664" y="2377350"/>
-            <a:ext cx="0" cy="675019"/>
-          </a:xfrm>
-          <a:prstGeom prst="straightConnector1">
-            <a:avLst/>
-          </a:prstGeom>
-          <a:ln>
-            <a:solidFill>
-              <a:schemeClr val="tx1"/>
-            </a:solidFill>
-            <a:tailEnd type="triangle"/>
-          </a:ln>
-        </p:spPr>
-        <p:style>
-          <a:lnRef idx="1">
-            <a:schemeClr val="accent1"/>
-          </a:lnRef>
-          <a:fillRef idx="0">
-            <a:schemeClr val="accent1"/>
-          </a:fillRef>
-          <a:effectRef idx="0">
-            <a:schemeClr val="accent1"/>
-          </a:effectRef>
-          <a:fontRef idx="minor">
-            <a:schemeClr val="tx1"/>
-          </a:fontRef>
-        </p:style>
-      </p:cxnSp>
-      <p:cxnSp>
-        <p:nvCxnSpPr>
-          <p:cNvPr id="25" name="Straight Arrow Connector 24">
-            <a:extLst>
-              <a:ext uri="{FF2B5EF4-FFF2-40B4-BE49-F238E27FC236}">
-                <a16:creationId xmlns:a16="http://schemas.microsoft.com/office/drawing/2014/main" id="{CD8E4645-5FFC-AACB-C4A5-E1D8E723B214}"/>
-              </a:ext>
-            </a:extLst>
-          </p:cNvPr>
-          <p:cNvCxnSpPr>
-            <a:cxnSpLocks/>
-            <a:endCxn id="16" idx="0"/>
-          </p:cNvCxnSpPr>
-          <p:nvPr/>
-        </p:nvCxnSpPr>
-        <p:spPr>
-          <a:xfrm>
-            <a:off x="8060898" y="1087162"/>
-            <a:ext cx="0" cy="645065"/>
-          </a:xfrm>
-          <a:prstGeom prst="straightConnector1">
-            <a:avLst/>
-          </a:prstGeom>
-          <a:ln>
-            <a:solidFill>
-              <a:schemeClr val="tx1"/>
-            </a:solidFill>
-            <a:tailEnd type="triangle"/>
-          </a:ln>
-        </p:spPr>
-        <p:style>
-          <a:lnRef idx="1">
-            <a:schemeClr val="accent1"/>
-          </a:lnRef>
-          <a:fillRef idx="0">
-            <a:schemeClr val="accent1"/>
-          </a:fillRef>
-          <a:effectRef idx="0">
-            <a:schemeClr val="accent1"/>
-          </a:effectRef>
-          <a:fontRef idx="minor">
-            <a:schemeClr val="tx1"/>
-          </a:fontRef>
-        </p:style>
-      </p:cxnSp>
-      <p:sp>
-        <p:nvSpPr>
-          <p:cNvPr id="2" name="Parallelogram 1">
-            <a:extLst>
-              <a:ext uri="{FF2B5EF4-FFF2-40B4-BE49-F238E27FC236}">
-                <a16:creationId xmlns:a16="http://schemas.microsoft.com/office/drawing/2014/main" id="{B160DE69-A7F9-3126-2C8E-258B36019ED4}"/>
-              </a:ext>
-            </a:extLst>
-          </p:cNvPr>
-          <p:cNvSpPr/>
-          <p:nvPr/>
-        </p:nvSpPr>
-        <p:spPr>
-          <a:xfrm>
-            <a:off x="1358219" y="4584746"/>
-            <a:ext cx="2520281" cy="824231"/>
-          </a:xfrm>
-          <a:prstGeom prst="parallelogram">
-            <a:avLst/>
-          </a:prstGeom>
-          <a:solidFill>
-            <a:srgbClr val="7030A0"/>
-          </a:solidFill>
-        </p:spPr>
-        <p:style>
-          <a:lnRef idx="2">
-            <a:schemeClr val="accent1">
-              <a:shade val="50000"/>
-            </a:schemeClr>
-          </a:lnRef>
-          <a:fillRef idx="1">
-            <a:schemeClr val="accent1"/>
-          </a:fillRef>
-          <a:effectRef idx="0">
-            <a:schemeClr val="accent1"/>
-          </a:effectRef>
-          <a:fontRef idx="minor">
-            <a:schemeClr val="lt1"/>
-          </a:fontRef>
-        </p:style>
-        <p:txBody>
-          <a:bodyPr rtlCol="0" anchor="ctr"/>
-          <a:lstStyle/>
-          <a:p>
-            <a:pPr algn="ctr"/>
-            <a:r>
-              <a:rPr lang="en-US" sz="2000" dirty="0">
-                <a:latin typeface="Comic Sans MS" panose="030F0702030302020204" pitchFamily="66" charset="0"/>
-              </a:rPr>
-              <a:t>Input T</a:t>
-            </a:r>
-            <a:endParaRPr lang="en-NG" sz="2000" dirty="0">
-              <a:latin typeface="Comic Sans MS" panose="030F0702030302020204" pitchFamily="66" charset="0"/>
-            </a:endParaRPr>
-          </a:p>
-        </p:txBody>
-      </p:sp>
-      <p:sp>
-        <p:nvSpPr>
-          <p:cNvPr id="6" name="Parallelogram 5">
-            <a:extLst>
-              <a:ext uri="{FF2B5EF4-FFF2-40B4-BE49-F238E27FC236}">
-                <a16:creationId xmlns:a16="http://schemas.microsoft.com/office/drawing/2014/main" id="{4951714A-66A8-922D-5E8E-24722534D913}"/>
-              </a:ext>
-            </a:extLst>
-          </p:cNvPr>
-          <p:cNvSpPr/>
-          <p:nvPr/>
-        </p:nvSpPr>
-        <p:spPr>
-          <a:xfrm>
-            <a:off x="1561589" y="3052369"/>
-            <a:ext cx="2520281" cy="824231"/>
-          </a:xfrm>
-          <a:prstGeom prst="parallelogram">
-            <a:avLst/>
-          </a:prstGeom>
-          <a:solidFill>
-            <a:srgbClr val="7030A0"/>
-          </a:solidFill>
-        </p:spPr>
-        <p:style>
-          <a:lnRef idx="2">
-            <a:schemeClr val="accent1">
-              <a:shade val="50000"/>
-            </a:schemeClr>
-          </a:lnRef>
-          <a:fillRef idx="1">
-            <a:schemeClr val="accent1"/>
-          </a:fillRef>
-          <a:effectRef idx="0">
-            <a:schemeClr val="accent1"/>
-          </a:effectRef>
-          <a:fontRef idx="minor">
-            <a:schemeClr val="lt1"/>
-          </a:fontRef>
-        </p:style>
-        <p:txBody>
-          <a:bodyPr rtlCol="0" anchor="ctr"/>
-          <a:lstStyle/>
-          <a:p>
-            <a:pPr algn="ctr"/>
-            <a:r>
-              <a:rPr lang="en-US" sz="2000" dirty="0">
-                <a:latin typeface="Comic Sans MS" panose="030F0702030302020204" pitchFamily="66" charset="0"/>
-              </a:rPr>
-              <a:t>Input R</a:t>
-            </a:r>
-            <a:endParaRPr lang="en-NG" sz="2000" dirty="0">
-              <a:latin typeface="Comic Sans MS" panose="030F0702030302020204" pitchFamily="66" charset="0"/>
-            </a:endParaRPr>
-          </a:p>
-        </p:txBody>
-      </p:sp>
-      <p:cxnSp>
-        <p:nvCxnSpPr>
-          <p:cNvPr id="7" name="Straight Arrow Connector 6">
-            <a:extLst>
-              <a:ext uri="{FF2B5EF4-FFF2-40B4-BE49-F238E27FC236}">
-                <a16:creationId xmlns:a16="http://schemas.microsoft.com/office/drawing/2014/main" id="{D6474A6F-1E62-3A27-A610-E0A87DA72E0C}"/>
-              </a:ext>
-            </a:extLst>
-          </p:cNvPr>
-          <p:cNvCxnSpPr>
-            <a:cxnSpLocks/>
-          </p:cNvCxnSpPr>
-          <p:nvPr/>
-        </p:nvCxnSpPr>
-        <p:spPr>
-          <a:xfrm>
-            <a:off x="3071664" y="3888640"/>
-            <a:ext cx="0" cy="696106"/>
-          </a:xfrm>
-          <a:prstGeom prst="straightConnector1">
-            <a:avLst/>
-          </a:prstGeom>
-          <a:ln>
-            <a:solidFill>
-              <a:schemeClr val="tx1"/>
-            </a:solidFill>
-            <a:tailEnd type="triangle"/>
-          </a:ln>
-        </p:spPr>
-        <p:style>
-          <a:lnRef idx="1">
-            <a:schemeClr val="accent1"/>
-          </a:lnRef>
-          <a:fillRef idx="0">
-            <a:schemeClr val="accent1"/>
-          </a:fillRef>
-          <a:effectRef idx="0">
-            <a:schemeClr val="accent1"/>
-          </a:effectRef>
-          <a:fontRef idx="minor">
-            <a:schemeClr val="tx1"/>
-          </a:fontRef>
-        </p:style>
-      </p:cxnSp>
-      <p:sp>
-        <p:nvSpPr>
-          <p:cNvPr id="9" name="Rectangle 8">
-            <a:extLst>
-              <a:ext uri="{FF2B5EF4-FFF2-40B4-BE49-F238E27FC236}">
-                <a16:creationId xmlns:a16="http://schemas.microsoft.com/office/drawing/2014/main" id="{632D8318-F8E4-2C6D-DFBC-913C8FB1F0BA}"/>
-              </a:ext>
-            </a:extLst>
-          </p:cNvPr>
-          <p:cNvSpPr/>
-          <p:nvPr/>
-        </p:nvSpPr>
-        <p:spPr>
-          <a:xfrm>
-            <a:off x="6753480" y="3888640"/>
-            <a:ext cx="2671319" cy="1700598"/>
-          </a:xfrm>
-          <a:prstGeom prst="rect">
-            <a:avLst/>
-          </a:prstGeom>
-          <a:solidFill>
-            <a:srgbClr val="7030A0"/>
-          </a:solidFill>
-        </p:spPr>
-        <p:style>
-          <a:lnRef idx="2">
-            <a:schemeClr val="accent1">
-              <a:shade val="50000"/>
-            </a:schemeClr>
-          </a:lnRef>
-          <a:fillRef idx="1">
-            <a:schemeClr val="accent1"/>
-          </a:fillRef>
-          <a:effectRef idx="0">
-            <a:schemeClr val="accent1"/>
-          </a:effectRef>
-          <a:fontRef idx="minor">
-            <a:schemeClr val="lt1"/>
-          </a:fontRef>
-        </p:style>
-        <p:txBody>
-          <a:bodyPr rtlCol="0" anchor="ctr"/>
-          <a:lstStyle/>
-          <a:p>
-            <a:pPr algn="ctr"/>
-            <a:r>
-              <a:rPr lang="en-US" sz="2000" dirty="0">
-                <a:latin typeface="Comic Sans MS" panose="030F0702030302020204" pitchFamily="66" charset="0"/>
-              </a:rPr>
-              <a:t>Calculate </a:t>
-            </a:r>
-          </a:p>
-          <a:p>
-            <a:pPr algn="ctr"/>
-            <a:r>
-              <a:rPr lang="en-US" sz="2000" dirty="0">
-                <a:latin typeface="Comic Sans MS" panose="030F0702030302020204" pitchFamily="66" charset="0"/>
-              </a:rPr>
-              <a:t>A= P*(1+(R/100)T)</a:t>
-            </a:r>
-          </a:p>
-        </p:txBody>
-      </p:sp>
-      <p:cxnSp>
-        <p:nvCxnSpPr>
-          <p:cNvPr id="14" name="Straight Arrow Connector 13">
-            <a:extLst>
-              <a:ext uri="{FF2B5EF4-FFF2-40B4-BE49-F238E27FC236}">
-                <a16:creationId xmlns:a16="http://schemas.microsoft.com/office/drawing/2014/main" id="{2C4D3AF5-C99A-BEF2-2C25-3964058FBFDC}"/>
-              </a:ext>
-            </a:extLst>
-          </p:cNvPr>
-          <p:cNvCxnSpPr>
-            <a:cxnSpLocks/>
-          </p:cNvCxnSpPr>
-          <p:nvPr/>
-        </p:nvCxnSpPr>
-        <p:spPr>
-          <a:xfrm>
-            <a:off x="4007768" y="4941168"/>
-            <a:ext cx="2671319" cy="0"/>
-          </a:xfrm>
-          <a:prstGeom prst="straightConnector1">
-            <a:avLst/>
-          </a:prstGeom>
-          <a:ln>
-            <a:solidFill>
-              <a:schemeClr val="tx1"/>
-            </a:solidFill>
-            <a:tailEnd type="triangle"/>
-          </a:ln>
-        </p:spPr>
-        <p:style>
-          <a:lnRef idx="1">
-            <a:schemeClr val="accent1"/>
-          </a:lnRef>
-          <a:fillRef idx="0">
-            <a:schemeClr val="accent1"/>
-          </a:fillRef>
-          <a:effectRef idx="0">
-            <a:schemeClr val="accent1"/>
-          </a:effectRef>
-          <a:fontRef idx="minor">
-            <a:schemeClr val="tx1"/>
-          </a:fontRef>
-        </p:style>
-      </p:cxnSp>
-      <p:cxnSp>
-        <p:nvCxnSpPr>
-          <p:cNvPr id="15" name="Straight Arrow Connector 14">
-            <a:extLst>
-              <a:ext uri="{FF2B5EF4-FFF2-40B4-BE49-F238E27FC236}">
-                <a16:creationId xmlns:a16="http://schemas.microsoft.com/office/drawing/2014/main" id="{0C96B360-1A4D-7694-EBAA-838B1D314713}"/>
-              </a:ext>
-            </a:extLst>
-          </p:cNvPr>
-          <p:cNvCxnSpPr>
-            <a:cxnSpLocks/>
-            <a:endCxn id="9" idx="0"/>
-          </p:cNvCxnSpPr>
-          <p:nvPr/>
-        </p:nvCxnSpPr>
-        <p:spPr>
-          <a:xfrm>
-            <a:off x="8089140" y="2577170"/>
-            <a:ext cx="0" cy="1311470"/>
-          </a:xfrm>
-          <a:prstGeom prst="straightConnector1">
-            <a:avLst/>
-          </a:prstGeom>
-          <a:ln>
-            <a:solidFill>
-              <a:schemeClr val="tx1"/>
-            </a:solidFill>
-            <a:tailEnd type="triangle"/>
-          </a:ln>
-        </p:spPr>
-        <p:style>
-          <a:lnRef idx="1">
-            <a:schemeClr val="accent1"/>
-          </a:lnRef>
-          <a:fillRef idx="0">
-            <a:schemeClr val="accent1"/>
-          </a:fillRef>
-          <a:effectRef idx="0">
-            <a:schemeClr val="accent1"/>
-          </a:effectRef>
-          <a:fontRef idx="minor">
-            <a:schemeClr val="tx1"/>
-          </a:fontRef>
-        </p:style>
-      </p:cxnSp>
-      <p:sp>
-        <p:nvSpPr>
-          <p:cNvPr id="8" name="Subtitle 2">
-            <a:extLst>
-              <a:ext uri="{FF2B5EF4-FFF2-40B4-BE49-F238E27FC236}">
-                <a16:creationId xmlns:a16="http://schemas.microsoft.com/office/drawing/2014/main" id="{E98B9523-5799-5BE2-5309-4695BCB4FB9B}"/>
-              </a:ext>
-            </a:extLst>
-          </p:cNvPr>
-          <p:cNvSpPr>
-            <a:spLocks noGrp="1"/>
-          </p:cNvSpPr>
+      <p:graphicFrame>
+        <p:nvGraphicFramePr>
+          <p:cNvPr id="12" name="Content Placeholder 2">
+            <a:extLst>
+              <a:ext uri="{FF2B5EF4-FFF2-40B4-BE49-F238E27FC236}">
+                <a16:creationId xmlns:a16="http://schemas.microsoft.com/office/drawing/2014/main" id="{CC0E8B1B-D2CF-98DC-0DEF-A1B49DC0F8DE}"/>
+              </a:ext>
+            </a:extLst>
+          </p:cNvPr>
+          <p:cNvGraphicFramePr>
+            <a:graphicFrameLocks/>
+          </p:cNvGraphicFramePr>
           <p:nvPr>
-            <p:ph type="subTitle" idx="1"/>
+            <p:extLst>
+              <p:ext uri="{D42A27DB-BD31-4B8C-83A1-F6EECF244321}">
+                <p14:modId xmlns:p14="http://schemas.microsoft.com/office/powerpoint/2010/main" val="2831110562"/>
+              </p:ext>
+            </p:extLst>
           </p:nvPr>
-        </p:nvSpPr>
-        <p:spPr>
-          <a:xfrm>
-            <a:off x="9616832" y="149992"/>
-            <a:ext cx="2448261" cy="937170"/>
-          </a:xfrm>
-        </p:spPr>
-        <p:txBody>
-          <a:bodyPr>
-            <a:noAutofit/>
-          </a:bodyPr>
-          <a:lstStyle/>
-          <a:p>
-            <a:r>
-              <a:rPr lang="en-US" sz="2800" dirty="0">
-                <a:latin typeface="Comic Sans MS" panose="030F0702030302020204" pitchFamily="66" charset="0"/>
-              </a:rPr>
-              <a:t>Class Project </a:t>
-            </a:r>
-          </a:p>
-          <a:p>
-            <a:r>
-              <a:rPr lang="en-US" sz="2800" dirty="0">
-                <a:latin typeface="Comic Sans MS" panose="030F0702030302020204" pitchFamily="66" charset="0"/>
-              </a:rPr>
-              <a:t>1.a.</a:t>
-            </a:r>
-            <a:endParaRPr lang="en-NG" sz="2800" dirty="0">
-              <a:latin typeface="Comic Sans MS" panose="030F0702030302020204" pitchFamily="66" charset="0"/>
-            </a:endParaRPr>
-          </a:p>
-        </p:txBody>
-      </p:sp>
+        </p:nvGraphicFramePr>
+        <p:xfrm>
+          <a:off x="904602" y="3017519"/>
+          <a:ext cx="10378440" cy="3209902"/>
+        </p:xfrm>
+        <a:graphic>
+          <a:graphicData uri="http://schemas.openxmlformats.org/drawingml/2006/diagram">
+            <dgm:relIds xmlns:dgm="http://schemas.openxmlformats.org/drawingml/2006/diagram" xmlns:r="http://schemas.openxmlformats.org/officeDocument/2006/relationships" r:dm="rId2" r:lo="rId3" r:qs="rId4" r:cs="rId5"/>
+          </a:graphicData>
+        </a:graphic>
+      </p:graphicFrame>
     </p:spTree>
     <p:extLst>
       <p:ext uri="{BB962C8B-B14F-4D97-AF65-F5344CB8AC3E}">
-        <p14:creationId xmlns:p14="http://schemas.microsoft.com/office/powerpoint/2010/main" val="2152705040"/>
+        <p14:creationId xmlns:p14="http://schemas.microsoft.com/office/powerpoint/2010/main" val="217846851"/>
       </p:ext>
     </p:extLst>
   </p:cSld>
@@ -4109,6 +6709,752 @@
         </p:nvSpPr>
         <p:spPr>
           <a:xfrm>
+            <a:off x="1908420" y="307329"/>
+            <a:ext cx="2448261" cy="720080"/>
+          </a:xfrm>
+          <a:prstGeom prst="roundRect">
+            <a:avLst/>
+          </a:prstGeom>
+          <a:solidFill>
+            <a:srgbClr val="7030A0"/>
+          </a:solidFill>
+        </p:spPr>
+        <p:style>
+          <a:lnRef idx="2">
+            <a:schemeClr val="accent1">
+              <a:shade val="50000"/>
+            </a:schemeClr>
+          </a:lnRef>
+          <a:fillRef idx="1">
+            <a:schemeClr val="accent1"/>
+          </a:fillRef>
+          <a:effectRef idx="0">
+            <a:schemeClr val="accent1"/>
+          </a:effectRef>
+          <a:fontRef idx="minor">
+            <a:schemeClr val="lt1"/>
+          </a:fontRef>
+        </p:style>
+        <p:txBody>
+          <a:bodyPr rtlCol="0" anchor="ctr"/>
+          <a:lstStyle/>
+          <a:p>
+            <a:pPr algn="ctr"/>
+            <a:r>
+              <a:rPr lang="en-US" sz="2000" dirty="0">
+                <a:latin typeface="Comic Sans MS" panose="030F0702030302020204" pitchFamily="66" charset="0"/>
+              </a:rPr>
+              <a:t>Start</a:t>
+            </a:r>
+            <a:endParaRPr lang="en-NG" sz="2000" dirty="0">
+              <a:latin typeface="Comic Sans MS" panose="030F0702030302020204" pitchFamily="66" charset="0"/>
+            </a:endParaRPr>
+          </a:p>
+        </p:txBody>
+      </p:sp>
+      <p:sp>
+        <p:nvSpPr>
+          <p:cNvPr id="5" name="Rectangle: Rounded Corners 4">
+            <a:extLst>
+              <a:ext uri="{FF2B5EF4-FFF2-40B4-BE49-F238E27FC236}">
+                <a16:creationId xmlns:a16="http://schemas.microsoft.com/office/drawing/2014/main" id="{044CDA92-6DA0-ABDE-AD60-C0C27CF9CF28}"/>
+              </a:ext>
+            </a:extLst>
+          </p:cNvPr>
+          <p:cNvSpPr/>
+          <p:nvPr/>
+        </p:nvSpPr>
+        <p:spPr>
+          <a:xfrm>
+            <a:off x="6872773" y="284429"/>
+            <a:ext cx="2448261" cy="720080"/>
+          </a:xfrm>
+          <a:prstGeom prst="roundRect">
+            <a:avLst/>
+          </a:prstGeom>
+          <a:solidFill>
+            <a:srgbClr val="7030A0"/>
+          </a:solidFill>
+        </p:spPr>
+        <p:style>
+          <a:lnRef idx="2">
+            <a:schemeClr val="accent1">
+              <a:shade val="50000"/>
+            </a:schemeClr>
+          </a:lnRef>
+          <a:fillRef idx="1">
+            <a:schemeClr val="accent1"/>
+          </a:fillRef>
+          <a:effectRef idx="0">
+            <a:schemeClr val="accent1"/>
+          </a:effectRef>
+          <a:fontRef idx="minor">
+            <a:schemeClr val="lt1"/>
+          </a:fontRef>
+        </p:style>
+        <p:txBody>
+          <a:bodyPr rtlCol="0" anchor="ctr"/>
+          <a:lstStyle/>
+          <a:p>
+            <a:pPr algn="ctr"/>
+            <a:r>
+              <a:rPr lang="en-US" sz="2000" dirty="0">
+                <a:latin typeface="Comic Sans MS" panose="030F0702030302020204" pitchFamily="66" charset="0"/>
+              </a:rPr>
+              <a:t>Stop</a:t>
+            </a:r>
+          </a:p>
+        </p:txBody>
+      </p:sp>
+      <p:sp>
+        <p:nvSpPr>
+          <p:cNvPr id="16" name="Parallelogram 15">
+            <a:extLst>
+              <a:ext uri="{FF2B5EF4-FFF2-40B4-BE49-F238E27FC236}">
+                <a16:creationId xmlns:a16="http://schemas.microsoft.com/office/drawing/2014/main" id="{1D9CF9A7-3FB4-E77C-1C5F-5225EDE37DAC}"/>
+              </a:ext>
+            </a:extLst>
+          </p:cNvPr>
+          <p:cNvSpPr/>
+          <p:nvPr/>
+        </p:nvSpPr>
+        <p:spPr>
+          <a:xfrm>
+            <a:off x="6800757" y="1732227"/>
+            <a:ext cx="2520281" cy="824231"/>
+          </a:xfrm>
+          <a:prstGeom prst="parallelogram">
+            <a:avLst/>
+          </a:prstGeom>
+          <a:solidFill>
+            <a:srgbClr val="7030A0"/>
+          </a:solidFill>
+        </p:spPr>
+        <p:style>
+          <a:lnRef idx="2">
+            <a:schemeClr val="accent1">
+              <a:shade val="50000"/>
+            </a:schemeClr>
+          </a:lnRef>
+          <a:fillRef idx="1">
+            <a:schemeClr val="accent1"/>
+          </a:fillRef>
+          <a:effectRef idx="0">
+            <a:schemeClr val="accent1"/>
+          </a:effectRef>
+          <a:fontRef idx="minor">
+            <a:schemeClr val="lt1"/>
+          </a:fontRef>
+        </p:style>
+        <p:txBody>
+          <a:bodyPr rtlCol="0" anchor="ctr"/>
+          <a:lstStyle/>
+          <a:p>
+            <a:pPr algn="ctr"/>
+            <a:r>
+              <a:rPr lang="en-US" sz="2000" dirty="0">
+                <a:latin typeface="Comic Sans MS" panose="030F0702030302020204" pitchFamily="66" charset="0"/>
+              </a:rPr>
+              <a:t>Print S.I</a:t>
+            </a:r>
+            <a:endParaRPr lang="en-NG" sz="2000" dirty="0">
+              <a:latin typeface="Comic Sans MS" panose="030F0702030302020204" pitchFamily="66" charset="0"/>
+            </a:endParaRPr>
+          </a:p>
+        </p:txBody>
+      </p:sp>
+      <p:sp>
+        <p:nvSpPr>
+          <p:cNvPr id="18" name="Parallelogram 17">
+            <a:extLst>
+              <a:ext uri="{FF2B5EF4-FFF2-40B4-BE49-F238E27FC236}">
+                <a16:creationId xmlns:a16="http://schemas.microsoft.com/office/drawing/2014/main" id="{5887F4F1-4308-0684-3CF2-13B1989A2BE9}"/>
+              </a:ext>
+            </a:extLst>
+          </p:cNvPr>
+          <p:cNvSpPr/>
+          <p:nvPr/>
+        </p:nvSpPr>
+        <p:spPr>
+          <a:xfrm>
+            <a:off x="1775520" y="1553119"/>
+            <a:ext cx="2520281" cy="824231"/>
+          </a:xfrm>
+          <a:prstGeom prst="parallelogram">
+            <a:avLst/>
+          </a:prstGeom>
+          <a:solidFill>
+            <a:srgbClr val="7030A0"/>
+          </a:solidFill>
+        </p:spPr>
+        <p:style>
+          <a:lnRef idx="2">
+            <a:schemeClr val="accent1">
+              <a:shade val="50000"/>
+            </a:schemeClr>
+          </a:lnRef>
+          <a:fillRef idx="1">
+            <a:schemeClr val="accent1"/>
+          </a:fillRef>
+          <a:effectRef idx="0">
+            <a:schemeClr val="accent1"/>
+          </a:effectRef>
+          <a:fontRef idx="minor">
+            <a:schemeClr val="lt1"/>
+          </a:fontRef>
+        </p:style>
+        <p:txBody>
+          <a:bodyPr rtlCol="0" anchor="ctr"/>
+          <a:lstStyle/>
+          <a:p>
+            <a:pPr algn="ctr"/>
+            <a:r>
+              <a:rPr lang="en-US" sz="2000" dirty="0">
+                <a:latin typeface="Comic Sans MS" panose="030F0702030302020204" pitchFamily="66" charset="0"/>
+              </a:rPr>
+              <a:t>Input P </a:t>
+            </a:r>
+            <a:endParaRPr lang="en-NG" sz="2000" dirty="0">
+              <a:latin typeface="Comic Sans MS" panose="030F0702030302020204" pitchFamily="66" charset="0"/>
+            </a:endParaRPr>
+          </a:p>
+        </p:txBody>
+      </p:sp>
+      <p:cxnSp>
+        <p:nvCxnSpPr>
+          <p:cNvPr id="22" name="Straight Arrow Connector 21">
+            <a:extLst>
+              <a:ext uri="{FF2B5EF4-FFF2-40B4-BE49-F238E27FC236}">
+                <a16:creationId xmlns:a16="http://schemas.microsoft.com/office/drawing/2014/main" id="{5B8EF5D6-4E54-BE30-EBF1-EDAC39944CD7}"/>
+              </a:ext>
+            </a:extLst>
+          </p:cNvPr>
+          <p:cNvCxnSpPr>
+            <a:cxnSpLocks/>
+          </p:cNvCxnSpPr>
+          <p:nvPr/>
+        </p:nvCxnSpPr>
+        <p:spPr>
+          <a:xfrm>
+            <a:off x="3071664" y="1025988"/>
+            <a:ext cx="0" cy="527131"/>
+          </a:xfrm>
+          <a:prstGeom prst="straightConnector1">
+            <a:avLst/>
+          </a:prstGeom>
+          <a:ln>
+            <a:solidFill>
+              <a:schemeClr val="tx1"/>
+            </a:solidFill>
+            <a:tailEnd type="triangle"/>
+          </a:ln>
+        </p:spPr>
+        <p:style>
+          <a:lnRef idx="1">
+            <a:schemeClr val="accent1"/>
+          </a:lnRef>
+          <a:fillRef idx="0">
+            <a:schemeClr val="accent1"/>
+          </a:fillRef>
+          <a:effectRef idx="0">
+            <a:schemeClr val="accent1"/>
+          </a:effectRef>
+          <a:fontRef idx="minor">
+            <a:schemeClr val="tx1"/>
+          </a:fontRef>
+        </p:style>
+      </p:cxnSp>
+      <p:cxnSp>
+        <p:nvCxnSpPr>
+          <p:cNvPr id="24" name="Straight Arrow Connector 23">
+            <a:extLst>
+              <a:ext uri="{FF2B5EF4-FFF2-40B4-BE49-F238E27FC236}">
+                <a16:creationId xmlns:a16="http://schemas.microsoft.com/office/drawing/2014/main" id="{08F5CBD7-9BAE-B934-6A04-59FE451AAF5C}"/>
+              </a:ext>
+            </a:extLst>
+          </p:cNvPr>
+          <p:cNvCxnSpPr>
+            <a:cxnSpLocks/>
+          </p:cNvCxnSpPr>
+          <p:nvPr/>
+        </p:nvCxnSpPr>
+        <p:spPr>
+          <a:xfrm>
+            <a:off x="3071664" y="2377350"/>
+            <a:ext cx="0" cy="675019"/>
+          </a:xfrm>
+          <a:prstGeom prst="straightConnector1">
+            <a:avLst/>
+          </a:prstGeom>
+          <a:ln>
+            <a:solidFill>
+              <a:schemeClr val="tx1"/>
+            </a:solidFill>
+            <a:tailEnd type="triangle"/>
+          </a:ln>
+        </p:spPr>
+        <p:style>
+          <a:lnRef idx="1">
+            <a:schemeClr val="accent1"/>
+          </a:lnRef>
+          <a:fillRef idx="0">
+            <a:schemeClr val="accent1"/>
+          </a:fillRef>
+          <a:effectRef idx="0">
+            <a:schemeClr val="accent1"/>
+          </a:effectRef>
+          <a:fontRef idx="minor">
+            <a:schemeClr val="tx1"/>
+          </a:fontRef>
+        </p:style>
+      </p:cxnSp>
+      <p:cxnSp>
+        <p:nvCxnSpPr>
+          <p:cNvPr id="25" name="Straight Arrow Connector 24">
+            <a:extLst>
+              <a:ext uri="{FF2B5EF4-FFF2-40B4-BE49-F238E27FC236}">
+                <a16:creationId xmlns:a16="http://schemas.microsoft.com/office/drawing/2014/main" id="{CD8E4645-5FFC-AACB-C4A5-E1D8E723B214}"/>
+              </a:ext>
+            </a:extLst>
+          </p:cNvPr>
+          <p:cNvCxnSpPr>
+            <a:cxnSpLocks/>
+            <a:endCxn id="16" idx="0"/>
+          </p:cNvCxnSpPr>
+          <p:nvPr/>
+        </p:nvCxnSpPr>
+        <p:spPr>
+          <a:xfrm>
+            <a:off x="8060898" y="1087162"/>
+            <a:ext cx="0" cy="645065"/>
+          </a:xfrm>
+          <a:prstGeom prst="straightConnector1">
+            <a:avLst/>
+          </a:prstGeom>
+          <a:ln>
+            <a:solidFill>
+              <a:schemeClr val="tx1"/>
+            </a:solidFill>
+            <a:tailEnd type="triangle"/>
+          </a:ln>
+        </p:spPr>
+        <p:style>
+          <a:lnRef idx="1">
+            <a:schemeClr val="accent1"/>
+          </a:lnRef>
+          <a:fillRef idx="0">
+            <a:schemeClr val="accent1"/>
+          </a:fillRef>
+          <a:effectRef idx="0">
+            <a:schemeClr val="accent1"/>
+          </a:effectRef>
+          <a:fontRef idx="minor">
+            <a:schemeClr val="tx1"/>
+          </a:fontRef>
+        </p:style>
+      </p:cxnSp>
+      <p:sp>
+        <p:nvSpPr>
+          <p:cNvPr id="2" name="Parallelogram 1">
+            <a:extLst>
+              <a:ext uri="{FF2B5EF4-FFF2-40B4-BE49-F238E27FC236}">
+                <a16:creationId xmlns:a16="http://schemas.microsoft.com/office/drawing/2014/main" id="{B160DE69-A7F9-3126-2C8E-258B36019ED4}"/>
+              </a:ext>
+            </a:extLst>
+          </p:cNvPr>
+          <p:cNvSpPr/>
+          <p:nvPr/>
+        </p:nvSpPr>
+        <p:spPr>
+          <a:xfrm>
+            <a:off x="1358219" y="4584746"/>
+            <a:ext cx="2520281" cy="824231"/>
+          </a:xfrm>
+          <a:prstGeom prst="parallelogram">
+            <a:avLst/>
+          </a:prstGeom>
+          <a:solidFill>
+            <a:srgbClr val="7030A0"/>
+          </a:solidFill>
+        </p:spPr>
+        <p:style>
+          <a:lnRef idx="2">
+            <a:schemeClr val="accent1">
+              <a:shade val="50000"/>
+            </a:schemeClr>
+          </a:lnRef>
+          <a:fillRef idx="1">
+            <a:schemeClr val="accent1"/>
+          </a:fillRef>
+          <a:effectRef idx="0">
+            <a:schemeClr val="accent1"/>
+          </a:effectRef>
+          <a:fontRef idx="minor">
+            <a:schemeClr val="lt1"/>
+          </a:fontRef>
+        </p:style>
+        <p:txBody>
+          <a:bodyPr rtlCol="0" anchor="ctr"/>
+          <a:lstStyle/>
+          <a:p>
+            <a:pPr algn="ctr"/>
+            <a:r>
+              <a:rPr lang="en-US" sz="2000" dirty="0">
+                <a:latin typeface="Comic Sans MS" panose="030F0702030302020204" pitchFamily="66" charset="0"/>
+              </a:rPr>
+              <a:t>Input T</a:t>
+            </a:r>
+            <a:endParaRPr lang="en-NG" sz="2000" dirty="0">
+              <a:latin typeface="Comic Sans MS" panose="030F0702030302020204" pitchFamily="66" charset="0"/>
+            </a:endParaRPr>
+          </a:p>
+        </p:txBody>
+      </p:sp>
+      <p:sp>
+        <p:nvSpPr>
+          <p:cNvPr id="6" name="Parallelogram 5">
+            <a:extLst>
+              <a:ext uri="{FF2B5EF4-FFF2-40B4-BE49-F238E27FC236}">
+                <a16:creationId xmlns:a16="http://schemas.microsoft.com/office/drawing/2014/main" id="{4951714A-66A8-922D-5E8E-24722534D913}"/>
+              </a:ext>
+            </a:extLst>
+          </p:cNvPr>
+          <p:cNvSpPr/>
+          <p:nvPr/>
+        </p:nvSpPr>
+        <p:spPr>
+          <a:xfrm>
+            <a:off x="1561589" y="3052369"/>
+            <a:ext cx="2520281" cy="824231"/>
+          </a:xfrm>
+          <a:prstGeom prst="parallelogram">
+            <a:avLst/>
+          </a:prstGeom>
+          <a:solidFill>
+            <a:srgbClr val="7030A0"/>
+          </a:solidFill>
+        </p:spPr>
+        <p:style>
+          <a:lnRef idx="2">
+            <a:schemeClr val="accent1">
+              <a:shade val="50000"/>
+            </a:schemeClr>
+          </a:lnRef>
+          <a:fillRef idx="1">
+            <a:schemeClr val="accent1"/>
+          </a:fillRef>
+          <a:effectRef idx="0">
+            <a:schemeClr val="accent1"/>
+          </a:effectRef>
+          <a:fontRef idx="minor">
+            <a:schemeClr val="lt1"/>
+          </a:fontRef>
+        </p:style>
+        <p:txBody>
+          <a:bodyPr rtlCol="0" anchor="ctr"/>
+          <a:lstStyle/>
+          <a:p>
+            <a:pPr algn="ctr"/>
+            <a:r>
+              <a:rPr lang="en-US" sz="2000" dirty="0">
+                <a:latin typeface="Comic Sans MS" panose="030F0702030302020204" pitchFamily="66" charset="0"/>
+              </a:rPr>
+              <a:t>Input R</a:t>
+            </a:r>
+            <a:endParaRPr lang="en-NG" sz="2000" dirty="0">
+              <a:latin typeface="Comic Sans MS" panose="030F0702030302020204" pitchFamily="66" charset="0"/>
+            </a:endParaRPr>
+          </a:p>
+        </p:txBody>
+      </p:sp>
+      <p:cxnSp>
+        <p:nvCxnSpPr>
+          <p:cNvPr id="7" name="Straight Arrow Connector 6">
+            <a:extLst>
+              <a:ext uri="{FF2B5EF4-FFF2-40B4-BE49-F238E27FC236}">
+                <a16:creationId xmlns:a16="http://schemas.microsoft.com/office/drawing/2014/main" id="{D6474A6F-1E62-3A27-A610-E0A87DA72E0C}"/>
+              </a:ext>
+            </a:extLst>
+          </p:cNvPr>
+          <p:cNvCxnSpPr>
+            <a:cxnSpLocks/>
+          </p:cNvCxnSpPr>
+          <p:nvPr/>
+        </p:nvCxnSpPr>
+        <p:spPr>
+          <a:xfrm>
+            <a:off x="3071664" y="3888640"/>
+            <a:ext cx="0" cy="696106"/>
+          </a:xfrm>
+          <a:prstGeom prst="straightConnector1">
+            <a:avLst/>
+          </a:prstGeom>
+          <a:ln>
+            <a:solidFill>
+              <a:schemeClr val="tx1"/>
+            </a:solidFill>
+            <a:tailEnd type="triangle"/>
+          </a:ln>
+        </p:spPr>
+        <p:style>
+          <a:lnRef idx="1">
+            <a:schemeClr val="accent1"/>
+          </a:lnRef>
+          <a:fillRef idx="0">
+            <a:schemeClr val="accent1"/>
+          </a:fillRef>
+          <a:effectRef idx="0">
+            <a:schemeClr val="accent1"/>
+          </a:effectRef>
+          <a:fontRef idx="minor">
+            <a:schemeClr val="tx1"/>
+          </a:fontRef>
+        </p:style>
+      </p:cxnSp>
+      <p:sp>
+        <p:nvSpPr>
+          <p:cNvPr id="9" name="Rectangle 8">
+            <a:extLst>
+              <a:ext uri="{FF2B5EF4-FFF2-40B4-BE49-F238E27FC236}">
+                <a16:creationId xmlns:a16="http://schemas.microsoft.com/office/drawing/2014/main" id="{632D8318-F8E4-2C6D-DFBC-913C8FB1F0BA}"/>
+              </a:ext>
+            </a:extLst>
+          </p:cNvPr>
+          <p:cNvSpPr/>
+          <p:nvPr/>
+        </p:nvSpPr>
+        <p:spPr>
+          <a:xfrm>
+            <a:off x="6753480" y="3888640"/>
+            <a:ext cx="2671319" cy="1700598"/>
+          </a:xfrm>
+          <a:prstGeom prst="rect">
+            <a:avLst/>
+          </a:prstGeom>
+          <a:solidFill>
+            <a:srgbClr val="7030A0"/>
+          </a:solidFill>
+        </p:spPr>
+        <p:style>
+          <a:lnRef idx="2">
+            <a:schemeClr val="accent1">
+              <a:shade val="50000"/>
+            </a:schemeClr>
+          </a:lnRef>
+          <a:fillRef idx="1">
+            <a:schemeClr val="accent1"/>
+          </a:fillRef>
+          <a:effectRef idx="0">
+            <a:schemeClr val="accent1"/>
+          </a:effectRef>
+          <a:fontRef idx="minor">
+            <a:schemeClr val="lt1"/>
+          </a:fontRef>
+        </p:style>
+        <p:txBody>
+          <a:bodyPr rtlCol="0" anchor="ctr"/>
+          <a:lstStyle/>
+          <a:p>
+            <a:pPr algn="ctr"/>
+            <a:r>
+              <a:rPr lang="en-US" sz="2000" dirty="0">
+                <a:latin typeface="Comic Sans MS" panose="030F0702030302020204" pitchFamily="66" charset="0"/>
+              </a:rPr>
+              <a:t>Calculate </a:t>
+            </a:r>
+          </a:p>
+          <a:p>
+            <a:pPr algn="ctr"/>
+            <a:r>
+              <a:rPr lang="en-US" sz="2000" dirty="0">
+                <a:latin typeface="Comic Sans MS" panose="030F0702030302020204" pitchFamily="66" charset="0"/>
+              </a:rPr>
+              <a:t>A= P*(1+(R/100)T)</a:t>
+            </a:r>
+          </a:p>
+        </p:txBody>
+      </p:sp>
+      <p:cxnSp>
+        <p:nvCxnSpPr>
+          <p:cNvPr id="14" name="Straight Arrow Connector 13">
+            <a:extLst>
+              <a:ext uri="{FF2B5EF4-FFF2-40B4-BE49-F238E27FC236}">
+                <a16:creationId xmlns:a16="http://schemas.microsoft.com/office/drawing/2014/main" id="{2C4D3AF5-C99A-BEF2-2C25-3964058FBFDC}"/>
+              </a:ext>
+            </a:extLst>
+          </p:cNvPr>
+          <p:cNvCxnSpPr>
+            <a:cxnSpLocks/>
+          </p:cNvCxnSpPr>
+          <p:nvPr/>
+        </p:nvCxnSpPr>
+        <p:spPr>
+          <a:xfrm>
+            <a:off x="4007768" y="4941168"/>
+            <a:ext cx="2671319" cy="0"/>
+          </a:xfrm>
+          <a:prstGeom prst="straightConnector1">
+            <a:avLst/>
+          </a:prstGeom>
+          <a:ln>
+            <a:solidFill>
+              <a:schemeClr val="tx1"/>
+            </a:solidFill>
+            <a:tailEnd type="triangle"/>
+          </a:ln>
+        </p:spPr>
+        <p:style>
+          <a:lnRef idx="1">
+            <a:schemeClr val="accent1"/>
+          </a:lnRef>
+          <a:fillRef idx="0">
+            <a:schemeClr val="accent1"/>
+          </a:fillRef>
+          <a:effectRef idx="0">
+            <a:schemeClr val="accent1"/>
+          </a:effectRef>
+          <a:fontRef idx="minor">
+            <a:schemeClr val="tx1"/>
+          </a:fontRef>
+        </p:style>
+      </p:cxnSp>
+      <p:cxnSp>
+        <p:nvCxnSpPr>
+          <p:cNvPr id="15" name="Straight Arrow Connector 14">
+            <a:extLst>
+              <a:ext uri="{FF2B5EF4-FFF2-40B4-BE49-F238E27FC236}">
+                <a16:creationId xmlns:a16="http://schemas.microsoft.com/office/drawing/2014/main" id="{0C96B360-1A4D-7694-EBAA-838B1D314713}"/>
+              </a:ext>
+            </a:extLst>
+          </p:cNvPr>
+          <p:cNvCxnSpPr>
+            <a:cxnSpLocks/>
+            <a:endCxn id="9" idx="0"/>
+          </p:cNvCxnSpPr>
+          <p:nvPr/>
+        </p:nvCxnSpPr>
+        <p:spPr>
+          <a:xfrm>
+            <a:off x="8089140" y="2577170"/>
+            <a:ext cx="0" cy="1311470"/>
+          </a:xfrm>
+          <a:prstGeom prst="straightConnector1">
+            <a:avLst/>
+          </a:prstGeom>
+          <a:ln>
+            <a:solidFill>
+              <a:schemeClr val="tx1"/>
+            </a:solidFill>
+            <a:tailEnd type="triangle"/>
+          </a:ln>
+        </p:spPr>
+        <p:style>
+          <a:lnRef idx="1">
+            <a:schemeClr val="accent1"/>
+          </a:lnRef>
+          <a:fillRef idx="0">
+            <a:schemeClr val="accent1"/>
+          </a:fillRef>
+          <a:effectRef idx="0">
+            <a:schemeClr val="accent1"/>
+          </a:effectRef>
+          <a:fontRef idx="minor">
+            <a:schemeClr val="tx1"/>
+          </a:fontRef>
+        </p:style>
+      </p:cxnSp>
+      <p:sp>
+        <p:nvSpPr>
+          <p:cNvPr id="8" name="Subtitle 2">
+            <a:extLst>
+              <a:ext uri="{FF2B5EF4-FFF2-40B4-BE49-F238E27FC236}">
+                <a16:creationId xmlns:a16="http://schemas.microsoft.com/office/drawing/2014/main" id="{E98B9523-5799-5BE2-5309-4695BCB4FB9B}"/>
+              </a:ext>
+            </a:extLst>
+          </p:cNvPr>
+          <p:cNvSpPr>
+            <a:spLocks noGrp="1"/>
+          </p:cNvSpPr>
+          <p:nvPr>
+            <p:ph type="subTitle" idx="1"/>
+          </p:nvPr>
+        </p:nvSpPr>
+        <p:spPr>
+          <a:xfrm>
+            <a:off x="9616832" y="149992"/>
+            <a:ext cx="2448261" cy="937170"/>
+          </a:xfrm>
+        </p:spPr>
+        <p:txBody>
+          <a:bodyPr>
+            <a:noAutofit/>
+          </a:bodyPr>
+          <a:lstStyle/>
+          <a:p>
+            <a:r>
+              <a:rPr lang="en-US" sz="2800" dirty="0">
+                <a:latin typeface="Comic Sans MS" panose="030F0702030302020204" pitchFamily="66" charset="0"/>
+              </a:rPr>
+              <a:t>Class Project </a:t>
+            </a:r>
+          </a:p>
+          <a:p>
+            <a:r>
+              <a:rPr lang="en-US" sz="2800" dirty="0">
+                <a:latin typeface="Comic Sans MS" panose="030F0702030302020204" pitchFamily="66" charset="0"/>
+              </a:rPr>
+              <a:t>1.a.</a:t>
+            </a:r>
+            <a:endParaRPr lang="en-NG" sz="2800" dirty="0">
+              <a:latin typeface="Comic Sans MS" panose="030F0702030302020204" pitchFamily="66" charset="0"/>
+            </a:endParaRPr>
+          </a:p>
+        </p:txBody>
+      </p:sp>
+    </p:spTree>
+    <p:extLst>
+      <p:ext uri="{BB962C8B-B14F-4D97-AF65-F5344CB8AC3E}">
+        <p14:creationId xmlns:p14="http://schemas.microsoft.com/office/powerpoint/2010/main" val="2152705040"/>
+      </p:ext>
+    </p:extLst>
+  </p:cSld>
+  <p:clrMapOvr>
+    <a:masterClrMapping/>
+  </p:clrMapOvr>
+</p:sld>
+</file>
+
+<file path=ppt/slides/slide3.xml><?xml version="1.0" encoding="utf-8"?>
+<p:sld xmlns:a="http://schemas.openxmlformats.org/drawingml/2006/main" xmlns:r="http://schemas.openxmlformats.org/officeDocument/2006/relationships" xmlns:p="http://schemas.openxmlformats.org/presentationml/2006/main">
+  <p:cSld>
+    <p:spTree>
+      <p:nvGrpSpPr>
+        <p:cNvPr id="1" name=""/>
+        <p:cNvGrpSpPr/>
+        <p:nvPr/>
+      </p:nvGrpSpPr>
+      <p:grpSpPr>
+        <a:xfrm>
+          <a:off x="0" y="0"/>
+          <a:ext cx="0" cy="0"/>
+          <a:chOff x="0" y="0"/>
+          <a:chExt cx="0" cy="0"/>
+        </a:xfrm>
+      </p:grpSpPr>
+      <p:sp>
+        <p:nvSpPr>
+          <p:cNvPr id="4" name="Rectangle: Rounded Corners 3">
+            <a:extLst>
+              <a:ext uri="{FF2B5EF4-FFF2-40B4-BE49-F238E27FC236}">
+                <a16:creationId xmlns:a16="http://schemas.microsoft.com/office/drawing/2014/main" id="{D84EDAC8-37C8-8EBF-3F6F-B15ADC291794}"/>
+              </a:ext>
+            </a:extLst>
+          </p:cNvPr>
+          <p:cNvSpPr/>
+          <p:nvPr/>
+        </p:nvSpPr>
+        <p:spPr>
+          <a:xfrm>
             <a:off x="1954000" y="380533"/>
             <a:ext cx="2387543" cy="720080"/>
           </a:xfrm>
@@ -4934,7 +8280,7 @@
 </p:sld>
 </file>
 
-<file path=ppt/slides/slide3.xml><?xml version="1.0" encoding="utf-8"?>
+<file path=ppt/slides/slide4.xml><?xml version="1.0" encoding="utf-8"?>
 <p:sld xmlns:a="http://schemas.openxmlformats.org/drawingml/2006/main" xmlns:r="http://schemas.openxmlformats.org/officeDocument/2006/relationships" xmlns:p="http://schemas.openxmlformats.org/presentationml/2006/main">
   <p:cSld>
     <p:spTree>

</xml_diff>